<commit_message>
Document Update, StartStatus Rename
</commit_message>
<xml_diff>
--- a/Documents/TabHero.pptx
+++ b/Documents/TabHero.pptx
@@ -19,17 +19,19 @@
     <p:sldId id="267" r:id="rId13"/>
     <p:sldId id="268" r:id="rId14"/>
     <p:sldId id="269" r:id="rId15"/>
-    <p:sldId id="270" r:id="rId16"/>
-    <p:sldId id="271" r:id="rId17"/>
-    <p:sldId id="272" r:id="rId18"/>
-    <p:sldId id="273" r:id="rId19"/>
-    <p:sldId id="274" r:id="rId20"/>
-    <p:sldId id="278" r:id="rId21"/>
-    <p:sldId id="276" r:id="rId22"/>
-    <p:sldId id="277" r:id="rId23"/>
-    <p:sldId id="275" r:id="rId24"/>
-    <p:sldId id="279" r:id="rId25"/>
-    <p:sldId id="280" r:id="rId26"/>
+    <p:sldId id="282" r:id="rId16"/>
+    <p:sldId id="270" r:id="rId17"/>
+    <p:sldId id="271" r:id="rId18"/>
+    <p:sldId id="272" r:id="rId19"/>
+    <p:sldId id="273" r:id="rId20"/>
+    <p:sldId id="281" r:id="rId21"/>
+    <p:sldId id="274" r:id="rId22"/>
+    <p:sldId id="278" r:id="rId23"/>
+    <p:sldId id="276" r:id="rId24"/>
+    <p:sldId id="277" r:id="rId25"/>
+    <p:sldId id="275" r:id="rId26"/>
+    <p:sldId id="279" r:id="rId27"/>
+    <p:sldId id="280" r:id="rId28"/>
   </p:sldIdLst>
   <p:sldSz cx="12192000" cy="6858000"/>
   <p:notesSz cx="6858000" cy="9144000"/>
@@ -774,7 +776,7 @@
           <a:p>
             <a:fld id="{02C1E7B6-AAC5-4D87-B0BB-B467B133FA42}" type="datetimeFigureOut">
               <a:rPr lang="ko-KR" altLang="en-US" smtClean="0"/>
-              <a:t>2022-06-28</a:t>
+              <a:t>2022-06-29</a:t>
             </a:fld>
             <a:endParaRPr lang="ko-KR" altLang="en-US"/>
           </a:p>
@@ -972,7 +974,7 @@
           <a:p>
             <a:fld id="{02C1E7B6-AAC5-4D87-B0BB-B467B133FA42}" type="datetimeFigureOut">
               <a:rPr lang="ko-KR" altLang="en-US" smtClean="0"/>
-              <a:t>2022-06-28</a:t>
+              <a:t>2022-06-29</a:t>
             </a:fld>
             <a:endParaRPr lang="ko-KR" altLang="en-US"/>
           </a:p>
@@ -1180,7 +1182,7 @@
           <a:p>
             <a:fld id="{02C1E7B6-AAC5-4D87-B0BB-B467B133FA42}" type="datetimeFigureOut">
               <a:rPr lang="ko-KR" altLang="en-US" smtClean="0"/>
-              <a:t>2022-06-28</a:t>
+              <a:t>2022-06-29</a:t>
             </a:fld>
             <a:endParaRPr lang="ko-KR" altLang="en-US"/>
           </a:p>
@@ -1378,7 +1380,7 @@
           <a:p>
             <a:fld id="{02C1E7B6-AAC5-4D87-B0BB-B467B133FA42}" type="datetimeFigureOut">
               <a:rPr lang="ko-KR" altLang="en-US" smtClean="0"/>
-              <a:t>2022-06-28</a:t>
+              <a:t>2022-06-29</a:t>
             </a:fld>
             <a:endParaRPr lang="ko-KR" altLang="en-US"/>
           </a:p>
@@ -1653,7 +1655,7 @@
           <a:p>
             <a:fld id="{02C1E7B6-AAC5-4D87-B0BB-B467B133FA42}" type="datetimeFigureOut">
               <a:rPr lang="ko-KR" altLang="en-US" smtClean="0"/>
-              <a:t>2022-06-28</a:t>
+              <a:t>2022-06-29</a:t>
             </a:fld>
             <a:endParaRPr lang="ko-KR" altLang="en-US"/>
           </a:p>
@@ -1918,7 +1920,7 @@
           <a:p>
             <a:fld id="{02C1E7B6-AAC5-4D87-B0BB-B467B133FA42}" type="datetimeFigureOut">
               <a:rPr lang="ko-KR" altLang="en-US" smtClean="0"/>
-              <a:t>2022-06-28</a:t>
+              <a:t>2022-06-29</a:t>
             </a:fld>
             <a:endParaRPr lang="ko-KR" altLang="en-US"/>
           </a:p>
@@ -2330,7 +2332,7 @@
           <a:p>
             <a:fld id="{02C1E7B6-AAC5-4D87-B0BB-B467B133FA42}" type="datetimeFigureOut">
               <a:rPr lang="ko-KR" altLang="en-US" smtClean="0"/>
-              <a:t>2022-06-28</a:t>
+              <a:t>2022-06-29</a:t>
             </a:fld>
             <a:endParaRPr lang="ko-KR" altLang="en-US"/>
           </a:p>
@@ -2471,7 +2473,7 @@
           <a:p>
             <a:fld id="{02C1E7B6-AAC5-4D87-B0BB-B467B133FA42}" type="datetimeFigureOut">
               <a:rPr lang="ko-KR" altLang="en-US" smtClean="0"/>
-              <a:t>2022-06-28</a:t>
+              <a:t>2022-06-29</a:t>
             </a:fld>
             <a:endParaRPr lang="ko-KR" altLang="en-US"/>
           </a:p>
@@ -2584,7 +2586,7 @@
           <a:p>
             <a:fld id="{02C1E7B6-AAC5-4D87-B0BB-B467B133FA42}" type="datetimeFigureOut">
               <a:rPr lang="ko-KR" altLang="en-US" smtClean="0"/>
-              <a:t>2022-06-28</a:t>
+              <a:t>2022-06-29</a:t>
             </a:fld>
             <a:endParaRPr lang="ko-KR" altLang="en-US"/>
           </a:p>
@@ -2895,7 +2897,7 @@
           <a:p>
             <a:fld id="{02C1E7B6-AAC5-4D87-B0BB-B467B133FA42}" type="datetimeFigureOut">
               <a:rPr lang="ko-KR" altLang="en-US" smtClean="0"/>
-              <a:t>2022-06-28</a:t>
+              <a:t>2022-06-29</a:t>
             </a:fld>
             <a:endParaRPr lang="ko-KR" altLang="en-US"/>
           </a:p>
@@ -3183,7 +3185,7 @@
           <a:p>
             <a:fld id="{02C1E7B6-AAC5-4D87-B0BB-B467B133FA42}" type="datetimeFigureOut">
               <a:rPr lang="ko-KR" altLang="en-US" smtClean="0"/>
-              <a:t>2022-06-28</a:t>
+              <a:t>2022-06-29</a:t>
             </a:fld>
             <a:endParaRPr lang="ko-KR" altLang="en-US"/>
           </a:p>
@@ -3424,7 +3426,7 @@
           <a:p>
             <a:fld id="{02C1E7B6-AAC5-4D87-B0BB-B467B133FA42}" type="datetimeFigureOut">
               <a:rPr lang="ko-KR" altLang="en-US" smtClean="0"/>
-              <a:t>2022-06-28</a:t>
+              <a:t>2022-06-29</a:t>
             </a:fld>
             <a:endParaRPr lang="ko-KR" altLang="en-US"/>
           </a:p>
@@ -5522,6 +5524,13 @@
               </a:rPr>
               <a:t>Microsoft.Office.Interop.Excel.dll</a:t>
             </a:r>
+          </a:p>
+          <a:p>
+            <a:pPr>
+              <a:lnSpc>
+                <a:spcPct val="150000"/>
+              </a:lnSpc>
+            </a:pPr>
             <a:r>
               <a:rPr lang="ko-KR" altLang="en-US" sz="1600" dirty="0">
                 <a:solidFill>
@@ -5530,7 +5539,7 @@
                 <a:latin typeface="넥슨Lv2고딕 Light" panose="00000300000000000000" pitchFamily="2" charset="-127"/>
                 <a:ea typeface="넥슨Lv2고딕 Light" panose="00000300000000000000" pitchFamily="2" charset="-127"/>
               </a:rPr>
-              <a:t> 이 적용되지 않는 문제를 겪었습니다</a:t>
+              <a:t>호환되지 않는 문제를 겪었습니다</a:t>
             </a:r>
             <a:endParaRPr lang="en-US" altLang="ko-KR" sz="1600" dirty="0">
               <a:solidFill>
@@ -5554,7 +5563,7 @@
                 <a:latin typeface="넥슨Lv2고딕 Light" panose="00000300000000000000" pitchFamily="2" charset="-127"/>
                 <a:ea typeface="넥슨Lv2고딕 Light" panose="00000300000000000000" pitchFamily="2" charset="-127"/>
               </a:rPr>
-              <a:t>이것을 해결하기 위해 유니티에서 실행하는 방법을 찾아보다</a:t>
+              <a:t>이것을 해결하기 위해 유니티에서는</a:t>
             </a:r>
             <a:endParaRPr lang="en-US" altLang="ko-KR" sz="1600" dirty="0">
               <a:solidFill>
@@ -5578,7 +5587,7 @@
                 <a:latin typeface="넥슨Lv2고딕 Light" panose="00000300000000000000" pitchFamily="2" charset="-127"/>
                 <a:ea typeface="넥슨Lv2고딕 Light" panose="00000300000000000000" pitchFamily="2" charset="-127"/>
               </a:rPr>
-              <a:t>여러 방법들이 작동이 안되어서</a:t>
+              <a:t>프로그램만 실행하는 방법을 택하였고</a:t>
             </a:r>
             <a:endParaRPr lang="en-US" altLang="ko-KR" sz="1600" dirty="0">
               <a:solidFill>
@@ -5612,7 +5621,7 @@
                 <a:latin typeface="넥슨Lv2고딕 Light" panose="00000300000000000000" pitchFamily="2" charset="-127"/>
                 <a:ea typeface="넥슨Lv2고딕 Light" panose="00000300000000000000" pitchFamily="2" charset="-127"/>
               </a:rPr>
-              <a:t>을 이용해 </a:t>
+              <a:t>을 프로그램을 제작하여 </a:t>
             </a:r>
             <a:r>
               <a:rPr lang="en-US" altLang="ko-KR" sz="1600" dirty="0">
@@ -5656,7 +5665,7 @@
                 <a:latin typeface="넥슨Lv2고딕 Light" panose="00000300000000000000" pitchFamily="2" charset="-127"/>
                 <a:ea typeface="넥슨Lv2고딕 Light" panose="00000300000000000000" pitchFamily="2" charset="-127"/>
               </a:rPr>
-              <a:t>유니티 </a:t>
+              <a:t>유니티 에서 실행하였습니다</a:t>
             </a:r>
             <a:r>
               <a:rPr lang="en-US" altLang="ko-KR" sz="1600" dirty="0">
@@ -5666,49 +5675,8 @@
                 <a:latin typeface="넥슨Lv2고딕 Light" panose="00000300000000000000" pitchFamily="2" charset="-127"/>
                 <a:ea typeface="넥슨Lv2고딕 Light" panose="00000300000000000000" pitchFamily="2" charset="-127"/>
               </a:rPr>
-              <a:t>C#</a:t>
-            </a:r>
-            <a:r>
-              <a:rPr lang="ko-KR" altLang="en-US" sz="1600" dirty="0">
-                <a:solidFill>
-                  <a:schemeClr val="bg1"/>
-                </a:solidFill>
-                <a:latin typeface="넥슨Lv2고딕 Light" panose="00000300000000000000" pitchFamily="2" charset="-127"/>
-                <a:ea typeface="넥슨Lv2고딕 Light" panose="00000300000000000000" pitchFamily="2" charset="-127"/>
-              </a:rPr>
-              <a:t>에서 실행하는 방법으로</a:t>
-            </a:r>
-            <a:endParaRPr lang="en-US" altLang="ko-KR" sz="1600" dirty="0">
-              <a:solidFill>
-                <a:schemeClr val="bg1"/>
-              </a:solidFill>
-              <a:latin typeface="넥슨Lv2고딕 Light" panose="00000300000000000000" pitchFamily="2" charset="-127"/>
-              <a:ea typeface="넥슨Lv2고딕 Light" panose="00000300000000000000" pitchFamily="2" charset="-127"/>
-            </a:endParaRPr>
-          </a:p>
-          <a:p>
-            <a:pPr>
-              <a:lnSpc>
-                <a:spcPct val="150000"/>
-              </a:lnSpc>
-            </a:pPr>
-            <a:r>
-              <a:rPr lang="ko-KR" altLang="en-US" sz="1600" dirty="0">
-                <a:solidFill>
-                  <a:schemeClr val="bg1"/>
-                </a:solidFill>
-                <a:latin typeface="넥슨Lv2고딕 Light" panose="00000300000000000000" pitchFamily="2" charset="-127"/>
-                <a:ea typeface="넥슨Lv2고딕 Light" panose="00000300000000000000" pitchFamily="2" charset="-127"/>
-              </a:rPr>
-              <a:t>해결하게 되었습니다</a:t>
-            </a:r>
-            <a:endParaRPr lang="en-US" altLang="ko-KR" sz="1600" dirty="0">
-              <a:solidFill>
-                <a:schemeClr val="bg1"/>
-              </a:solidFill>
-              <a:latin typeface="넥슨Lv2고딕 Light" panose="00000300000000000000" pitchFamily="2" charset="-127"/>
-              <a:ea typeface="넥슨Lv2고딕 Light" panose="00000300000000000000" pitchFamily="2" charset="-127"/>
-            </a:endParaRPr>
+              <a:t>.</a:t>
+            </a:r>
           </a:p>
         </p:txBody>
       </p:sp>
@@ -5764,8 +5732,8 @@
         </p:nvSpPr>
         <p:spPr>
           <a:xfrm>
-            <a:off x="1680310" y="1469196"/>
-            <a:ext cx="6650890" cy="1200329"/>
+            <a:off x="1680310" y="1155929"/>
+            <a:ext cx="3733800" cy="584775"/>
           </a:xfrm>
           <a:prstGeom prst="rect">
             <a:avLst/>
@@ -5779,16 +5747,16 @@
           <a:lstStyle/>
           <a:p>
             <a:r>
-              <a:rPr lang="ko-KR" altLang="en-US" sz="7200" dirty="0">
+              <a:rPr lang="ko-KR" altLang="en-US" sz="3200" dirty="0" err="1">
                 <a:solidFill>
                   <a:schemeClr val="bg1"/>
                 </a:solidFill>
                 <a:latin typeface="넥슨Lv2고딕 Bold" panose="00000800000000000000" pitchFamily="2" charset="-127"/>
                 <a:ea typeface="넥슨Lv2고딕 Bold" panose="00000800000000000000" pitchFamily="2" charset="-127"/>
               </a:rPr>
-              <a:t>스크립트</a:t>
-            </a:r>
-            <a:endParaRPr lang="en-US" altLang="ko-KR" sz="7200" dirty="0">
+              <a:t>로컬라이징</a:t>
+            </a:r>
+            <a:endParaRPr lang="en-US" altLang="ko-KR" sz="3200" dirty="0">
               <a:solidFill>
                 <a:schemeClr val="bg1"/>
               </a:solidFill>
@@ -5800,10 +5768,62 @@
       </p:sp>
       <p:sp>
         <p:nvSpPr>
-          <p:cNvPr id="11" name="TextBox 10">
-            <a:extLst>
-              <a:ext uri="{FF2B5EF4-FFF2-40B4-BE49-F238E27FC236}">
-                <a16:creationId xmlns:a16="http://schemas.microsoft.com/office/drawing/2014/main" id="{E10A1302-F34C-6112-2BB3-EF054A096FF3}"/>
+          <p:cNvPr id="16" name="직사각형 15">
+            <a:extLst>
+              <a:ext uri="{FF2B5EF4-FFF2-40B4-BE49-F238E27FC236}">
+                <a16:creationId xmlns:a16="http://schemas.microsoft.com/office/drawing/2014/main" id="{06D4D73C-002A-B871-4E9F-3C2F2EFA95F6}"/>
+              </a:ext>
+            </a:extLst>
+          </p:cNvPr>
+          <p:cNvSpPr/>
+          <p:nvPr/>
+        </p:nvSpPr>
+        <p:spPr>
+          <a:xfrm>
+            <a:off x="1660524" y="1262063"/>
+            <a:ext cx="45719" cy="366711"/>
+          </a:xfrm>
+          <a:prstGeom prst="rect">
+            <a:avLst/>
+          </a:prstGeom>
+          <a:solidFill>
+            <a:schemeClr val="bg1"/>
+          </a:solidFill>
+          <a:ln>
+            <a:noFill/>
+          </a:ln>
+        </p:spPr>
+        <p:style>
+          <a:lnRef idx="2">
+            <a:schemeClr val="accent1">
+              <a:shade val="50000"/>
+            </a:schemeClr>
+          </a:lnRef>
+          <a:fillRef idx="1">
+            <a:schemeClr val="accent1"/>
+          </a:fillRef>
+          <a:effectRef idx="0">
+            <a:schemeClr val="accent1"/>
+          </a:effectRef>
+          <a:fontRef idx="minor">
+            <a:schemeClr val="lt1"/>
+          </a:fontRef>
+        </p:style>
+        <p:txBody>
+          <a:bodyPr rtlCol="0" anchor="ctr"/>
+          <a:lstStyle/>
+          <a:p>
+            <a:pPr algn="ctr"/>
+            <a:endParaRPr lang="ko-KR" altLang="en-US"/>
+          </a:p>
+        </p:txBody>
+      </p:sp>
+      <p:sp>
+        <p:nvSpPr>
+          <p:cNvPr id="19" name="TextBox 18">
+            <a:extLst>
+              <a:ext uri="{FF2B5EF4-FFF2-40B4-BE49-F238E27FC236}">
+                <a16:creationId xmlns:a16="http://schemas.microsoft.com/office/drawing/2014/main" id="{5316A27D-F818-472F-350E-CD328A0375DC}"/>
               </a:ext>
             </a:extLst>
           </p:cNvPr>
@@ -5812,8 +5832,8 @@
         </p:nvSpPr>
         <p:spPr>
           <a:xfrm>
-            <a:off x="1657349" y="3143250"/>
-            <a:ext cx="4321175" cy="2984343"/>
+            <a:off x="1680309" y="2074745"/>
+            <a:ext cx="8736865" cy="1538370"/>
           </a:xfrm>
           <a:prstGeom prst="rect">
             <a:avLst/>
@@ -5832,33 +5852,16 @@
               </a:lnSpc>
             </a:pPr>
             <a:r>
-              <a:rPr lang="ko-KR" altLang="en-US" sz="3200" dirty="0">
-                <a:solidFill>
-                  <a:schemeClr val="bg1"/>
-                </a:solidFill>
-                <a:latin typeface="넥슨Lv2고딕 Light" panose="00000300000000000000" pitchFamily="2" charset="-127"/>
-                <a:ea typeface="넥슨Lv2고딕 Light" panose="00000300000000000000" pitchFamily="2" charset="-127"/>
-              </a:rPr>
-              <a:t>플레이어</a:t>
-            </a:r>
-          </a:p>
-          <a:p>
-            <a:pPr>
-              <a:lnSpc>
-                <a:spcPct val="150000"/>
-              </a:lnSpc>
-            </a:pPr>
-            <a:r>
-              <a:rPr lang="ko-KR" altLang="en-US" sz="3200" dirty="0">
-                <a:solidFill>
-                  <a:schemeClr val="bg1"/>
-                </a:solidFill>
-                <a:latin typeface="넥슨Lv2고딕 Light" panose="00000300000000000000" pitchFamily="2" charset="-127"/>
-                <a:ea typeface="넥슨Lv2고딕 Light" panose="00000300000000000000" pitchFamily="2" charset="-127"/>
-              </a:rPr>
-              <a:t>전투</a:t>
-            </a:r>
-            <a:endParaRPr lang="en-US" altLang="ko-KR" sz="3200" dirty="0">
+              <a:rPr lang="ko-KR" altLang="en-US" sz="1600" dirty="0">
+                <a:solidFill>
+                  <a:schemeClr val="bg1"/>
+                </a:solidFill>
+                <a:latin typeface="넥슨Lv2고딕 Light" panose="00000300000000000000" pitchFamily="2" charset="-127"/>
+                <a:ea typeface="넥슨Lv2고딕 Light" panose="00000300000000000000" pitchFamily="2" charset="-127"/>
+              </a:rPr>
+              <a:t>다양한 사람이 즐길 수 있도록</a:t>
+            </a:r>
+            <a:endParaRPr lang="en-US" altLang="ko-KR" sz="1600" dirty="0">
               <a:solidFill>
                 <a:schemeClr val="bg1"/>
               </a:solidFill>
@@ -5873,36 +5876,16 @@
               </a:lnSpc>
             </a:pPr>
             <a:r>
-              <a:rPr lang="ko-KR" altLang="en-US" sz="3200" dirty="0">
-                <a:solidFill>
-                  <a:schemeClr val="bg1"/>
-                </a:solidFill>
-                <a:latin typeface="넥슨Lv2고딕 Light" panose="00000300000000000000" pitchFamily="2" charset="-127"/>
-                <a:ea typeface="넥슨Lv2고딕 Light" panose="00000300000000000000" pitchFamily="2" charset="-127"/>
-              </a:rPr>
-              <a:t>세이브</a:t>
-            </a:r>
-            <a:r>
-              <a:rPr lang="en-US" altLang="ko-KR" sz="3200" dirty="0">
-                <a:solidFill>
-                  <a:schemeClr val="bg1"/>
-                </a:solidFill>
-                <a:latin typeface="넥슨Lv2고딕 Light" panose="00000300000000000000" pitchFamily="2" charset="-127"/>
-                <a:ea typeface="넥슨Lv2고딕 Light" panose="00000300000000000000" pitchFamily="2" charset="-127"/>
-              </a:rPr>
-              <a:t>/</a:t>
-            </a:r>
-            <a:r>
-              <a:rPr lang="ko-KR" altLang="en-US" sz="3200" dirty="0">
-                <a:solidFill>
-                  <a:schemeClr val="bg1"/>
-                </a:solidFill>
-                <a:latin typeface="넥슨Lv2고딕 Light" panose="00000300000000000000" pitchFamily="2" charset="-127"/>
-                <a:ea typeface="넥슨Lv2고딕 Light" panose="00000300000000000000" pitchFamily="2" charset="-127"/>
-              </a:rPr>
-              <a:t>로드</a:t>
-            </a:r>
-            <a:endParaRPr lang="en-US" altLang="ko-KR" sz="3200" dirty="0">
+              <a:rPr lang="ko-KR" altLang="en-US" sz="1600" dirty="0">
+                <a:solidFill>
+                  <a:schemeClr val="bg1"/>
+                </a:solidFill>
+                <a:latin typeface="넥슨Lv2고딕 Light" panose="00000300000000000000" pitchFamily="2" charset="-127"/>
+                <a:ea typeface="넥슨Lv2고딕 Light" panose="00000300000000000000" pitchFamily="2" charset="-127"/>
+              </a:rPr>
+              <a:t>언어별 데이터를 관리하여</a:t>
+            </a:r>
+            <a:endParaRPr lang="en-US" altLang="ko-KR" sz="1600" dirty="0">
               <a:solidFill>
                 <a:schemeClr val="bg1"/>
               </a:solidFill>
@@ -5917,22 +5900,146 @@
               </a:lnSpc>
             </a:pPr>
             <a:r>
-              <a:rPr lang="ko-KR" altLang="en-US" sz="3200" dirty="0">
-                <a:solidFill>
-                  <a:schemeClr val="bg1"/>
-                </a:solidFill>
-                <a:latin typeface="넥슨Lv2고딕 Light" panose="00000300000000000000" pitchFamily="2" charset="-127"/>
-                <a:ea typeface="넥슨Lv2고딕 Light" panose="00000300000000000000" pitchFamily="2" charset="-127"/>
-              </a:rPr>
-              <a:t>싱글 톤 사용 이유</a:t>
-            </a:r>
+              <a:rPr lang="ko-KR" altLang="en-US" sz="1600" dirty="0">
+                <a:solidFill>
+                  <a:schemeClr val="bg1"/>
+                </a:solidFill>
+                <a:latin typeface="넥슨Lv2고딕 Light" panose="00000300000000000000" pitchFamily="2" charset="-127"/>
+                <a:ea typeface="넥슨Lv2고딕 Light" panose="00000300000000000000" pitchFamily="2" charset="-127"/>
+              </a:rPr>
+              <a:t>인 게임 설정에 따라</a:t>
+            </a:r>
+            <a:endParaRPr lang="en-US" altLang="ko-KR" sz="1600" dirty="0">
+              <a:solidFill>
+                <a:schemeClr val="bg1"/>
+              </a:solidFill>
+              <a:latin typeface="넥슨Lv2고딕 Light" panose="00000300000000000000" pitchFamily="2" charset="-127"/>
+              <a:ea typeface="넥슨Lv2고딕 Light" panose="00000300000000000000" pitchFamily="2" charset="-127"/>
+            </a:endParaRPr>
+          </a:p>
+          <a:p>
+            <a:pPr>
+              <a:lnSpc>
+                <a:spcPct val="150000"/>
+              </a:lnSpc>
+            </a:pPr>
+            <a:r>
+              <a:rPr lang="ko-KR" altLang="en-US" sz="1600" dirty="0">
+                <a:solidFill>
+                  <a:schemeClr val="bg1"/>
+                </a:solidFill>
+                <a:latin typeface="넥슨Lv2고딕 Light" panose="00000300000000000000" pitchFamily="2" charset="-127"/>
+                <a:ea typeface="넥슨Lv2고딕 Light" panose="00000300000000000000" pitchFamily="2" charset="-127"/>
+              </a:rPr>
+              <a:t>언어 변경이 가능하게 제작 하였습니다</a:t>
+            </a:r>
+            <a:endParaRPr lang="en-US" altLang="ko-KR" sz="1600" dirty="0">
+              <a:solidFill>
+                <a:schemeClr val="bg1"/>
+              </a:solidFill>
+              <a:latin typeface="넥슨Lv2고딕 Light" panose="00000300000000000000" pitchFamily="2" charset="-127"/>
+              <a:ea typeface="넥슨Lv2고딕 Light" panose="00000300000000000000" pitchFamily="2" charset="-127"/>
+            </a:endParaRPr>
+          </a:p>
+        </p:txBody>
+      </p:sp>
+      <p:pic>
+        <p:nvPicPr>
+          <p:cNvPr id="3" name="그림 2">
+            <a:extLst>
+              <a:ext uri="{FF2B5EF4-FFF2-40B4-BE49-F238E27FC236}">
+                <a16:creationId xmlns:a16="http://schemas.microsoft.com/office/drawing/2014/main" id="{D750A901-D24C-D2CD-731C-30B966CF1E88}"/>
+              </a:ext>
+            </a:extLst>
+          </p:cNvPr>
+          <p:cNvPicPr>
+            <a:picLocks noChangeAspect="1"/>
+          </p:cNvPicPr>
+          <p:nvPr/>
+        </p:nvPicPr>
+        <p:blipFill rotWithShape="1">
+          <a:blip r:embed="rId2"/>
+          <a:srcRect t="-1" b="21088"/>
+          <a:stretch/>
+        </p:blipFill>
+        <p:spPr>
+          <a:xfrm>
+            <a:off x="1774826" y="3733439"/>
+            <a:ext cx="4321174" cy="2210161"/>
+          </a:xfrm>
+          <a:prstGeom prst="rect">
+            <a:avLst/>
+          </a:prstGeom>
+        </p:spPr>
+      </p:pic>
+      <p:sp>
+        <p:nvSpPr>
+          <p:cNvPr id="6" name="사각형: 둥근 모서리 5">
+            <a:extLst>
+              <a:ext uri="{FF2B5EF4-FFF2-40B4-BE49-F238E27FC236}">
+                <a16:creationId xmlns:a16="http://schemas.microsoft.com/office/drawing/2014/main" id="{2DCF00B3-3C8F-94D6-5376-62FC61FF794F}"/>
+              </a:ext>
+            </a:extLst>
+          </p:cNvPr>
+          <p:cNvSpPr/>
+          <p:nvPr/>
+        </p:nvSpPr>
+        <p:spPr>
+          <a:xfrm>
+            <a:off x="7177881" y="1628775"/>
+            <a:ext cx="2157413" cy="4314825"/>
+          </a:xfrm>
+          <a:prstGeom prst="roundRect">
+            <a:avLst>
+              <a:gd name="adj" fmla="val 7635"/>
+            </a:avLst>
+          </a:prstGeom>
+          <a:blipFill dpi="0" rotWithShape="1">
+            <a:blip r:embed="rId3">
+              <a:extLst>
+                <a:ext uri="{28A0092B-C50C-407E-A947-70E740481C1C}">
+                  <a14:useLocalDpi xmlns:a14="http://schemas.microsoft.com/office/drawing/2010/main" val="0"/>
+                </a:ext>
+              </a:extLst>
+            </a:blip>
+            <a:srcRect/>
+            <a:stretch>
+              <a:fillRect/>
+            </a:stretch>
+          </a:blipFill>
+          <a:ln>
+            <a:noFill/>
+          </a:ln>
+        </p:spPr>
+        <p:style>
+          <a:lnRef idx="2">
+            <a:schemeClr val="accent1">
+              <a:shade val="50000"/>
+            </a:schemeClr>
+          </a:lnRef>
+          <a:fillRef idx="1">
+            <a:schemeClr val="accent1"/>
+          </a:fillRef>
+          <a:effectRef idx="0">
+            <a:schemeClr val="accent1"/>
+          </a:effectRef>
+          <a:fontRef idx="minor">
+            <a:schemeClr val="lt1"/>
+          </a:fontRef>
+        </p:style>
+        <p:txBody>
+          <a:bodyPr rtlCol="0" anchor="ctr"/>
+          <a:lstStyle/>
+          <a:p>
+            <a:pPr algn="ctr"/>
+            <a:endParaRPr lang="ko-KR" altLang="en-US"/>
           </a:p>
         </p:txBody>
       </p:sp>
     </p:spTree>
     <p:extLst>
       <p:ext uri="{BB962C8B-B14F-4D97-AF65-F5344CB8AC3E}">
-        <p14:creationId xmlns:p14="http://schemas.microsoft.com/office/powerpoint/2010/main" val="2839138623"/>
+        <p14:creationId xmlns:p14="http://schemas.microsoft.com/office/powerpoint/2010/main" val="2882831399"/>
       </p:ext>
     </p:extLst>
   </p:cSld>
@@ -5981,8 +6088,8 @@
         </p:nvSpPr>
         <p:spPr>
           <a:xfrm>
-            <a:off x="1680310" y="1155929"/>
-            <a:ext cx="3733800" cy="584775"/>
+            <a:off x="1680310" y="1469196"/>
+            <a:ext cx="6650890" cy="1200329"/>
           </a:xfrm>
           <a:prstGeom prst="rect">
             <a:avLst/>
@@ -5996,16 +6103,16 @@
           <a:lstStyle/>
           <a:p>
             <a:r>
-              <a:rPr lang="ko-KR" altLang="en-US" sz="3200" dirty="0">
+              <a:rPr lang="ko-KR" altLang="en-US" sz="7200" dirty="0">
                 <a:solidFill>
                   <a:schemeClr val="bg1"/>
                 </a:solidFill>
                 <a:latin typeface="넥슨Lv2고딕 Bold" panose="00000800000000000000" pitchFamily="2" charset="-127"/>
                 <a:ea typeface="넥슨Lv2고딕 Bold" panose="00000800000000000000" pitchFamily="2" charset="-127"/>
               </a:rPr>
-              <a:t>플레이어</a:t>
-            </a:r>
-            <a:endParaRPr lang="en-US" altLang="ko-KR" sz="3200" dirty="0">
+              <a:t>스크립트</a:t>
+            </a:r>
+            <a:endParaRPr lang="en-US" altLang="ko-KR" sz="7200" dirty="0">
               <a:solidFill>
                 <a:schemeClr val="bg1"/>
               </a:solidFill>
@@ -6017,72 +6124,20 @@
       </p:sp>
       <p:sp>
         <p:nvSpPr>
-          <p:cNvPr id="16" name="직사각형 15">
-            <a:extLst>
-              <a:ext uri="{FF2B5EF4-FFF2-40B4-BE49-F238E27FC236}">
-                <a16:creationId xmlns:a16="http://schemas.microsoft.com/office/drawing/2014/main" id="{06D4D73C-002A-B871-4E9F-3C2F2EFA95F6}"/>
-              </a:ext>
-            </a:extLst>
-          </p:cNvPr>
-          <p:cNvSpPr/>
+          <p:cNvPr id="11" name="TextBox 10">
+            <a:extLst>
+              <a:ext uri="{FF2B5EF4-FFF2-40B4-BE49-F238E27FC236}">
+                <a16:creationId xmlns:a16="http://schemas.microsoft.com/office/drawing/2014/main" id="{E10A1302-F34C-6112-2BB3-EF054A096FF3}"/>
+              </a:ext>
+            </a:extLst>
+          </p:cNvPr>
+          <p:cNvSpPr txBox="1"/>
           <p:nvPr/>
         </p:nvSpPr>
         <p:spPr>
           <a:xfrm>
-            <a:off x="1660524" y="1262063"/>
-            <a:ext cx="45719" cy="366711"/>
-          </a:xfrm>
-          <a:prstGeom prst="rect">
-            <a:avLst/>
-          </a:prstGeom>
-          <a:solidFill>
-            <a:schemeClr val="bg1"/>
-          </a:solidFill>
-          <a:ln>
-            <a:noFill/>
-          </a:ln>
-        </p:spPr>
-        <p:style>
-          <a:lnRef idx="2">
-            <a:schemeClr val="accent1">
-              <a:shade val="50000"/>
-            </a:schemeClr>
-          </a:lnRef>
-          <a:fillRef idx="1">
-            <a:schemeClr val="accent1"/>
-          </a:fillRef>
-          <a:effectRef idx="0">
-            <a:schemeClr val="accent1"/>
-          </a:effectRef>
-          <a:fontRef idx="minor">
-            <a:schemeClr val="lt1"/>
-          </a:fontRef>
-        </p:style>
-        <p:txBody>
-          <a:bodyPr rtlCol="0" anchor="ctr"/>
-          <a:lstStyle/>
-          <a:p>
-            <a:pPr algn="ctr"/>
-            <a:endParaRPr lang="ko-KR" altLang="en-US"/>
-          </a:p>
-        </p:txBody>
-      </p:sp>
-      <p:sp>
-        <p:nvSpPr>
-          <p:cNvPr id="19" name="TextBox 18">
-            <a:extLst>
-              <a:ext uri="{FF2B5EF4-FFF2-40B4-BE49-F238E27FC236}">
-                <a16:creationId xmlns:a16="http://schemas.microsoft.com/office/drawing/2014/main" id="{5316A27D-F818-472F-350E-CD328A0375DC}"/>
-              </a:ext>
-            </a:extLst>
-          </p:cNvPr>
-          <p:cNvSpPr txBox="1"/>
-          <p:nvPr/>
-        </p:nvSpPr>
-        <p:spPr>
-          <a:xfrm>
-            <a:off x="1680309" y="2074745"/>
-            <a:ext cx="8736865" cy="2277034"/>
+            <a:off x="1657349" y="3143250"/>
+            <a:ext cx="4321175" cy="2984343"/>
           </a:xfrm>
           <a:prstGeom prst="rect">
             <a:avLst/>
@@ -6101,16 +6156,33 @@
               </a:lnSpc>
             </a:pPr>
             <a:r>
-              <a:rPr lang="ko-KR" altLang="en-US" sz="1600" dirty="0">
-                <a:solidFill>
-                  <a:schemeClr val="bg1"/>
-                </a:solidFill>
-                <a:latin typeface="넥슨Lv2고딕 Light" panose="00000300000000000000" pitchFamily="2" charset="-127"/>
-                <a:ea typeface="넥슨Lv2고딕 Light" panose="00000300000000000000" pitchFamily="2" charset="-127"/>
-              </a:rPr>
-              <a:t>플레이어의 정보를 가지고 있으며</a:t>
-            </a:r>
-            <a:endParaRPr lang="en-US" altLang="ko-KR" sz="1600" dirty="0">
+              <a:rPr lang="ko-KR" altLang="en-US" sz="3200" dirty="0">
+                <a:solidFill>
+                  <a:schemeClr val="bg1"/>
+                </a:solidFill>
+                <a:latin typeface="넥슨Lv2고딕 Light" panose="00000300000000000000" pitchFamily="2" charset="-127"/>
+                <a:ea typeface="넥슨Lv2고딕 Light" panose="00000300000000000000" pitchFamily="2" charset="-127"/>
+              </a:rPr>
+              <a:t>플레이어</a:t>
+            </a:r>
+          </a:p>
+          <a:p>
+            <a:pPr>
+              <a:lnSpc>
+                <a:spcPct val="150000"/>
+              </a:lnSpc>
+            </a:pPr>
+            <a:r>
+              <a:rPr lang="ko-KR" altLang="en-US" sz="3200" dirty="0">
+                <a:solidFill>
+                  <a:schemeClr val="bg1"/>
+                </a:solidFill>
+                <a:latin typeface="넥슨Lv2고딕 Light" panose="00000300000000000000" pitchFamily="2" charset="-127"/>
+                <a:ea typeface="넥슨Lv2고딕 Light" panose="00000300000000000000" pitchFamily="2" charset="-127"/>
+              </a:rPr>
+              <a:t>전투</a:t>
+            </a:r>
+            <a:endParaRPr lang="en-US" altLang="ko-KR" sz="3200" dirty="0">
               <a:solidFill>
                 <a:schemeClr val="bg1"/>
               </a:solidFill>
@@ -6125,56 +6197,36 @@
               </a:lnSpc>
             </a:pPr>
             <a:r>
-              <a:rPr lang="ko-KR" altLang="en-US" sz="1600" dirty="0">
-                <a:solidFill>
-                  <a:schemeClr val="bg1"/>
-                </a:solidFill>
-                <a:latin typeface="넥슨Lv2고딕 Light" panose="00000300000000000000" pitchFamily="2" charset="-127"/>
-                <a:ea typeface="넥슨Lv2고딕 Light" panose="00000300000000000000" pitchFamily="2" charset="-127"/>
-              </a:rPr>
-              <a:t>변경에 따른</a:t>
-            </a:r>
-            <a:r>
-              <a:rPr lang="en-US" altLang="ko-KR" sz="1600" dirty="0">
-                <a:solidFill>
-                  <a:schemeClr val="bg1"/>
-                </a:solidFill>
-                <a:latin typeface="넥슨Lv2고딕 Light" panose="00000300000000000000" pitchFamily="2" charset="-127"/>
-                <a:ea typeface="넥슨Lv2고딕 Light" panose="00000300000000000000" pitchFamily="2" charset="-127"/>
-              </a:rPr>
-              <a:t> </a:t>
-            </a:r>
-            <a:r>
-              <a:rPr lang="ko-KR" altLang="en-US" sz="1600" dirty="0">
-                <a:solidFill>
-                  <a:schemeClr val="bg1"/>
-                </a:solidFill>
-                <a:latin typeface="넥슨Lv2고딕 Light" panose="00000300000000000000" pitchFamily="2" charset="-127"/>
-                <a:ea typeface="넥슨Lv2고딕 Light" panose="00000300000000000000" pitchFamily="2" charset="-127"/>
-              </a:rPr>
-              <a:t>이벤트를 발생시키는</a:t>
-            </a:r>
-            <a:r>
-              <a:rPr lang="en-US" altLang="ko-KR" sz="1600" dirty="0">
-                <a:solidFill>
-                  <a:schemeClr val="bg1"/>
-                </a:solidFill>
-                <a:latin typeface="넥슨Lv2고딕 Light" panose="00000300000000000000" pitchFamily="2" charset="-127"/>
-                <a:ea typeface="넥슨Lv2고딕 Light" panose="00000300000000000000" pitchFamily="2" charset="-127"/>
-              </a:rPr>
-              <a:t> </a:t>
-            </a:r>
-            <a:r>
-              <a:rPr lang="ko-KR" altLang="en-US" sz="1600" dirty="0">
-                <a:solidFill>
-                  <a:schemeClr val="bg1"/>
-                </a:solidFill>
-                <a:latin typeface="넥슨Lv2고딕 Light" panose="00000300000000000000" pitchFamily="2" charset="-127"/>
-                <a:ea typeface="넥슨Lv2고딕 Light" panose="00000300000000000000" pitchFamily="2" charset="-127"/>
-              </a:rPr>
-              <a:t>클래스</a:t>
-            </a:r>
-            <a:endParaRPr lang="en-US" altLang="ko-KR" sz="1600" dirty="0">
+              <a:rPr lang="ko-KR" altLang="en-US" sz="3200" dirty="0">
+                <a:solidFill>
+                  <a:schemeClr val="bg1"/>
+                </a:solidFill>
+                <a:latin typeface="넥슨Lv2고딕 Light" panose="00000300000000000000" pitchFamily="2" charset="-127"/>
+                <a:ea typeface="넥슨Lv2고딕 Light" panose="00000300000000000000" pitchFamily="2" charset="-127"/>
+              </a:rPr>
+              <a:t>세이브</a:t>
+            </a:r>
+            <a:r>
+              <a:rPr lang="en-US" altLang="ko-KR" sz="3200" dirty="0">
+                <a:solidFill>
+                  <a:schemeClr val="bg1"/>
+                </a:solidFill>
+                <a:latin typeface="넥슨Lv2고딕 Light" panose="00000300000000000000" pitchFamily="2" charset="-127"/>
+                <a:ea typeface="넥슨Lv2고딕 Light" panose="00000300000000000000" pitchFamily="2" charset="-127"/>
+              </a:rPr>
+              <a:t>/</a:t>
+            </a:r>
+            <a:r>
+              <a:rPr lang="ko-KR" altLang="en-US" sz="3200" dirty="0">
+                <a:solidFill>
+                  <a:schemeClr val="bg1"/>
+                </a:solidFill>
+                <a:latin typeface="넥슨Lv2고딕 Light" panose="00000300000000000000" pitchFamily="2" charset="-127"/>
+                <a:ea typeface="넥슨Lv2고딕 Light" panose="00000300000000000000" pitchFamily="2" charset="-127"/>
+              </a:rPr>
+              <a:t>로드</a:t>
+            </a:r>
+            <a:endParaRPr lang="en-US" altLang="ko-KR" sz="3200" dirty="0">
               <a:solidFill>
                 <a:schemeClr val="bg1"/>
               </a:solidFill>
@@ -6188,204 +6240,23 @@
                 <a:spcPct val="150000"/>
               </a:lnSpc>
             </a:pPr>
-            <a:endParaRPr lang="en-US" altLang="ko-KR" sz="1600" dirty="0">
-              <a:solidFill>
-                <a:schemeClr val="bg1"/>
-              </a:solidFill>
-              <a:latin typeface="넥슨Lv2고딕 Light" panose="00000300000000000000" pitchFamily="2" charset="-127"/>
-              <a:ea typeface="넥슨Lv2고딕 Light" panose="00000300000000000000" pitchFamily="2" charset="-127"/>
-            </a:endParaRPr>
-          </a:p>
-          <a:p>
-            <a:pPr>
-              <a:lnSpc>
-                <a:spcPct val="150000"/>
-              </a:lnSpc>
-            </a:pPr>
-            <a:r>
-              <a:rPr lang="ko-KR" altLang="en-US" sz="1600" dirty="0">
-                <a:solidFill>
-                  <a:schemeClr val="bg1"/>
-                </a:solidFill>
-                <a:latin typeface="넥슨Lv2고딕 Light" panose="00000300000000000000" pitchFamily="2" charset="-127"/>
-                <a:ea typeface="넥슨Lv2고딕 Light" panose="00000300000000000000" pitchFamily="2" charset="-127"/>
-              </a:rPr>
-              <a:t>코인의 값이 </a:t>
-            </a:r>
-            <a:r>
-              <a:rPr lang="en-US" altLang="ko-KR" sz="1600" dirty="0">
-                <a:solidFill>
-                  <a:schemeClr val="bg1"/>
-                </a:solidFill>
-                <a:latin typeface="넥슨Lv2고딕 Light" panose="00000300000000000000" pitchFamily="2" charset="-127"/>
-                <a:ea typeface="넥슨Lv2고딕 Light" panose="00000300000000000000" pitchFamily="2" charset="-127"/>
-              </a:rPr>
-              <a:t>0 </a:t>
-            </a:r>
-            <a:r>
-              <a:rPr lang="ko-KR" altLang="en-US" sz="1600" dirty="0">
-                <a:solidFill>
-                  <a:schemeClr val="bg1"/>
-                </a:solidFill>
-                <a:latin typeface="넥슨Lv2고딕 Light" panose="00000300000000000000" pitchFamily="2" charset="-127"/>
-                <a:ea typeface="넥슨Lv2고딕 Light" panose="00000300000000000000" pitchFamily="2" charset="-127"/>
-              </a:rPr>
-              <a:t>밑으로 내려가지 않도록</a:t>
-            </a:r>
-            <a:endParaRPr lang="en-US" altLang="ko-KR" sz="1600" dirty="0">
-              <a:solidFill>
-                <a:schemeClr val="bg1"/>
-              </a:solidFill>
-              <a:latin typeface="넥슨Lv2고딕 Light" panose="00000300000000000000" pitchFamily="2" charset="-127"/>
-              <a:ea typeface="넥슨Lv2고딕 Light" panose="00000300000000000000" pitchFamily="2" charset="-127"/>
-            </a:endParaRPr>
-          </a:p>
-          <a:p>
-            <a:pPr>
-              <a:lnSpc>
-                <a:spcPct val="150000"/>
-              </a:lnSpc>
-            </a:pPr>
-            <a:r>
-              <a:rPr lang="en-US" altLang="ko-KR" sz="1600" dirty="0">
-                <a:solidFill>
-                  <a:schemeClr val="bg1"/>
-                </a:solidFill>
-                <a:latin typeface="넥슨Lv2고딕 Light" panose="00000300000000000000" pitchFamily="2" charset="-127"/>
-                <a:ea typeface="넥슨Lv2고딕 Light" panose="00000300000000000000" pitchFamily="2" charset="-127"/>
-              </a:rPr>
-              <a:t>Max </a:t>
-            </a:r>
-            <a:r>
-              <a:rPr lang="ko-KR" altLang="en-US" sz="1600" dirty="0">
-                <a:solidFill>
-                  <a:schemeClr val="bg1"/>
-                </a:solidFill>
-                <a:latin typeface="넥슨Lv2고딕 Light" panose="00000300000000000000" pitchFamily="2" charset="-127"/>
-                <a:ea typeface="넥슨Lv2고딕 Light" panose="00000300000000000000" pitchFamily="2" charset="-127"/>
-              </a:rPr>
-              <a:t>함수를 이용해 처리하며</a:t>
-            </a:r>
-            <a:endParaRPr lang="en-US" altLang="ko-KR" sz="1600" dirty="0">
-              <a:solidFill>
-                <a:schemeClr val="bg1"/>
-              </a:solidFill>
-              <a:latin typeface="넥슨Lv2고딕 Light" panose="00000300000000000000" pitchFamily="2" charset="-127"/>
-              <a:ea typeface="넥슨Lv2고딕 Light" panose="00000300000000000000" pitchFamily="2" charset="-127"/>
-            </a:endParaRPr>
-          </a:p>
-          <a:p>
-            <a:pPr>
-              <a:lnSpc>
-                <a:spcPct val="150000"/>
-              </a:lnSpc>
-            </a:pPr>
-            <a:r>
-              <a:rPr lang="ko-KR" altLang="en-US" sz="1600" dirty="0">
-                <a:solidFill>
-                  <a:schemeClr val="bg1"/>
-                </a:solidFill>
-                <a:latin typeface="넥슨Lv2고딕 Light" panose="00000300000000000000" pitchFamily="2" charset="-127"/>
-                <a:ea typeface="넥슨Lv2고딕 Light" panose="00000300000000000000" pitchFamily="2" charset="-127"/>
-              </a:rPr>
-              <a:t>이후 이벤트를 발생시킨다</a:t>
-            </a:r>
-            <a:endParaRPr lang="en-US" altLang="ko-KR" sz="1600" dirty="0">
-              <a:solidFill>
-                <a:schemeClr val="bg1"/>
-              </a:solidFill>
-              <a:latin typeface="넥슨Lv2고딕 Light" panose="00000300000000000000" pitchFamily="2" charset="-127"/>
-              <a:ea typeface="넥슨Lv2고딕 Light" panose="00000300000000000000" pitchFamily="2" charset="-127"/>
-            </a:endParaRPr>
-          </a:p>
-        </p:txBody>
-      </p:sp>
-      <p:pic>
-        <p:nvPicPr>
-          <p:cNvPr id="7" name="그림 6">
-            <a:extLst>
-              <a:ext uri="{FF2B5EF4-FFF2-40B4-BE49-F238E27FC236}">
-                <a16:creationId xmlns:a16="http://schemas.microsoft.com/office/drawing/2014/main" id="{DC5CEB0A-B6C1-C993-2921-E0F6BDB78D49}"/>
-              </a:ext>
-            </a:extLst>
-          </p:cNvPr>
-          <p:cNvPicPr>
-            <a:picLocks noChangeAspect="1"/>
-          </p:cNvPicPr>
-          <p:nvPr/>
-        </p:nvPicPr>
-        <p:blipFill>
-          <a:blip r:embed="rId2"/>
-          <a:stretch>
-            <a:fillRect/>
-          </a:stretch>
-        </p:blipFill>
-        <p:spPr>
-          <a:xfrm>
-            <a:off x="6678201" y="1628774"/>
-            <a:ext cx="3738973" cy="4508089"/>
-          </a:xfrm>
-          <a:prstGeom prst="rect">
-            <a:avLst/>
-          </a:prstGeom>
-        </p:spPr>
-      </p:pic>
-      <p:sp>
-        <p:nvSpPr>
-          <p:cNvPr id="8" name="직사각형 7">
-            <a:extLst>
-              <a:ext uri="{FF2B5EF4-FFF2-40B4-BE49-F238E27FC236}">
-                <a16:creationId xmlns:a16="http://schemas.microsoft.com/office/drawing/2014/main" id="{E6A5C31E-73AD-B758-FB1B-EEA83E88CFF8}"/>
-              </a:ext>
-            </a:extLst>
-          </p:cNvPr>
-          <p:cNvSpPr/>
-          <p:nvPr/>
-        </p:nvSpPr>
-        <p:spPr>
-          <a:xfrm>
-            <a:off x="7378700" y="4133850"/>
-            <a:ext cx="2927350" cy="523875"/>
-          </a:xfrm>
-          <a:prstGeom prst="rect">
-            <a:avLst/>
-          </a:prstGeom>
-          <a:noFill/>
-          <a:ln>
-            <a:solidFill>
-              <a:srgbClr val="EA473B"/>
-            </a:solidFill>
-          </a:ln>
-        </p:spPr>
-        <p:style>
-          <a:lnRef idx="2">
-            <a:schemeClr val="accent1">
-              <a:shade val="50000"/>
-            </a:schemeClr>
-          </a:lnRef>
-          <a:fillRef idx="1">
-            <a:schemeClr val="accent1"/>
-          </a:fillRef>
-          <a:effectRef idx="0">
-            <a:schemeClr val="accent1"/>
-          </a:effectRef>
-          <a:fontRef idx="minor">
-            <a:schemeClr val="lt1"/>
-          </a:fontRef>
-        </p:style>
-        <p:txBody>
-          <a:bodyPr rtlCol="0" anchor="ctr"/>
-          <a:lstStyle/>
-          <a:p>
-            <a:pPr algn="ctr"/>
-            <a:endParaRPr lang="ko-KR" altLang="en-US"/>
+            <a:r>
+              <a:rPr lang="ko-KR" altLang="en-US" sz="3200" dirty="0">
+                <a:solidFill>
+                  <a:schemeClr val="bg1"/>
+                </a:solidFill>
+                <a:latin typeface="넥슨Lv2고딕 Light" panose="00000300000000000000" pitchFamily="2" charset="-127"/>
+                <a:ea typeface="넥슨Lv2고딕 Light" panose="00000300000000000000" pitchFamily="2" charset="-127"/>
+              </a:rPr>
+              <a:t>싱글 톤 사용 이유</a:t>
+            </a:r>
           </a:p>
         </p:txBody>
       </p:sp>
     </p:spTree>
     <p:extLst>
       <p:ext uri="{BB962C8B-B14F-4D97-AF65-F5344CB8AC3E}">
-        <p14:creationId xmlns:p14="http://schemas.microsoft.com/office/powerpoint/2010/main" val="1560351109"/>
+        <p14:creationId xmlns:p14="http://schemas.microsoft.com/office/powerpoint/2010/main" val="2839138623"/>
       </p:ext>
     </p:extLst>
   </p:cSld>
@@ -6420,36 +6291,6 @@
           <a:chExt cx="0" cy="0"/>
         </a:xfrm>
       </p:grpSpPr>
-      <p:pic>
-        <p:nvPicPr>
-          <p:cNvPr id="3" name="그림 2">
-            <a:extLst>
-              <a:ext uri="{FF2B5EF4-FFF2-40B4-BE49-F238E27FC236}">
-                <a16:creationId xmlns:a16="http://schemas.microsoft.com/office/drawing/2014/main" id="{52FBCEAC-FCFE-5140-5A8E-0EB02D1023C1}"/>
-              </a:ext>
-            </a:extLst>
-          </p:cNvPr>
-          <p:cNvPicPr>
-            <a:picLocks noChangeAspect="1"/>
-          </p:cNvPicPr>
-          <p:nvPr/>
-        </p:nvPicPr>
-        <p:blipFill>
-          <a:blip r:embed="rId2"/>
-          <a:stretch>
-            <a:fillRect/>
-          </a:stretch>
-        </p:blipFill>
-        <p:spPr>
-          <a:xfrm>
-            <a:off x="7473692" y="1628775"/>
-            <a:ext cx="2934109" cy="3200847"/>
-          </a:xfrm>
-          <a:prstGeom prst="rect">
-            <a:avLst/>
-          </a:prstGeom>
-        </p:spPr>
-      </p:pic>
       <p:sp>
         <p:nvSpPr>
           <p:cNvPr id="15" name="TextBox 14">
@@ -6486,7 +6327,7 @@
                 <a:latin typeface="넥슨Lv2고딕 Bold" panose="00000800000000000000" pitchFamily="2" charset="-127"/>
                 <a:ea typeface="넥슨Lv2고딕 Bold" panose="00000800000000000000" pitchFamily="2" charset="-127"/>
               </a:rPr>
-              <a:t>전투</a:t>
+              <a:t>플레이어</a:t>
             </a:r>
             <a:endParaRPr lang="en-US" altLang="ko-KR" sz="3200" dirty="0">
               <a:solidFill>
@@ -6565,7 +6406,7 @@
         <p:spPr>
           <a:xfrm>
             <a:off x="1680309" y="2074745"/>
-            <a:ext cx="8736865" cy="1538370"/>
+            <a:ext cx="8736865" cy="2277034"/>
           </a:xfrm>
           <a:prstGeom prst="rect">
             <a:avLst/>
@@ -6591,7 +6432,7 @@
                 <a:latin typeface="넥슨Lv2고딕 Light" panose="00000300000000000000" pitchFamily="2" charset="-127"/>
                 <a:ea typeface="넥슨Lv2고딕 Light" panose="00000300000000000000" pitchFamily="2" charset="-127"/>
               </a:rPr>
-              <a:t>공격이 끝난 이후 턴종료를 알리기 위해</a:t>
+              <a:t>플레이어의 정보를 가지고 있으며</a:t>
             </a:r>
             <a:endParaRPr lang="en-US" altLang="ko-KR" sz="1600" dirty="0">
               <a:solidFill>
@@ -6608,6 +6449,16 @@
               </a:lnSpc>
             </a:pPr>
             <a:r>
+              <a:rPr lang="ko-KR" altLang="en-US" sz="1600" dirty="0">
+                <a:solidFill>
+                  <a:schemeClr val="bg1"/>
+                </a:solidFill>
+                <a:latin typeface="넥슨Lv2고딕 Light" panose="00000300000000000000" pitchFamily="2" charset="-127"/>
+                <a:ea typeface="넥슨Lv2고딕 Light" panose="00000300000000000000" pitchFamily="2" charset="-127"/>
+              </a:rPr>
+              <a:t>변경에 따른</a:t>
+            </a:r>
+            <a:r>
               <a:rPr lang="en-US" altLang="ko-KR" sz="1600" dirty="0">
                 <a:solidFill>
                   <a:schemeClr val="bg1"/>
@@ -6618,14 +6469,14 @@
               <a:t> </a:t>
             </a:r>
             <a:r>
-              <a:rPr lang="en-US" altLang="ko-KR" sz="1600" dirty="0" err="1">
-                <a:solidFill>
-                  <a:schemeClr val="bg1"/>
-                </a:solidFill>
-                <a:latin typeface="넥슨Lv2고딕 Light" panose="00000300000000000000" pitchFamily="2" charset="-127"/>
-                <a:ea typeface="넥슨Lv2고딕 Light" panose="00000300000000000000" pitchFamily="2" charset="-127"/>
-              </a:rPr>
-              <a:t>TurnEnd</a:t>
+              <a:rPr lang="ko-KR" altLang="en-US" sz="1600" dirty="0">
+                <a:solidFill>
+                  <a:schemeClr val="bg1"/>
+                </a:solidFill>
+                <a:latin typeface="넥슨Lv2고딕 Light" panose="00000300000000000000" pitchFamily="2" charset="-127"/>
+                <a:ea typeface="넥슨Lv2고딕 Light" panose="00000300000000000000" pitchFamily="2" charset="-127"/>
+              </a:rPr>
+              <a:t>이벤트를 발생시키는</a:t>
             </a:r>
             <a:r>
               <a:rPr lang="en-US" altLang="ko-KR" sz="1600" dirty="0">
@@ -6645,24 +6496,7 @@
                 <a:latin typeface="넥슨Lv2고딕 Light" panose="00000300000000000000" pitchFamily="2" charset="-127"/>
                 <a:ea typeface="넥슨Lv2고딕 Light" panose="00000300000000000000" pitchFamily="2" charset="-127"/>
               </a:rPr>
-              <a:t>함수를 콜 백 하도록 만들었으며</a:t>
-            </a:r>
-          </a:p>
-          <a:p>
-            <a:pPr>
-              <a:lnSpc>
-                <a:spcPct val="150000"/>
-              </a:lnSpc>
-            </a:pPr>
-            <a:r>
-              <a:rPr lang="ko-KR" altLang="en-US" sz="1600" dirty="0">
-                <a:solidFill>
-                  <a:schemeClr val="bg1"/>
-                </a:solidFill>
-                <a:latin typeface="넥슨Lv2고딕 Light" panose="00000300000000000000" pitchFamily="2" charset="-127"/>
-                <a:ea typeface="넥슨Lv2고딕 Light" panose="00000300000000000000" pitchFamily="2" charset="-127"/>
-              </a:rPr>
-              <a:t>플레이어 또는 적이 죽을 때까지</a:t>
+              <a:t>클래스</a:t>
             </a:r>
             <a:endParaRPr lang="en-US" altLang="ko-KR" sz="1600" dirty="0">
               <a:solidFill>
@@ -6678,16 +6512,6 @@
                 <a:spcPct val="150000"/>
               </a:lnSpc>
             </a:pPr>
-            <a:r>
-              <a:rPr lang="ko-KR" altLang="en-US" sz="1600" dirty="0">
-                <a:solidFill>
-                  <a:schemeClr val="bg1"/>
-                </a:solidFill>
-                <a:latin typeface="넥슨Lv2고딕 Light" panose="00000300000000000000" pitchFamily="2" charset="-127"/>
-                <a:ea typeface="넥슨Lv2고딕 Light" panose="00000300000000000000" pitchFamily="2" charset="-127"/>
-              </a:rPr>
-              <a:t>재귀적으로 번갈아 가며 호출하며 작동한다</a:t>
-            </a:r>
             <a:endParaRPr lang="en-US" altLang="ko-KR" sz="1600" dirty="0">
               <a:solidFill>
                 <a:schemeClr val="bg1"/>
@@ -6696,8 +6520,140 @@
               <a:ea typeface="넥슨Lv2고딕 Light" panose="00000300000000000000" pitchFamily="2" charset="-127"/>
             </a:endParaRPr>
           </a:p>
-        </p:txBody>
-      </p:sp>
+          <a:p>
+            <a:pPr>
+              <a:lnSpc>
+                <a:spcPct val="150000"/>
+              </a:lnSpc>
+            </a:pPr>
+            <a:r>
+              <a:rPr lang="ko-KR" altLang="en-US" sz="1600" dirty="0">
+                <a:solidFill>
+                  <a:schemeClr val="bg1"/>
+                </a:solidFill>
+                <a:latin typeface="넥슨Lv2고딕 Light" panose="00000300000000000000" pitchFamily="2" charset="-127"/>
+                <a:ea typeface="넥슨Lv2고딕 Light" panose="00000300000000000000" pitchFamily="2" charset="-127"/>
+              </a:rPr>
+              <a:t>코인의 값이 </a:t>
+            </a:r>
+            <a:r>
+              <a:rPr lang="en-US" altLang="ko-KR" sz="1600" dirty="0">
+                <a:solidFill>
+                  <a:schemeClr val="bg1"/>
+                </a:solidFill>
+                <a:latin typeface="넥슨Lv2고딕 Light" panose="00000300000000000000" pitchFamily="2" charset="-127"/>
+                <a:ea typeface="넥슨Lv2고딕 Light" panose="00000300000000000000" pitchFamily="2" charset="-127"/>
+              </a:rPr>
+              <a:t>0 </a:t>
+            </a:r>
+            <a:r>
+              <a:rPr lang="ko-KR" altLang="en-US" sz="1600" dirty="0">
+                <a:solidFill>
+                  <a:schemeClr val="bg1"/>
+                </a:solidFill>
+                <a:latin typeface="넥슨Lv2고딕 Light" panose="00000300000000000000" pitchFamily="2" charset="-127"/>
+                <a:ea typeface="넥슨Lv2고딕 Light" panose="00000300000000000000" pitchFamily="2" charset="-127"/>
+              </a:rPr>
+              <a:t>밑으로 내려가지 않도록</a:t>
+            </a:r>
+            <a:endParaRPr lang="en-US" altLang="ko-KR" sz="1600" dirty="0">
+              <a:solidFill>
+                <a:schemeClr val="bg1"/>
+              </a:solidFill>
+              <a:latin typeface="넥슨Lv2고딕 Light" panose="00000300000000000000" pitchFamily="2" charset="-127"/>
+              <a:ea typeface="넥슨Lv2고딕 Light" panose="00000300000000000000" pitchFamily="2" charset="-127"/>
+            </a:endParaRPr>
+          </a:p>
+          <a:p>
+            <a:pPr>
+              <a:lnSpc>
+                <a:spcPct val="150000"/>
+              </a:lnSpc>
+            </a:pPr>
+            <a:r>
+              <a:rPr lang="en-US" altLang="ko-KR" sz="1600" dirty="0">
+                <a:solidFill>
+                  <a:schemeClr val="bg1"/>
+                </a:solidFill>
+                <a:latin typeface="넥슨Lv2고딕 Light" panose="00000300000000000000" pitchFamily="2" charset="-127"/>
+                <a:ea typeface="넥슨Lv2고딕 Light" panose="00000300000000000000" pitchFamily="2" charset="-127"/>
+              </a:rPr>
+              <a:t>Max </a:t>
+            </a:r>
+            <a:r>
+              <a:rPr lang="ko-KR" altLang="en-US" sz="1600" dirty="0">
+                <a:solidFill>
+                  <a:schemeClr val="bg1"/>
+                </a:solidFill>
+                <a:latin typeface="넥슨Lv2고딕 Light" panose="00000300000000000000" pitchFamily="2" charset="-127"/>
+                <a:ea typeface="넥슨Lv2고딕 Light" panose="00000300000000000000" pitchFamily="2" charset="-127"/>
+              </a:rPr>
+              <a:t>함수를 이용해 처리하며</a:t>
+            </a:r>
+            <a:endParaRPr lang="en-US" altLang="ko-KR" sz="1600" dirty="0">
+              <a:solidFill>
+                <a:schemeClr val="bg1"/>
+              </a:solidFill>
+              <a:latin typeface="넥슨Lv2고딕 Light" panose="00000300000000000000" pitchFamily="2" charset="-127"/>
+              <a:ea typeface="넥슨Lv2고딕 Light" panose="00000300000000000000" pitchFamily="2" charset="-127"/>
+            </a:endParaRPr>
+          </a:p>
+          <a:p>
+            <a:pPr>
+              <a:lnSpc>
+                <a:spcPct val="150000"/>
+              </a:lnSpc>
+            </a:pPr>
+            <a:r>
+              <a:rPr lang="ko-KR" altLang="en-US" sz="1600" dirty="0">
+                <a:solidFill>
+                  <a:schemeClr val="bg1"/>
+                </a:solidFill>
+                <a:latin typeface="넥슨Lv2고딕 Light" panose="00000300000000000000" pitchFamily="2" charset="-127"/>
+                <a:ea typeface="넥슨Lv2고딕 Light" panose="00000300000000000000" pitchFamily="2" charset="-127"/>
+              </a:rPr>
+              <a:t>이후 이벤트를 발생시킨다</a:t>
+            </a:r>
+            <a:endParaRPr lang="en-US" altLang="ko-KR" sz="1600" dirty="0">
+              <a:solidFill>
+                <a:schemeClr val="bg1"/>
+              </a:solidFill>
+              <a:latin typeface="넥슨Lv2고딕 Light" panose="00000300000000000000" pitchFamily="2" charset="-127"/>
+              <a:ea typeface="넥슨Lv2고딕 Light" panose="00000300000000000000" pitchFamily="2" charset="-127"/>
+            </a:endParaRPr>
+          </a:p>
+        </p:txBody>
+      </p:sp>
+      <p:pic>
+        <p:nvPicPr>
+          <p:cNvPr id="7" name="그림 6">
+            <a:extLst>
+              <a:ext uri="{FF2B5EF4-FFF2-40B4-BE49-F238E27FC236}">
+                <a16:creationId xmlns:a16="http://schemas.microsoft.com/office/drawing/2014/main" id="{DC5CEB0A-B6C1-C993-2921-E0F6BDB78D49}"/>
+              </a:ext>
+            </a:extLst>
+          </p:cNvPr>
+          <p:cNvPicPr>
+            <a:picLocks noChangeAspect="1"/>
+          </p:cNvPicPr>
+          <p:nvPr/>
+        </p:nvPicPr>
+        <p:blipFill>
+          <a:blip r:embed="rId2"/>
+          <a:stretch>
+            <a:fillRect/>
+          </a:stretch>
+        </p:blipFill>
+        <p:spPr>
+          <a:xfrm>
+            <a:off x="6678201" y="1628774"/>
+            <a:ext cx="3738973" cy="4508089"/>
+          </a:xfrm>
+          <a:prstGeom prst="rect">
+            <a:avLst/>
+          </a:prstGeom>
+        </p:spPr>
+      </p:pic>
       <p:sp>
         <p:nvSpPr>
           <p:cNvPr id="8" name="직사각형 7">
@@ -6712,8 +6668,8 @@
         </p:nvSpPr>
         <p:spPr>
           <a:xfrm>
-            <a:off x="8083550" y="2457450"/>
-            <a:ext cx="1929130" cy="523875"/>
+            <a:off x="7378700" y="4133850"/>
+            <a:ext cx="2927350" cy="523875"/>
           </a:xfrm>
           <a:prstGeom prst="rect">
             <a:avLst/>
@@ -6753,7 +6709,7 @@
     </p:spTree>
     <p:extLst>
       <p:ext uri="{BB962C8B-B14F-4D97-AF65-F5344CB8AC3E}">
-        <p14:creationId xmlns:p14="http://schemas.microsoft.com/office/powerpoint/2010/main" val="3082058199"/>
+        <p14:creationId xmlns:p14="http://schemas.microsoft.com/office/powerpoint/2010/main" val="1560351109"/>
       </p:ext>
     </p:extLst>
   </p:cSld>
@@ -6788,6 +6744,36 @@
           <a:chExt cx="0" cy="0"/>
         </a:xfrm>
       </p:grpSpPr>
+      <p:pic>
+        <p:nvPicPr>
+          <p:cNvPr id="3" name="그림 2">
+            <a:extLst>
+              <a:ext uri="{FF2B5EF4-FFF2-40B4-BE49-F238E27FC236}">
+                <a16:creationId xmlns:a16="http://schemas.microsoft.com/office/drawing/2014/main" id="{52FBCEAC-FCFE-5140-5A8E-0EB02D1023C1}"/>
+              </a:ext>
+            </a:extLst>
+          </p:cNvPr>
+          <p:cNvPicPr>
+            <a:picLocks noChangeAspect="1"/>
+          </p:cNvPicPr>
+          <p:nvPr/>
+        </p:nvPicPr>
+        <p:blipFill>
+          <a:blip r:embed="rId2"/>
+          <a:stretch>
+            <a:fillRect/>
+          </a:stretch>
+        </p:blipFill>
+        <p:spPr>
+          <a:xfrm>
+            <a:off x="7473692" y="1628775"/>
+            <a:ext cx="2934109" cy="3200847"/>
+          </a:xfrm>
+          <a:prstGeom prst="rect">
+            <a:avLst/>
+          </a:prstGeom>
+        </p:spPr>
+      </p:pic>
       <p:sp>
         <p:nvSpPr>
           <p:cNvPr id="15" name="TextBox 14">
@@ -6824,27 +6810,7 @@
                 <a:latin typeface="넥슨Lv2고딕 Bold" panose="00000800000000000000" pitchFamily="2" charset="-127"/>
                 <a:ea typeface="넥슨Lv2고딕 Bold" panose="00000800000000000000" pitchFamily="2" charset="-127"/>
               </a:rPr>
-              <a:t>세이브</a:t>
-            </a:r>
-            <a:r>
-              <a:rPr lang="en-US" altLang="ko-KR" sz="3200" dirty="0">
-                <a:solidFill>
-                  <a:schemeClr val="bg1"/>
-                </a:solidFill>
-                <a:latin typeface="넥슨Lv2고딕 Bold" panose="00000800000000000000" pitchFamily="2" charset="-127"/>
-                <a:ea typeface="넥슨Lv2고딕 Bold" panose="00000800000000000000" pitchFamily="2" charset="-127"/>
-              </a:rPr>
-              <a:t>/</a:t>
-            </a:r>
-            <a:r>
-              <a:rPr lang="ko-KR" altLang="en-US" sz="3200" dirty="0">
-                <a:solidFill>
-                  <a:schemeClr val="bg1"/>
-                </a:solidFill>
-                <a:latin typeface="넥슨Lv2고딕 Bold" panose="00000800000000000000" pitchFamily="2" charset="-127"/>
-                <a:ea typeface="넥슨Lv2고딕 Bold" panose="00000800000000000000" pitchFamily="2" charset="-127"/>
-              </a:rPr>
-              <a:t>로드</a:t>
+              <a:t>전투</a:t>
             </a:r>
             <a:endParaRPr lang="en-US" altLang="ko-KR" sz="3200" dirty="0">
               <a:solidFill>
@@ -6922,8 +6888,8 @@
         </p:nvSpPr>
         <p:spPr>
           <a:xfrm>
-            <a:off x="1680310" y="2074745"/>
-            <a:ext cx="4414322" cy="2646365"/>
+            <a:off x="1680309" y="2074745"/>
+            <a:ext cx="8736865" cy="1538370"/>
           </a:xfrm>
           <a:prstGeom prst="rect">
             <a:avLst/>
@@ -6942,16 +6908,6 @@
               </a:lnSpc>
             </a:pPr>
             <a:r>
-              <a:rPr lang="en-US" altLang="ko-KR" sz="1600" dirty="0" err="1">
-                <a:solidFill>
-                  <a:schemeClr val="bg1"/>
-                </a:solidFill>
-                <a:latin typeface="넥슨Lv2고딕 Light" panose="00000300000000000000" pitchFamily="2" charset="-127"/>
-                <a:ea typeface="넥슨Lv2고딕 Light" panose="00000300000000000000" pitchFamily="2" charset="-127"/>
-              </a:rPr>
-              <a:t>json</a:t>
-            </a:r>
-            <a:r>
               <a:rPr lang="ko-KR" altLang="en-US" sz="1600" dirty="0">
                 <a:solidFill>
                   <a:schemeClr val="bg1"/>
@@ -6959,7 +6915,7 @@
                 <a:latin typeface="넥슨Lv2고딕 Light" panose="00000300000000000000" pitchFamily="2" charset="-127"/>
                 <a:ea typeface="넥슨Lv2고딕 Light" panose="00000300000000000000" pitchFamily="2" charset="-127"/>
               </a:rPr>
-              <a:t>으로 저장하기 위해 필요한 데이터들을</a:t>
+              <a:t>공격이 끝난 이후 턴종료를 알리기 위해</a:t>
             </a:r>
             <a:endParaRPr lang="en-US" altLang="ko-KR" sz="1600" dirty="0">
               <a:solidFill>
@@ -6976,6 +6932,26 @@
               </a:lnSpc>
             </a:pPr>
             <a:r>
+              <a:rPr lang="en-US" altLang="ko-KR" sz="1600" dirty="0" err="1">
+                <a:solidFill>
+                  <a:schemeClr val="bg1"/>
+                </a:solidFill>
+                <a:latin typeface="넥슨Lv2고딕 Light" panose="00000300000000000000" pitchFamily="2" charset="-127"/>
+                <a:ea typeface="넥슨Lv2고딕 Light" panose="00000300000000000000" pitchFamily="2" charset="-127"/>
+              </a:rPr>
+              <a:t>TurnEnd</a:t>
+            </a:r>
+            <a:r>
+              <a:rPr lang="en-US" altLang="ko-KR" sz="1600" dirty="0">
+                <a:solidFill>
+                  <a:schemeClr val="bg1"/>
+                </a:solidFill>
+                <a:latin typeface="넥슨Lv2고딕 Light" panose="00000300000000000000" pitchFamily="2" charset="-127"/>
+                <a:ea typeface="넥슨Lv2고딕 Light" panose="00000300000000000000" pitchFamily="2" charset="-127"/>
+              </a:rPr>
+              <a:t> </a:t>
+            </a:r>
+            <a:r>
               <a:rPr lang="ko-KR" altLang="en-US" sz="1600" dirty="0">
                 <a:solidFill>
                   <a:schemeClr val="bg1"/>
@@ -6983,7 +6959,24 @@
                 <a:latin typeface="넥슨Lv2고딕 Light" panose="00000300000000000000" pitchFamily="2" charset="-127"/>
                 <a:ea typeface="넥슨Lv2고딕 Light" panose="00000300000000000000" pitchFamily="2" charset="-127"/>
               </a:rPr>
-              <a:t>직렬화 하고 인벤토리 내 아이템들을</a:t>
+              <a:t>함수를 콜 백 하도록 만들었으며</a:t>
+            </a:r>
+          </a:p>
+          <a:p>
+            <a:pPr>
+              <a:lnSpc>
+                <a:spcPct val="150000"/>
+              </a:lnSpc>
+            </a:pPr>
+            <a:r>
+              <a:rPr lang="ko-KR" altLang="en-US" sz="1600" dirty="0">
+                <a:solidFill>
+                  <a:schemeClr val="bg1"/>
+                </a:solidFill>
+                <a:latin typeface="넥슨Lv2고딕 Light" panose="00000300000000000000" pitchFamily="2" charset="-127"/>
+                <a:ea typeface="넥슨Lv2고딕 Light" panose="00000300000000000000" pitchFamily="2" charset="-127"/>
+              </a:rPr>
+              <a:t>플레이어 또는 적이 죽을 때까지</a:t>
             </a:r>
             <a:endParaRPr lang="en-US" altLang="ko-KR" sz="1600" dirty="0">
               <a:solidFill>
@@ -7007,47 +7000,7 @@
                 <a:latin typeface="넥슨Lv2고딕 Light" panose="00000300000000000000" pitchFamily="2" charset="-127"/>
                 <a:ea typeface="넥슨Lv2고딕 Light" panose="00000300000000000000" pitchFamily="2" charset="-127"/>
               </a:rPr>
-              <a:t>아이템 </a:t>
-            </a:r>
-            <a:r>
-              <a:rPr lang="en-US" altLang="ko-KR" sz="1600" dirty="0">
-                <a:solidFill>
-                  <a:schemeClr val="bg1"/>
-                </a:solidFill>
-                <a:latin typeface="넥슨Lv2고딕 Light" panose="00000300000000000000" pitchFamily="2" charset="-127"/>
-                <a:ea typeface="넥슨Lv2고딕 Light" panose="00000300000000000000" pitchFamily="2" charset="-127"/>
-              </a:rPr>
-              <a:t>ID</a:t>
-            </a:r>
-            <a:r>
-              <a:rPr lang="ko-KR" altLang="en-US" sz="1600" dirty="0">
-                <a:solidFill>
-                  <a:schemeClr val="bg1"/>
-                </a:solidFill>
-                <a:latin typeface="넥슨Lv2고딕 Light" panose="00000300000000000000" pitchFamily="2" charset="-127"/>
-                <a:ea typeface="넥슨Lv2고딕 Light" panose="00000300000000000000" pitchFamily="2" charset="-127"/>
-              </a:rPr>
-              <a:t>가 담긴 </a:t>
-            </a:r>
-            <a:r>
-              <a:rPr lang="en-US" altLang="ko-KR" sz="1600" dirty="0">
-                <a:solidFill>
-                  <a:schemeClr val="bg1"/>
-                </a:solidFill>
-                <a:latin typeface="넥슨Lv2고딕 Light" panose="00000300000000000000" pitchFamily="2" charset="-127"/>
-                <a:ea typeface="넥슨Lv2고딕 Light" panose="00000300000000000000" pitchFamily="2" charset="-127"/>
-              </a:rPr>
-              <a:t>List&lt;int&gt; </a:t>
-            </a:r>
-            <a:r>
-              <a:rPr lang="ko-KR" altLang="en-US" sz="1600" dirty="0">
-                <a:solidFill>
-                  <a:schemeClr val="bg1"/>
-                </a:solidFill>
-                <a:latin typeface="넥슨Lv2고딕 Light" panose="00000300000000000000" pitchFamily="2" charset="-127"/>
-                <a:ea typeface="넥슨Lv2고딕 Light" panose="00000300000000000000" pitchFamily="2" charset="-127"/>
-              </a:rPr>
-              <a:t>를 직렬화 하여</a:t>
+              <a:t>재귀적으로 번갈아 가며 호출하며 작동한다</a:t>
             </a:r>
             <a:endParaRPr lang="en-US" altLang="ko-KR" sz="1600" dirty="0">
               <a:solidFill>
@@ -7057,161 +7010,64 @@
               <a:ea typeface="넥슨Lv2고딕 Light" panose="00000300000000000000" pitchFamily="2" charset="-127"/>
             </a:endParaRPr>
           </a:p>
-          <a:p>
-            <a:pPr>
-              <a:lnSpc>
-                <a:spcPct val="150000"/>
-              </a:lnSpc>
-            </a:pPr>
-            <a:r>
-              <a:rPr lang="ko-KR" altLang="en-US" sz="1600" dirty="0">
-                <a:solidFill>
-                  <a:schemeClr val="bg1"/>
-                </a:solidFill>
-                <a:latin typeface="넥슨Lv2고딕 Light" panose="00000300000000000000" pitchFamily="2" charset="-127"/>
-                <a:ea typeface="넥슨Lv2고딕 Light" panose="00000300000000000000" pitchFamily="2" charset="-127"/>
-              </a:rPr>
-              <a:t>로드가 되도록 하였으며</a:t>
-            </a:r>
-            <a:endParaRPr lang="en-US" altLang="ko-KR" sz="1600" dirty="0">
-              <a:solidFill>
-                <a:schemeClr val="bg1"/>
-              </a:solidFill>
-              <a:latin typeface="넥슨Lv2고딕 Light" panose="00000300000000000000" pitchFamily="2" charset="-127"/>
-              <a:ea typeface="넥슨Lv2고딕 Light" panose="00000300000000000000" pitchFamily="2" charset="-127"/>
-            </a:endParaRPr>
-          </a:p>
-          <a:p>
-            <a:pPr>
-              <a:lnSpc>
-                <a:spcPct val="150000"/>
-              </a:lnSpc>
-            </a:pPr>
-            <a:r>
-              <a:rPr lang="ko-KR" altLang="en-US" sz="1600" dirty="0">
-                <a:solidFill>
-                  <a:schemeClr val="bg1"/>
-                </a:solidFill>
-                <a:latin typeface="넥슨Lv2고딕 Light" panose="00000300000000000000" pitchFamily="2" charset="-127"/>
-                <a:ea typeface="넥슨Lv2고딕 Light" panose="00000300000000000000" pitchFamily="2" charset="-127"/>
-              </a:rPr>
-              <a:t>반환 값을 </a:t>
-            </a:r>
-            <a:r>
-              <a:rPr lang="en-US" altLang="ko-KR" sz="1600" dirty="0">
-                <a:solidFill>
-                  <a:schemeClr val="bg1"/>
-                </a:solidFill>
-                <a:latin typeface="넥슨Lv2고딕 Light" panose="00000300000000000000" pitchFamily="2" charset="-127"/>
-                <a:ea typeface="넥슨Lv2고딕 Light" panose="00000300000000000000" pitchFamily="2" charset="-127"/>
-              </a:rPr>
-              <a:t>bool</a:t>
-            </a:r>
-            <a:r>
-              <a:rPr lang="ko-KR" altLang="en-US" sz="1600" dirty="0">
-                <a:solidFill>
-                  <a:schemeClr val="bg1"/>
-                </a:solidFill>
-                <a:latin typeface="넥슨Lv2고딕 Light" panose="00000300000000000000" pitchFamily="2" charset="-127"/>
-                <a:ea typeface="넥슨Lv2고딕 Light" panose="00000300000000000000" pitchFamily="2" charset="-127"/>
-              </a:rPr>
-              <a:t>로 하여</a:t>
-            </a:r>
-            <a:endParaRPr lang="en-US" altLang="ko-KR" sz="1600" dirty="0">
-              <a:solidFill>
-                <a:schemeClr val="bg1"/>
-              </a:solidFill>
-              <a:latin typeface="넥슨Lv2고딕 Light" panose="00000300000000000000" pitchFamily="2" charset="-127"/>
-              <a:ea typeface="넥슨Lv2고딕 Light" panose="00000300000000000000" pitchFamily="2" charset="-127"/>
-            </a:endParaRPr>
-          </a:p>
-          <a:p>
-            <a:pPr>
-              <a:lnSpc>
-                <a:spcPct val="150000"/>
-              </a:lnSpc>
-            </a:pPr>
-            <a:r>
-              <a:rPr lang="ko-KR" altLang="en-US" sz="1600" dirty="0">
-                <a:solidFill>
-                  <a:schemeClr val="bg1"/>
-                </a:solidFill>
-                <a:latin typeface="넥슨Lv2고딕 Light" panose="00000300000000000000" pitchFamily="2" charset="-127"/>
-                <a:ea typeface="넥슨Lv2고딕 Light" panose="00000300000000000000" pitchFamily="2" charset="-127"/>
-              </a:rPr>
-              <a:t>로드 성공 실패 여부를</a:t>
-            </a:r>
-            <a:endParaRPr lang="en-US" altLang="ko-KR" sz="1600" dirty="0">
-              <a:solidFill>
-                <a:schemeClr val="bg1"/>
-              </a:solidFill>
-              <a:latin typeface="넥슨Lv2고딕 Light" panose="00000300000000000000" pitchFamily="2" charset="-127"/>
-              <a:ea typeface="넥슨Lv2고딕 Light" panose="00000300000000000000" pitchFamily="2" charset="-127"/>
-            </a:endParaRPr>
-          </a:p>
-          <a:p>
-            <a:pPr>
-              <a:lnSpc>
-                <a:spcPct val="150000"/>
-              </a:lnSpc>
-            </a:pPr>
-            <a:r>
-              <a:rPr lang="ko-KR" altLang="en-US" sz="1600" dirty="0">
-                <a:solidFill>
-                  <a:schemeClr val="bg1"/>
-                </a:solidFill>
-                <a:latin typeface="넥슨Lv2고딕 Light" panose="00000300000000000000" pitchFamily="2" charset="-127"/>
-                <a:ea typeface="넥슨Lv2고딕 Light" panose="00000300000000000000" pitchFamily="2" charset="-127"/>
-              </a:rPr>
-              <a:t>판단하고 새로운 파일을 만들도록 작성하였습니다</a:t>
-            </a:r>
-            <a:r>
-              <a:rPr lang="en-US" altLang="ko-KR" sz="1600" dirty="0">
-                <a:solidFill>
-                  <a:schemeClr val="bg1"/>
-                </a:solidFill>
-                <a:latin typeface="넥슨Lv2고딕 Light" panose="00000300000000000000" pitchFamily="2" charset="-127"/>
-                <a:ea typeface="넥슨Lv2고딕 Light" panose="00000300000000000000" pitchFamily="2" charset="-127"/>
-              </a:rPr>
-              <a:t>.</a:t>
-            </a:r>
-          </a:p>
-        </p:txBody>
-      </p:sp>
-      <p:pic>
-        <p:nvPicPr>
-          <p:cNvPr id="13" name="그림 12">
-            <a:extLst>
-              <a:ext uri="{FF2B5EF4-FFF2-40B4-BE49-F238E27FC236}">
-                <a16:creationId xmlns:a16="http://schemas.microsoft.com/office/drawing/2014/main" id="{85B530E4-3CBE-B7C7-4C74-7B77C5A34D37}"/>
-              </a:ext>
-            </a:extLst>
-          </p:cNvPr>
-          <p:cNvPicPr>
-            <a:picLocks noChangeAspect="1"/>
-          </p:cNvPicPr>
+        </p:txBody>
+      </p:sp>
+      <p:sp>
+        <p:nvSpPr>
+          <p:cNvPr id="8" name="직사각형 7">
+            <a:extLst>
+              <a:ext uri="{FF2B5EF4-FFF2-40B4-BE49-F238E27FC236}">
+                <a16:creationId xmlns:a16="http://schemas.microsoft.com/office/drawing/2014/main" id="{E6A5C31E-73AD-B758-FB1B-EEA83E88CFF8}"/>
+              </a:ext>
+            </a:extLst>
+          </p:cNvPr>
+          <p:cNvSpPr/>
           <p:nvPr/>
-        </p:nvPicPr>
-        <p:blipFill>
-          <a:blip r:embed="rId2"/>
-          <a:stretch>
-            <a:fillRect/>
-          </a:stretch>
-        </p:blipFill>
+        </p:nvSpPr>
         <p:spPr>
           <a:xfrm>
-            <a:off x="6097370" y="1631757"/>
-            <a:ext cx="4339589" cy="3352994"/>
+            <a:off x="8083550" y="2457450"/>
+            <a:ext cx="1929130" cy="523875"/>
           </a:xfrm>
           <a:prstGeom prst="rect">
             <a:avLst/>
           </a:prstGeom>
+          <a:noFill/>
+          <a:ln>
+            <a:solidFill>
+              <a:srgbClr val="EA473B"/>
+            </a:solidFill>
+          </a:ln>
         </p:spPr>
-      </p:pic>
+        <p:style>
+          <a:lnRef idx="2">
+            <a:schemeClr val="accent1">
+              <a:shade val="50000"/>
+            </a:schemeClr>
+          </a:lnRef>
+          <a:fillRef idx="1">
+            <a:schemeClr val="accent1"/>
+          </a:fillRef>
+          <a:effectRef idx="0">
+            <a:schemeClr val="accent1"/>
+          </a:effectRef>
+          <a:fontRef idx="minor">
+            <a:schemeClr val="lt1"/>
+          </a:fontRef>
+        </p:style>
+        <p:txBody>
+          <a:bodyPr rtlCol="0" anchor="ctr"/>
+          <a:lstStyle/>
+          <a:p>
+            <a:pPr algn="ctr"/>
+            <a:endParaRPr lang="ko-KR" altLang="en-US"/>
+          </a:p>
+        </p:txBody>
+      </p:sp>
     </p:spTree>
     <p:extLst>
       <p:ext uri="{BB962C8B-B14F-4D97-AF65-F5344CB8AC3E}">
-        <p14:creationId xmlns:p14="http://schemas.microsoft.com/office/powerpoint/2010/main" val="2090174743"/>
+        <p14:creationId xmlns:p14="http://schemas.microsoft.com/office/powerpoint/2010/main" val="3082058199"/>
       </p:ext>
     </p:extLst>
   </p:cSld>
@@ -7282,7 +7138,27 @@
                 <a:latin typeface="넥슨Lv2고딕 Bold" panose="00000800000000000000" pitchFamily="2" charset="-127"/>
                 <a:ea typeface="넥슨Lv2고딕 Bold" panose="00000800000000000000" pitchFamily="2" charset="-127"/>
               </a:rPr>
-              <a:t>싱글 톤 사용 이유</a:t>
+              <a:t>세이브</a:t>
+            </a:r>
+            <a:r>
+              <a:rPr lang="en-US" altLang="ko-KR" sz="3200" dirty="0">
+                <a:solidFill>
+                  <a:schemeClr val="bg1"/>
+                </a:solidFill>
+                <a:latin typeface="넥슨Lv2고딕 Bold" panose="00000800000000000000" pitchFamily="2" charset="-127"/>
+                <a:ea typeface="넥슨Lv2고딕 Bold" panose="00000800000000000000" pitchFamily="2" charset="-127"/>
+              </a:rPr>
+              <a:t>/</a:t>
+            </a:r>
+            <a:r>
+              <a:rPr lang="ko-KR" altLang="en-US" sz="3200" dirty="0">
+                <a:solidFill>
+                  <a:schemeClr val="bg1"/>
+                </a:solidFill>
+                <a:latin typeface="넥슨Lv2고딕 Bold" panose="00000800000000000000" pitchFamily="2" charset="-127"/>
+                <a:ea typeface="넥슨Lv2고딕 Bold" panose="00000800000000000000" pitchFamily="2" charset="-127"/>
+              </a:rPr>
+              <a:t>로드</a:t>
             </a:r>
             <a:endParaRPr lang="en-US" altLang="ko-KR" sz="3200" dirty="0">
               <a:solidFill>
@@ -7360,8 +7236,8 @@
         </p:nvSpPr>
         <p:spPr>
           <a:xfrm>
-            <a:off x="1680309" y="2074745"/>
-            <a:ext cx="8736865" cy="2277034"/>
+            <a:off x="1680310" y="2074745"/>
+            <a:ext cx="4414322" cy="3015697"/>
           </a:xfrm>
           <a:prstGeom prst="rect">
             <a:avLst/>
@@ -7380,24 +7256,48 @@
               </a:lnSpc>
             </a:pPr>
             <a:r>
-              <a:rPr lang="en-US" altLang="ko-KR" sz="1600" dirty="0">
-                <a:solidFill>
-                  <a:schemeClr val="bg1"/>
-                </a:solidFill>
-                <a:latin typeface="넥슨Lv2고딕 Light" panose="00000300000000000000" pitchFamily="2" charset="-127"/>
-                <a:ea typeface="넥슨Lv2고딕 Light" panose="00000300000000000000" pitchFamily="2" charset="-127"/>
-              </a:rPr>
-              <a:t>UI</a:t>
-            </a:r>
-            <a:r>
               <a:rPr lang="ko-KR" altLang="en-US" sz="1600" dirty="0">
                 <a:solidFill>
                   <a:schemeClr val="bg1"/>
                 </a:solidFill>
-                <a:latin typeface="넥슨Lv2고딕 Light" panose="00000300000000000000" pitchFamily="2" charset="-127"/>
-                <a:ea typeface="넥슨Lv2고딕 Light" panose="00000300000000000000" pitchFamily="2" charset="-127"/>
-              </a:rPr>
-              <a:t>와 데이터를 분리하기 위해</a:t>
+                <a:latin typeface="넥슨Lv2고딕 Medium" panose="00000600000000000000" pitchFamily="2" charset="-127"/>
+                <a:ea typeface="넥슨Lv2고딕 Medium" panose="00000600000000000000" pitchFamily="2" charset="-127"/>
+              </a:rPr>
+              <a:t>플레이어 데이터</a:t>
+            </a:r>
+            <a:endParaRPr lang="en-US" altLang="ko-KR" sz="1600" dirty="0">
+              <a:solidFill>
+                <a:schemeClr val="bg1"/>
+              </a:solidFill>
+              <a:latin typeface="넥슨Lv2고딕 Medium" panose="00000600000000000000" pitchFamily="2" charset="-127"/>
+              <a:ea typeface="넥슨Lv2고딕 Medium" panose="00000600000000000000" pitchFamily="2" charset="-127"/>
+            </a:endParaRPr>
+          </a:p>
+          <a:p>
+            <a:pPr>
+              <a:lnSpc>
+                <a:spcPct val="150000"/>
+              </a:lnSpc>
+            </a:pPr>
+            <a:r>
+              <a:rPr lang="en-US" altLang="ko-KR" sz="1600" dirty="0" err="1">
+                <a:solidFill>
+                  <a:schemeClr val="bg1"/>
+                </a:solidFill>
+                <a:latin typeface="넥슨Lv2고딕 Light" panose="00000300000000000000" pitchFamily="2" charset="-127"/>
+                <a:ea typeface="넥슨Lv2고딕 Light" panose="00000300000000000000" pitchFamily="2" charset="-127"/>
+              </a:rPr>
+              <a:t>json</a:t>
+            </a:r>
+            <a:r>
+              <a:rPr lang="ko-KR" altLang="en-US" sz="1600" dirty="0">
+                <a:solidFill>
+                  <a:schemeClr val="bg1"/>
+                </a:solidFill>
+                <a:latin typeface="넥슨Lv2고딕 Light" panose="00000300000000000000" pitchFamily="2" charset="-127"/>
+                <a:ea typeface="넥슨Lv2고딕 Light" panose="00000300000000000000" pitchFamily="2" charset="-127"/>
+              </a:rPr>
+              <a:t>으로 저장하기 위해 필요한 데이터들을</a:t>
             </a:r>
             <a:endParaRPr lang="en-US" altLang="ko-KR" sz="1600" dirty="0">
               <a:solidFill>
@@ -7421,7 +7321,7 @@
                 <a:latin typeface="넥슨Lv2고딕 Light" panose="00000300000000000000" pitchFamily="2" charset="-127"/>
                 <a:ea typeface="넥슨Lv2고딕 Light" panose="00000300000000000000" pitchFamily="2" charset="-127"/>
               </a:rPr>
-              <a:t>싱글 톤 방식을 사용했습니다</a:t>
+              <a:t>직렬화 하고 인벤토리 내 아이템들을</a:t>
             </a:r>
             <a:endParaRPr lang="en-US" altLang="ko-KR" sz="1600" dirty="0">
               <a:solidFill>
@@ -7437,6 +7337,56 @@
                 <a:spcPct val="150000"/>
               </a:lnSpc>
             </a:pPr>
+            <a:r>
+              <a:rPr lang="ko-KR" altLang="en-US" sz="1600" dirty="0">
+                <a:solidFill>
+                  <a:schemeClr val="bg1"/>
+                </a:solidFill>
+                <a:latin typeface="넥슨Lv2고딕 Light" panose="00000300000000000000" pitchFamily="2" charset="-127"/>
+                <a:ea typeface="넥슨Lv2고딕 Light" panose="00000300000000000000" pitchFamily="2" charset="-127"/>
+              </a:rPr>
+              <a:t>아이템 </a:t>
+            </a:r>
+            <a:r>
+              <a:rPr lang="en-US" altLang="ko-KR" sz="1600" dirty="0">
+                <a:solidFill>
+                  <a:schemeClr val="bg1"/>
+                </a:solidFill>
+                <a:latin typeface="넥슨Lv2고딕 Light" panose="00000300000000000000" pitchFamily="2" charset="-127"/>
+                <a:ea typeface="넥슨Lv2고딕 Light" panose="00000300000000000000" pitchFamily="2" charset="-127"/>
+              </a:rPr>
+              <a:t>ID</a:t>
+            </a:r>
+            <a:r>
+              <a:rPr lang="ko-KR" altLang="en-US" sz="1600" dirty="0">
+                <a:solidFill>
+                  <a:schemeClr val="bg1"/>
+                </a:solidFill>
+                <a:latin typeface="넥슨Lv2고딕 Light" panose="00000300000000000000" pitchFamily="2" charset="-127"/>
+                <a:ea typeface="넥슨Lv2고딕 Light" panose="00000300000000000000" pitchFamily="2" charset="-127"/>
+              </a:rPr>
+              <a:t>가 담긴 </a:t>
+            </a:r>
+            <a:r>
+              <a:rPr lang="en-US" altLang="ko-KR" sz="1600" dirty="0">
+                <a:solidFill>
+                  <a:schemeClr val="bg1"/>
+                </a:solidFill>
+                <a:latin typeface="넥슨Lv2고딕 Light" panose="00000300000000000000" pitchFamily="2" charset="-127"/>
+                <a:ea typeface="넥슨Lv2고딕 Light" panose="00000300000000000000" pitchFamily="2" charset="-127"/>
+              </a:rPr>
+              <a:t>List&lt;int&gt; </a:t>
+            </a:r>
+            <a:r>
+              <a:rPr lang="ko-KR" altLang="en-US" sz="1600" dirty="0">
+                <a:solidFill>
+                  <a:schemeClr val="bg1"/>
+                </a:solidFill>
+                <a:latin typeface="넥슨Lv2고딕 Light" panose="00000300000000000000" pitchFamily="2" charset="-127"/>
+                <a:ea typeface="넥슨Lv2고딕 Light" panose="00000300000000000000" pitchFamily="2" charset="-127"/>
+              </a:rPr>
+              <a:t>를 직렬화 하여</a:t>
+            </a:r>
             <a:endParaRPr lang="en-US" altLang="ko-KR" sz="1600" dirty="0">
               <a:solidFill>
                 <a:schemeClr val="bg1"/>
@@ -7459,7 +7409,7 @@
                 <a:latin typeface="넥슨Lv2고딕 Light" panose="00000300000000000000" pitchFamily="2" charset="-127"/>
                 <a:ea typeface="넥슨Lv2고딕 Light" panose="00000300000000000000" pitchFamily="2" charset="-127"/>
               </a:rPr>
-              <a:t>값이 변함에 따라 이벤트를 발생시키고</a:t>
+              <a:t>로드가 되도록 하였으며</a:t>
             </a:r>
             <a:endParaRPr lang="en-US" altLang="ko-KR" sz="1600" dirty="0">
               <a:solidFill>
@@ -7476,6 +7426,16 @@
               </a:lnSpc>
             </a:pPr>
             <a:r>
+              <a:rPr lang="ko-KR" altLang="en-US" sz="1600" dirty="0">
+                <a:solidFill>
+                  <a:schemeClr val="bg1"/>
+                </a:solidFill>
+                <a:latin typeface="넥슨Lv2고딕 Light" panose="00000300000000000000" pitchFamily="2" charset="-127"/>
+                <a:ea typeface="넥슨Lv2고딕 Light" panose="00000300000000000000" pitchFamily="2" charset="-127"/>
+              </a:rPr>
+              <a:t>반환 값을 </a:t>
+            </a:r>
+            <a:r>
               <a:rPr lang="en-US" altLang="ko-KR" sz="1600" dirty="0">
                 <a:solidFill>
                   <a:schemeClr val="bg1"/>
@@ -7483,7 +7443,7 @@
                 <a:latin typeface="넥슨Lv2고딕 Light" panose="00000300000000000000" pitchFamily="2" charset="-127"/>
                 <a:ea typeface="넥슨Lv2고딕 Light" panose="00000300000000000000" pitchFamily="2" charset="-127"/>
               </a:rPr>
-              <a:t>UI</a:t>
+              <a:t>bool</a:t>
             </a:r>
             <a:r>
               <a:rPr lang="ko-KR" altLang="en-US" sz="1600" dirty="0">
@@ -7493,27 +7453,7 @@
                 <a:latin typeface="넥슨Lv2고딕 Light" panose="00000300000000000000" pitchFamily="2" charset="-127"/>
                 <a:ea typeface="넥슨Lv2고딕 Light" panose="00000300000000000000" pitchFamily="2" charset="-127"/>
               </a:rPr>
-              <a:t>가 구독하여</a:t>
-            </a:r>
-            <a:r>
-              <a:rPr lang="en-US" altLang="ko-KR" sz="1600" dirty="0">
-                <a:solidFill>
-                  <a:schemeClr val="bg1"/>
-                </a:solidFill>
-                <a:latin typeface="넥슨Lv2고딕 Light" panose="00000300000000000000" pitchFamily="2" charset="-127"/>
-                <a:ea typeface="넥슨Lv2고딕 Light" panose="00000300000000000000" pitchFamily="2" charset="-127"/>
-              </a:rPr>
-              <a:t> </a:t>
-            </a:r>
-            <a:r>
-              <a:rPr lang="ko-KR" altLang="en-US" sz="1600" dirty="0">
-                <a:solidFill>
-                  <a:schemeClr val="bg1"/>
-                </a:solidFill>
-                <a:latin typeface="넥슨Lv2고딕 Light" panose="00000300000000000000" pitchFamily="2" charset="-127"/>
-                <a:ea typeface="넥슨Lv2고딕 Light" panose="00000300000000000000" pitchFamily="2" charset="-127"/>
-              </a:rPr>
-              <a:t>보이는 값을</a:t>
+              <a:t>로 하여</a:t>
             </a:r>
             <a:endParaRPr lang="en-US" altLang="ko-KR" sz="1600" dirty="0">
               <a:solidFill>
@@ -7537,7 +7477,31 @@
                 <a:latin typeface="넥슨Lv2고딕 Light" panose="00000300000000000000" pitchFamily="2" charset="-127"/>
                 <a:ea typeface="넥슨Lv2고딕 Light" panose="00000300000000000000" pitchFamily="2" charset="-127"/>
               </a:rPr>
-              <a:t>변경할 수 있도록 작성하였습니다</a:t>
+              <a:t>로드 성공 실패 여부를</a:t>
+            </a:r>
+            <a:endParaRPr lang="en-US" altLang="ko-KR" sz="1600" dirty="0">
+              <a:solidFill>
+                <a:schemeClr val="bg1"/>
+              </a:solidFill>
+              <a:latin typeface="넥슨Lv2고딕 Light" panose="00000300000000000000" pitchFamily="2" charset="-127"/>
+              <a:ea typeface="넥슨Lv2고딕 Light" panose="00000300000000000000" pitchFamily="2" charset="-127"/>
+            </a:endParaRPr>
+          </a:p>
+          <a:p>
+            <a:pPr>
+              <a:lnSpc>
+                <a:spcPct val="150000"/>
+              </a:lnSpc>
+            </a:pPr>
+            <a:r>
+              <a:rPr lang="ko-KR" altLang="en-US" sz="1600" dirty="0">
+                <a:solidFill>
+                  <a:schemeClr val="bg1"/>
+                </a:solidFill>
+                <a:latin typeface="넥슨Lv2고딕 Light" panose="00000300000000000000" pitchFamily="2" charset="-127"/>
+                <a:ea typeface="넥슨Lv2고딕 Light" panose="00000300000000000000" pitchFamily="2" charset="-127"/>
+              </a:rPr>
+              <a:t>판단하고 새로운 파일을 만들도록 작성하였습니다</a:t>
             </a:r>
             <a:r>
               <a:rPr lang="en-US" altLang="ko-KR" sz="1600" dirty="0">
@@ -7554,10 +7518,10 @@
       </p:sp>
       <p:pic>
         <p:nvPicPr>
-          <p:cNvPr id="5" name="그림 4">
-            <a:extLst>
-              <a:ext uri="{FF2B5EF4-FFF2-40B4-BE49-F238E27FC236}">
-                <a16:creationId xmlns:a16="http://schemas.microsoft.com/office/drawing/2014/main" id="{67676198-673D-6105-2CB8-C2E9A6893129}"/>
+          <p:cNvPr id="13" name="그림 12">
+            <a:extLst>
+              <a:ext uri="{FF2B5EF4-FFF2-40B4-BE49-F238E27FC236}">
+                <a16:creationId xmlns:a16="http://schemas.microsoft.com/office/drawing/2014/main" id="{85B530E4-3CBE-B7C7-4C74-7B77C5A34D37}"/>
               </a:ext>
             </a:extLst>
           </p:cNvPr>
@@ -7574,8 +7538,8 @@
         </p:blipFill>
         <p:spPr>
           <a:xfrm>
-            <a:off x="6096000" y="2074745"/>
-            <a:ext cx="4321174" cy="1121363"/>
+            <a:off x="6097370" y="1631757"/>
+            <a:ext cx="4339589" cy="3352994"/>
           </a:xfrm>
           <a:prstGeom prst="rect">
             <a:avLst/>
@@ -7585,7 +7549,7 @@
     </p:spTree>
     <p:extLst>
       <p:ext uri="{BB962C8B-B14F-4D97-AF65-F5344CB8AC3E}">
-        <p14:creationId xmlns:p14="http://schemas.microsoft.com/office/powerpoint/2010/main" val="3020680528"/>
+        <p14:creationId xmlns:p14="http://schemas.microsoft.com/office/powerpoint/2010/main" val="2090174743"/>
       </p:ext>
     </p:extLst>
   </p:cSld>
@@ -8041,8 +8005,8 @@
         </p:nvSpPr>
         <p:spPr>
           <a:xfrm>
-            <a:off x="1680310" y="1469196"/>
-            <a:ext cx="6650890" cy="1200329"/>
+            <a:off x="1680310" y="1155929"/>
+            <a:ext cx="3733800" cy="584775"/>
           </a:xfrm>
           <a:prstGeom prst="rect">
             <a:avLst/>
@@ -8056,16 +8020,36 @@
           <a:lstStyle/>
           <a:p>
             <a:r>
-              <a:rPr lang="ko-KR" altLang="en-US" sz="7200" dirty="0">
+              <a:rPr lang="ko-KR" altLang="en-US" sz="3200" dirty="0">
                 <a:solidFill>
                   <a:schemeClr val="bg1"/>
                 </a:solidFill>
                 <a:latin typeface="넥슨Lv2고딕 Bold" panose="00000800000000000000" pitchFamily="2" charset="-127"/>
                 <a:ea typeface="넥슨Lv2고딕 Bold" panose="00000800000000000000" pitchFamily="2" charset="-127"/>
               </a:rPr>
-              <a:t>최적화</a:t>
-            </a:r>
-            <a:endParaRPr lang="en-US" altLang="ko-KR" sz="7200" dirty="0">
+              <a:t>세이브</a:t>
+            </a:r>
+            <a:r>
+              <a:rPr lang="en-US" altLang="ko-KR" sz="3200" dirty="0">
+                <a:solidFill>
+                  <a:schemeClr val="bg1"/>
+                </a:solidFill>
+                <a:latin typeface="넥슨Lv2고딕 Bold" panose="00000800000000000000" pitchFamily="2" charset="-127"/>
+                <a:ea typeface="넥슨Lv2고딕 Bold" panose="00000800000000000000" pitchFamily="2" charset="-127"/>
+              </a:rPr>
+              <a:t>/</a:t>
+            </a:r>
+            <a:r>
+              <a:rPr lang="ko-KR" altLang="en-US" sz="3200" dirty="0">
+                <a:solidFill>
+                  <a:schemeClr val="bg1"/>
+                </a:solidFill>
+                <a:latin typeface="넥슨Lv2고딕 Bold" panose="00000800000000000000" pitchFamily="2" charset="-127"/>
+                <a:ea typeface="넥슨Lv2고딕 Bold" panose="00000800000000000000" pitchFamily="2" charset="-127"/>
+              </a:rPr>
+              <a:t>로드</a:t>
+            </a:r>
+            <a:endParaRPr lang="en-US" altLang="ko-KR" sz="3200" dirty="0">
               <a:solidFill>
                 <a:schemeClr val="bg1"/>
               </a:solidFill>
@@ -8077,10 +8061,62 @@
       </p:sp>
       <p:sp>
         <p:nvSpPr>
-          <p:cNvPr id="11" name="TextBox 10">
-            <a:extLst>
-              <a:ext uri="{FF2B5EF4-FFF2-40B4-BE49-F238E27FC236}">
-                <a16:creationId xmlns:a16="http://schemas.microsoft.com/office/drawing/2014/main" id="{E10A1302-F34C-6112-2BB3-EF054A096FF3}"/>
+          <p:cNvPr id="16" name="직사각형 15">
+            <a:extLst>
+              <a:ext uri="{FF2B5EF4-FFF2-40B4-BE49-F238E27FC236}">
+                <a16:creationId xmlns:a16="http://schemas.microsoft.com/office/drawing/2014/main" id="{06D4D73C-002A-B871-4E9F-3C2F2EFA95F6}"/>
+              </a:ext>
+            </a:extLst>
+          </p:cNvPr>
+          <p:cNvSpPr/>
+          <p:nvPr/>
+        </p:nvSpPr>
+        <p:spPr>
+          <a:xfrm>
+            <a:off x="1660524" y="1262063"/>
+            <a:ext cx="45719" cy="366711"/>
+          </a:xfrm>
+          <a:prstGeom prst="rect">
+            <a:avLst/>
+          </a:prstGeom>
+          <a:solidFill>
+            <a:schemeClr val="bg1"/>
+          </a:solidFill>
+          <a:ln>
+            <a:noFill/>
+          </a:ln>
+        </p:spPr>
+        <p:style>
+          <a:lnRef idx="2">
+            <a:schemeClr val="accent1">
+              <a:shade val="50000"/>
+            </a:schemeClr>
+          </a:lnRef>
+          <a:fillRef idx="1">
+            <a:schemeClr val="accent1"/>
+          </a:fillRef>
+          <a:effectRef idx="0">
+            <a:schemeClr val="accent1"/>
+          </a:effectRef>
+          <a:fontRef idx="minor">
+            <a:schemeClr val="lt1"/>
+          </a:fontRef>
+        </p:style>
+        <p:txBody>
+          <a:bodyPr rtlCol="0" anchor="ctr"/>
+          <a:lstStyle/>
+          <a:p>
+            <a:pPr algn="ctr"/>
+            <a:endParaRPr lang="ko-KR" altLang="en-US"/>
+          </a:p>
+        </p:txBody>
+      </p:sp>
+      <p:sp>
+        <p:nvSpPr>
+          <p:cNvPr id="19" name="TextBox 18">
+            <a:extLst>
+              <a:ext uri="{FF2B5EF4-FFF2-40B4-BE49-F238E27FC236}">
+                <a16:creationId xmlns:a16="http://schemas.microsoft.com/office/drawing/2014/main" id="{5316A27D-F818-472F-350E-CD328A0375DC}"/>
               </a:ext>
             </a:extLst>
           </p:cNvPr>
@@ -8089,8 +8125,8 @@
         </p:nvSpPr>
         <p:spPr>
           <a:xfrm>
-            <a:off x="1657349" y="3143250"/>
-            <a:ext cx="4321175" cy="1507016"/>
+            <a:off x="1680310" y="2074745"/>
+            <a:ext cx="4414322" cy="1538370"/>
           </a:xfrm>
           <a:prstGeom prst="rect">
             <a:avLst/>
@@ -8109,16 +8145,80 @@
               </a:lnSpc>
             </a:pPr>
             <a:r>
-              <a:rPr lang="ko-KR" altLang="en-US" sz="3200" dirty="0">
-                <a:solidFill>
-                  <a:schemeClr val="bg1"/>
-                </a:solidFill>
-                <a:latin typeface="넥슨Lv2고딕 Light" panose="00000300000000000000" pitchFamily="2" charset="-127"/>
-                <a:ea typeface="넥슨Lv2고딕 Light" panose="00000300000000000000" pitchFamily="2" charset="-127"/>
-              </a:rPr>
-              <a:t>캔버스</a:t>
-            </a:r>
-            <a:endParaRPr lang="en-US" altLang="ko-KR" sz="3200" dirty="0">
+              <a:rPr lang="ko-KR" altLang="en-US" sz="1600" dirty="0">
+                <a:solidFill>
+                  <a:schemeClr val="bg1"/>
+                </a:solidFill>
+                <a:latin typeface="넥슨Lv2고딕 Medium" panose="00000600000000000000" pitchFamily="2" charset="-127"/>
+                <a:ea typeface="넥슨Lv2고딕 Medium" panose="00000600000000000000" pitchFamily="2" charset="-127"/>
+              </a:rPr>
+              <a:t>인 게임 데이터</a:t>
+            </a:r>
+            <a:endParaRPr lang="en-US" altLang="ko-KR" sz="1600" dirty="0">
+              <a:solidFill>
+                <a:schemeClr val="bg1"/>
+              </a:solidFill>
+              <a:latin typeface="넥슨Lv2고딕 Medium" panose="00000600000000000000" pitchFamily="2" charset="-127"/>
+              <a:ea typeface="넥슨Lv2고딕 Medium" panose="00000600000000000000" pitchFamily="2" charset="-127"/>
+            </a:endParaRPr>
+          </a:p>
+          <a:p>
+            <a:pPr>
+              <a:lnSpc>
+                <a:spcPct val="150000"/>
+              </a:lnSpc>
+            </a:pPr>
+            <a:r>
+              <a:rPr lang="ko-KR" altLang="en-US" sz="1600" dirty="0">
+                <a:solidFill>
+                  <a:schemeClr val="bg1"/>
+                </a:solidFill>
+                <a:latin typeface="넥슨Lv2고딕 Light" panose="00000300000000000000" pitchFamily="2" charset="-127"/>
+                <a:ea typeface="넥슨Lv2고딕 Light" panose="00000300000000000000" pitchFamily="2" charset="-127"/>
+              </a:rPr>
+              <a:t>데이터를</a:t>
+            </a:r>
+            <a:r>
+              <a:rPr lang="en-US" altLang="ko-KR" sz="1600" dirty="0">
+                <a:solidFill>
+                  <a:schemeClr val="bg1"/>
+                </a:solidFill>
+                <a:latin typeface="넥슨Lv2고딕 Light" panose="00000300000000000000" pitchFamily="2" charset="-127"/>
+                <a:ea typeface="넥슨Lv2고딕 Light" panose="00000300000000000000" pitchFamily="2" charset="-127"/>
+              </a:rPr>
+              <a:t> </a:t>
+            </a:r>
+            <a:r>
+              <a:rPr lang="ko-KR" altLang="en-US" sz="1600" dirty="0">
+                <a:solidFill>
+                  <a:schemeClr val="bg1"/>
+                </a:solidFill>
+                <a:latin typeface="넥슨Lv2고딕 Light" panose="00000300000000000000" pitchFamily="2" charset="-127"/>
+                <a:ea typeface="넥슨Lv2고딕 Light" panose="00000300000000000000" pitchFamily="2" charset="-127"/>
+              </a:rPr>
+              <a:t>아마존 </a:t>
+            </a:r>
+            <a:r>
+              <a:rPr lang="en-US" altLang="ko-KR" sz="1600" dirty="0">
+                <a:solidFill>
+                  <a:schemeClr val="bg1"/>
+                </a:solidFill>
+                <a:latin typeface="넥슨Lv2고딕 Light" panose="00000300000000000000" pitchFamily="2" charset="-127"/>
+                <a:ea typeface="넥슨Lv2고딕 Light" panose="00000300000000000000" pitchFamily="2" charset="-127"/>
+              </a:rPr>
+              <a:t>S3 </a:t>
+            </a:r>
+            <a:r>
+              <a:rPr lang="ko-KR" altLang="en-US" sz="1600" dirty="0">
+                <a:solidFill>
+                  <a:schemeClr val="bg1"/>
+                </a:solidFill>
+                <a:latin typeface="넥슨Lv2고딕 Light" panose="00000300000000000000" pitchFamily="2" charset="-127"/>
+                <a:ea typeface="넥슨Lv2고딕 Light" panose="00000300000000000000" pitchFamily="2" charset="-127"/>
+              </a:rPr>
+              <a:t>저장소에 업로드하여</a:t>
+            </a:r>
+            <a:endParaRPr lang="en-US" altLang="ko-KR" sz="1600" dirty="0">
               <a:solidFill>
                 <a:schemeClr val="bg1"/>
               </a:solidFill>
@@ -8133,26 +8233,36 @@
               </a:lnSpc>
             </a:pPr>
             <a:r>
-              <a:rPr lang="en-US" altLang="ko-KR" sz="3200" dirty="0">
-                <a:solidFill>
-                  <a:schemeClr val="bg1"/>
-                </a:solidFill>
-                <a:latin typeface="넥슨Lv2고딕 Light" panose="00000300000000000000" pitchFamily="2" charset="-127"/>
-                <a:ea typeface="넥슨Lv2고딕 Light" panose="00000300000000000000" pitchFamily="2" charset="-127"/>
-              </a:rPr>
-              <a:t>UI </a:t>
-            </a:r>
-            <a:r>
-              <a:rPr lang="ko-KR" altLang="en-US" sz="3200" dirty="0">
-                <a:solidFill>
-                  <a:schemeClr val="bg1"/>
-                </a:solidFill>
-                <a:latin typeface="넥슨Lv2고딕 Light" panose="00000300000000000000" pitchFamily="2" charset="-127"/>
-                <a:ea typeface="넥슨Lv2고딕 Light" panose="00000300000000000000" pitchFamily="2" charset="-127"/>
-              </a:rPr>
-              <a:t>요소</a:t>
-            </a:r>
-            <a:endParaRPr lang="en-US" altLang="ko-KR" sz="3200" dirty="0">
+              <a:rPr lang="ko-KR" altLang="en-US" sz="1600" dirty="0">
+                <a:solidFill>
+                  <a:schemeClr val="bg1"/>
+                </a:solidFill>
+                <a:latin typeface="넥슨Lv2고딕 Light" panose="00000300000000000000" pitchFamily="2" charset="-127"/>
+                <a:ea typeface="넥슨Lv2고딕 Light" panose="00000300000000000000" pitchFamily="2" charset="-127"/>
+              </a:rPr>
+              <a:t>관리하였고</a:t>
+            </a:r>
+            <a:r>
+              <a:rPr lang="en-US" altLang="ko-KR" sz="1600" dirty="0">
+                <a:solidFill>
+                  <a:schemeClr val="bg1"/>
+                </a:solidFill>
+                <a:latin typeface="넥슨Lv2고딕 Light" panose="00000300000000000000" pitchFamily="2" charset="-127"/>
+                <a:ea typeface="넥슨Lv2고딕 Light" panose="00000300000000000000" pitchFamily="2" charset="-127"/>
+              </a:rPr>
+              <a:t> </a:t>
+            </a:r>
+            <a:r>
+              <a:rPr lang="ko-KR" altLang="en-US" sz="1600" dirty="0">
+                <a:solidFill>
+                  <a:schemeClr val="bg1"/>
+                </a:solidFill>
+                <a:latin typeface="넥슨Lv2고딕 Light" panose="00000300000000000000" pitchFamily="2" charset="-127"/>
+                <a:ea typeface="넥슨Lv2고딕 Light" panose="00000300000000000000" pitchFamily="2" charset="-127"/>
+              </a:rPr>
+              <a:t>데이터를 불러오고</a:t>
+            </a:r>
+            <a:endParaRPr lang="en-US" altLang="ko-KR" sz="1600" dirty="0">
               <a:solidFill>
                 <a:schemeClr val="bg1"/>
               </a:solidFill>
@@ -8160,12 +8270,130 @@
               <a:ea typeface="넥슨Lv2고딕 Light" panose="00000300000000000000" pitchFamily="2" charset="-127"/>
             </a:endParaRPr>
           </a:p>
+          <a:p>
+            <a:pPr>
+              <a:lnSpc>
+                <a:spcPct val="150000"/>
+              </a:lnSpc>
+            </a:pPr>
+            <a:r>
+              <a:rPr lang="ko-KR" altLang="en-US" sz="1600" dirty="0">
+                <a:solidFill>
+                  <a:schemeClr val="bg1"/>
+                </a:solidFill>
+                <a:latin typeface="넥슨Lv2고딕 Light" panose="00000300000000000000" pitchFamily="2" charset="-127"/>
+                <a:ea typeface="넥슨Lv2고딕 Light" panose="00000300000000000000" pitchFamily="2" charset="-127"/>
+              </a:rPr>
+              <a:t>완료한 이후 게임을 시작합니다</a:t>
+            </a:r>
+            <a:endParaRPr lang="en-US" altLang="ko-KR" sz="1600" dirty="0">
+              <a:solidFill>
+                <a:schemeClr val="bg1"/>
+              </a:solidFill>
+              <a:latin typeface="넥슨Lv2고딕 Light" panose="00000300000000000000" pitchFamily="2" charset="-127"/>
+              <a:ea typeface="넥슨Lv2고딕 Light" panose="00000300000000000000" pitchFamily="2" charset="-127"/>
+            </a:endParaRPr>
+          </a:p>
+        </p:txBody>
+      </p:sp>
+      <p:pic>
+        <p:nvPicPr>
+          <p:cNvPr id="27" name="그림 26">
+            <a:extLst>
+              <a:ext uri="{FF2B5EF4-FFF2-40B4-BE49-F238E27FC236}">
+                <a16:creationId xmlns:a16="http://schemas.microsoft.com/office/drawing/2014/main" id="{850194C1-D7D2-5628-D6AD-1E37E81223F8}"/>
+              </a:ext>
+            </a:extLst>
+          </p:cNvPr>
+          <p:cNvPicPr>
+            <a:picLocks noChangeAspect="1"/>
+          </p:cNvPicPr>
+          <p:nvPr/>
+        </p:nvPicPr>
+        <p:blipFill>
+          <a:blip r:embed="rId2"/>
+          <a:stretch>
+            <a:fillRect/>
+          </a:stretch>
+        </p:blipFill>
+        <p:spPr>
+          <a:xfrm>
+            <a:off x="1774825" y="4043322"/>
+            <a:ext cx="4086795" cy="2467319"/>
+          </a:xfrm>
+          <a:prstGeom prst="rect">
+            <a:avLst/>
+          </a:prstGeom>
+        </p:spPr>
+      </p:pic>
+      <p:sp>
+        <p:nvSpPr>
+          <p:cNvPr id="28" name="사각형: 둥근 모서리 27">
+            <a:extLst>
+              <a:ext uri="{FF2B5EF4-FFF2-40B4-BE49-F238E27FC236}">
+                <a16:creationId xmlns:a16="http://schemas.microsoft.com/office/drawing/2014/main" id="{1FC81A3B-6E98-E2F8-0A06-EE85094708B1}"/>
+              </a:ext>
+            </a:extLst>
+          </p:cNvPr>
+          <p:cNvSpPr/>
+          <p:nvPr/>
+        </p:nvSpPr>
+        <p:spPr>
+          <a:xfrm>
+            <a:off x="7013575" y="1534781"/>
+            <a:ext cx="2486025" cy="4975860"/>
+          </a:xfrm>
+          <a:prstGeom prst="roundRect">
+            <a:avLst>
+              <a:gd name="adj" fmla="val 5473"/>
+            </a:avLst>
+          </a:prstGeom>
+          <a:blipFill dpi="0" rotWithShape="1">
+            <a:blip r:embed="rId3">
+              <a:extLst>
+                <a:ext uri="{28A0092B-C50C-407E-A947-70E740481C1C}">
+                  <a14:useLocalDpi xmlns:a14="http://schemas.microsoft.com/office/drawing/2010/main" val="0"/>
+                </a:ext>
+              </a:extLst>
+            </a:blip>
+            <a:srcRect/>
+            <a:stretch>
+              <a:fillRect t="19" b="-125"/>
+            </a:stretch>
+          </a:blipFill>
+          <a:ln>
+            <a:noFill/>
+          </a:ln>
+        </p:spPr>
+        <p:style>
+          <a:lnRef idx="2">
+            <a:schemeClr val="accent1">
+              <a:shade val="50000"/>
+            </a:schemeClr>
+          </a:lnRef>
+          <a:fillRef idx="1">
+            <a:schemeClr val="accent1"/>
+          </a:fillRef>
+          <a:effectRef idx="0">
+            <a:schemeClr val="accent1"/>
+          </a:effectRef>
+          <a:fontRef idx="minor">
+            <a:schemeClr val="lt1"/>
+          </a:fontRef>
+        </p:style>
+        <p:txBody>
+          <a:bodyPr rtlCol="0" anchor="ctr"/>
+          <a:lstStyle/>
+          <a:p>
+            <a:pPr algn="ctr"/>
+            <a:endParaRPr lang="ko-KR" altLang="en-US"/>
+          </a:p>
         </p:txBody>
       </p:sp>
     </p:spTree>
     <p:extLst>
       <p:ext uri="{BB962C8B-B14F-4D97-AF65-F5344CB8AC3E}">
-        <p14:creationId xmlns:p14="http://schemas.microsoft.com/office/powerpoint/2010/main" val="1808681697"/>
+        <p14:creationId xmlns:p14="http://schemas.microsoft.com/office/powerpoint/2010/main" val="1660975252"/>
       </p:ext>
     </p:extLst>
   </p:cSld>
@@ -8236,8 +8464,15 @@
                 <a:latin typeface="넥슨Lv2고딕 Bold" panose="00000800000000000000" pitchFamily="2" charset="-127"/>
                 <a:ea typeface="넥슨Lv2고딕 Bold" panose="00000800000000000000" pitchFamily="2" charset="-127"/>
               </a:rPr>
-              <a:t>캔버스</a:t>
-            </a:r>
+              <a:t>싱글 톤 사용 이유</a:t>
+            </a:r>
+            <a:endParaRPr lang="en-US" altLang="ko-KR" sz="3200" dirty="0">
+              <a:solidFill>
+                <a:schemeClr val="bg1"/>
+              </a:solidFill>
+              <a:latin typeface="넥슨Lv2고딕 Bold" panose="00000800000000000000" pitchFamily="2" charset="-127"/>
+              <a:ea typeface="넥슨Lv2고딕 Bold" panose="00000800000000000000" pitchFamily="2" charset="-127"/>
+            </a:endParaRPr>
           </a:p>
         </p:txBody>
       </p:sp>
@@ -8295,10 +8530,10 @@
       </p:sp>
       <p:sp>
         <p:nvSpPr>
-          <p:cNvPr id="6" name="TextBox 5">
-            <a:extLst>
-              <a:ext uri="{FF2B5EF4-FFF2-40B4-BE49-F238E27FC236}">
-                <a16:creationId xmlns:a16="http://schemas.microsoft.com/office/drawing/2014/main" id="{63BC716B-EEC4-0292-2A32-8BA3449ACD32}"/>
+          <p:cNvPr id="19" name="TextBox 18">
+            <a:extLst>
+              <a:ext uri="{FF2B5EF4-FFF2-40B4-BE49-F238E27FC236}">
+                <a16:creationId xmlns:a16="http://schemas.microsoft.com/office/drawing/2014/main" id="{5316A27D-F818-472F-350E-CD328A0375DC}"/>
               </a:ext>
             </a:extLst>
           </p:cNvPr>
@@ -8308,7 +8543,7 @@
         <p:spPr>
           <a:xfrm>
             <a:off x="1680309" y="2074745"/>
-            <a:ext cx="8736865" cy="3477362"/>
+            <a:ext cx="8736865" cy="2277034"/>
           </a:xfrm>
           <a:prstGeom prst="rect">
             <a:avLst/>
@@ -8327,29 +8562,15 @@
               </a:lnSpc>
             </a:pPr>
             <a:r>
-              <a:rPr lang="ko-KR" altLang="en-US" dirty="0">
-                <a:solidFill>
-                  <a:schemeClr val="bg1"/>
-                </a:solidFill>
-                <a:latin typeface="넥슨Lv2고딕 Medium" panose="00000600000000000000" pitchFamily="2" charset="-127"/>
-                <a:ea typeface="넥슨Lv2고딕 Medium" panose="00000600000000000000" pitchFamily="2" charset="-127"/>
-              </a:rPr>
-              <a:t>캔버스 나누기</a:t>
-            </a:r>
-            <a:endParaRPr lang="en-US" altLang="ko-KR" dirty="0">
-              <a:solidFill>
-                <a:schemeClr val="bg1"/>
-              </a:solidFill>
-              <a:latin typeface="넥슨Lv2고딕 Medium" panose="00000600000000000000" pitchFamily="2" charset="-127"/>
-              <a:ea typeface="넥슨Lv2고딕 Medium" panose="00000600000000000000" pitchFamily="2" charset="-127"/>
-            </a:endParaRPr>
-          </a:p>
-          <a:p>
-            <a:pPr>
-              <a:lnSpc>
-                <a:spcPct val="150000"/>
-              </a:lnSpc>
-            </a:pPr>
+              <a:rPr lang="en-US" altLang="ko-KR" sz="1600" dirty="0">
+                <a:solidFill>
+                  <a:schemeClr val="bg1"/>
+                </a:solidFill>
+                <a:latin typeface="넥슨Lv2고딕 Light" panose="00000300000000000000" pitchFamily="2" charset="-127"/>
+                <a:ea typeface="넥슨Lv2고딕 Light" panose="00000300000000000000" pitchFamily="2" charset="-127"/>
+              </a:rPr>
+              <a:t>UI</a:t>
+            </a:r>
             <a:r>
               <a:rPr lang="ko-KR" altLang="en-US" sz="1600" dirty="0">
                 <a:solidFill>
@@ -8358,7 +8579,7 @@
                 <a:latin typeface="넥슨Lv2고딕 Light" panose="00000300000000000000" pitchFamily="2" charset="-127"/>
                 <a:ea typeface="넥슨Lv2고딕 Light" panose="00000300000000000000" pitchFamily="2" charset="-127"/>
               </a:rPr>
-              <a:t>처음 개발을 할 때 하나의 캔버스로 작업을 하였는데</a:t>
+              <a:t>와 데이터를 분리하기 위해</a:t>
             </a:r>
             <a:endParaRPr lang="en-US" altLang="ko-KR" sz="1600" dirty="0">
               <a:solidFill>
@@ -8382,51 +8603,7 @@
                 <a:latin typeface="넥슨Lv2고딕 Light" panose="00000300000000000000" pitchFamily="2" charset="-127"/>
                 <a:ea typeface="넥슨Lv2고딕 Light" panose="00000300000000000000" pitchFamily="2" charset="-127"/>
               </a:rPr>
-              <a:t>오브젝트가 하나 움직일 때 마다 스파이크가 생기는 것을 확인하였고</a:t>
-            </a:r>
-            <a:endParaRPr lang="en-US" altLang="ko-KR" sz="1600" dirty="0">
-              <a:solidFill>
-                <a:schemeClr val="bg1"/>
-              </a:solidFill>
-              <a:latin typeface="넥슨Lv2고딕 Light" panose="00000300000000000000" pitchFamily="2" charset="-127"/>
-              <a:ea typeface="넥슨Lv2고딕 Light" panose="00000300000000000000" pitchFamily="2" charset="-127"/>
-            </a:endParaRPr>
-          </a:p>
-          <a:p>
-            <a:pPr>
-              <a:lnSpc>
-                <a:spcPct val="150000"/>
-              </a:lnSpc>
-            </a:pPr>
-            <a:r>
-              <a:rPr lang="ko-KR" altLang="en-US" sz="1600" dirty="0">
-                <a:solidFill>
-                  <a:schemeClr val="bg1"/>
-                </a:solidFill>
-                <a:latin typeface="넥슨Lv2고딕 Light" panose="00000300000000000000" pitchFamily="2" charset="-127"/>
-                <a:ea typeface="넥슨Lv2고딕 Light" panose="00000300000000000000" pitchFamily="2" charset="-127"/>
-              </a:rPr>
-              <a:t>이후 동적 </a:t>
-            </a:r>
-            <a:r>
-              <a:rPr lang="en-US" altLang="ko-KR" sz="1600" dirty="0">
-                <a:solidFill>
-                  <a:schemeClr val="bg1"/>
-                </a:solidFill>
-                <a:latin typeface="넥슨Lv2고딕 Light" panose="00000300000000000000" pitchFamily="2" charset="-127"/>
-                <a:ea typeface="넥슨Lv2고딕 Light" panose="00000300000000000000" pitchFamily="2" charset="-127"/>
-              </a:rPr>
-              <a:t>UI</a:t>
-            </a:r>
-            <a:r>
-              <a:rPr lang="ko-KR" altLang="en-US" sz="1600" dirty="0">
-                <a:solidFill>
-                  <a:schemeClr val="bg1"/>
-                </a:solidFill>
-                <a:latin typeface="넥슨Lv2고딕 Light" panose="00000300000000000000" pitchFamily="2" charset="-127"/>
-                <a:ea typeface="넥슨Lv2고딕 Light" panose="00000300000000000000" pitchFamily="2" charset="-127"/>
-              </a:rPr>
-              <a:t>는 캔버스를 나누는 형태를 사용하며 최적화를 했습니다</a:t>
+              <a:t>싱글 톤 방식을 사용했습니다</a:t>
             </a:r>
             <a:endParaRPr lang="en-US" altLang="ko-KR" sz="1600" dirty="0">
               <a:solidFill>
@@ -8457,40 +8634,6 @@
               </a:lnSpc>
             </a:pPr>
             <a:r>
-              <a:rPr lang="en-US" altLang="ko-KR" dirty="0">
-                <a:solidFill>
-                  <a:schemeClr val="bg1"/>
-                </a:solidFill>
-                <a:latin typeface="넥슨Lv2고딕 Medium" panose="00000600000000000000" pitchFamily="2" charset="-127"/>
-                <a:ea typeface="넥슨Lv2고딕 Medium" panose="00000600000000000000" pitchFamily="2" charset="-127"/>
-              </a:rPr>
-              <a:t>UI</a:t>
-            </a:r>
-            <a:r>
-              <a:rPr lang="ko-KR" altLang="en-US" dirty="0">
-                <a:solidFill>
-                  <a:schemeClr val="bg1"/>
-                </a:solidFill>
-                <a:latin typeface="넥슨Lv2고딕 Medium" panose="00000600000000000000" pitchFamily="2" charset="-127"/>
-                <a:ea typeface="넥슨Lv2고딕 Medium" panose="00000600000000000000" pitchFamily="2" charset="-127"/>
-              </a:rPr>
-              <a:t> 숨기기</a:t>
-            </a:r>
-            <a:endParaRPr lang="en-US" altLang="ko-KR" dirty="0">
-              <a:solidFill>
-                <a:schemeClr val="bg1"/>
-              </a:solidFill>
-              <a:latin typeface="넥슨Lv2고딕 Medium" panose="00000600000000000000" pitchFamily="2" charset="-127"/>
-              <a:ea typeface="넥슨Lv2고딕 Medium" panose="00000600000000000000" pitchFamily="2" charset="-127"/>
-            </a:endParaRPr>
-          </a:p>
-          <a:p>
-            <a:pPr>
-              <a:lnSpc>
-                <a:spcPct val="150000"/>
-              </a:lnSpc>
-            </a:pPr>
-            <a:r>
               <a:rPr lang="ko-KR" altLang="en-US" sz="1600" dirty="0">
                 <a:solidFill>
                   <a:schemeClr val="bg1"/>
@@ -8498,7 +8641,7 @@
                 <a:latin typeface="넥슨Lv2고딕 Light" panose="00000300000000000000" pitchFamily="2" charset="-127"/>
                 <a:ea typeface="넥슨Lv2고딕 Light" panose="00000300000000000000" pitchFamily="2" charset="-127"/>
               </a:rPr>
-              <a:t>게임 오브젝트를 비활성화 하는 대신</a:t>
+              <a:t>값이 변함에 따라 이벤트를 발생시키고</a:t>
             </a:r>
             <a:endParaRPr lang="en-US" altLang="ko-KR" sz="1600" dirty="0">
               <a:solidFill>
@@ -8515,6 +8658,16 @@
               </a:lnSpc>
             </a:pPr>
             <a:r>
+              <a:rPr lang="en-US" altLang="ko-KR" sz="1600" dirty="0">
+                <a:solidFill>
+                  <a:schemeClr val="bg1"/>
+                </a:solidFill>
+                <a:latin typeface="넥슨Lv2고딕 Light" panose="00000300000000000000" pitchFamily="2" charset="-127"/>
+                <a:ea typeface="넥슨Lv2고딕 Light" panose="00000300000000000000" pitchFamily="2" charset="-127"/>
+              </a:rPr>
+              <a:t>UI</a:t>
+            </a:r>
+            <a:r>
               <a:rPr lang="ko-KR" altLang="en-US" sz="1600" dirty="0">
                 <a:solidFill>
                   <a:schemeClr val="bg1"/>
@@ -8522,7 +8675,7 @@
                 <a:latin typeface="넥슨Lv2고딕 Light" panose="00000300000000000000" pitchFamily="2" charset="-127"/>
                 <a:ea typeface="넥슨Lv2고딕 Light" panose="00000300000000000000" pitchFamily="2" charset="-127"/>
               </a:rPr>
-              <a:t>캔버스 컴포넌트만</a:t>
+              <a:t>가 구독하여</a:t>
             </a:r>
             <a:r>
               <a:rPr lang="en-US" altLang="ko-KR" sz="1600" dirty="0">
@@ -8542,7 +8695,7 @@
                 <a:latin typeface="넥슨Lv2고딕 Light" panose="00000300000000000000" pitchFamily="2" charset="-127"/>
                 <a:ea typeface="넥슨Lv2고딕 Light" panose="00000300000000000000" pitchFamily="2" charset="-127"/>
               </a:rPr>
-              <a:t>비활성화 하여 숨겼습니다</a:t>
+              <a:t>보이는 값을</a:t>
             </a:r>
             <a:endParaRPr lang="en-US" altLang="ko-KR" sz="1600" dirty="0">
               <a:solidFill>
@@ -8566,42 +8719,55 @@
                 <a:latin typeface="넥슨Lv2고딕 Light" panose="00000300000000000000" pitchFamily="2" charset="-127"/>
                 <a:ea typeface="넥슨Lv2고딕 Light" panose="00000300000000000000" pitchFamily="2" charset="-127"/>
               </a:rPr>
-              <a:t>이로 인해 활성화 시 메시와 </a:t>
-            </a:r>
-            <a:r>
-              <a:rPr lang="ko-KR" altLang="en-US" sz="1600" dirty="0" err="1">
-                <a:solidFill>
-                  <a:schemeClr val="bg1"/>
-                </a:solidFill>
-                <a:latin typeface="넥슨Lv2고딕 Light" panose="00000300000000000000" pitchFamily="2" charset="-127"/>
-                <a:ea typeface="넥슨Lv2고딕 Light" panose="00000300000000000000" pitchFamily="2" charset="-127"/>
-              </a:rPr>
-              <a:t>버텍스를</a:t>
-            </a:r>
-            <a:r>
-              <a:rPr lang="ko-KR" altLang="en-US" sz="1600" dirty="0">
-                <a:solidFill>
-                  <a:schemeClr val="bg1"/>
-                </a:solidFill>
-                <a:latin typeface="넥슨Lv2고딕 Light" panose="00000300000000000000" pitchFamily="2" charset="-127"/>
-                <a:ea typeface="넥슨Lv2고딕 Light" panose="00000300000000000000" pitchFamily="2" charset="-127"/>
-              </a:rPr>
-              <a:t> 재구성하지 않게 되었습니다</a:t>
-            </a:r>
-            <a:endParaRPr lang="en-US" altLang="ko-KR" sz="1600" dirty="0">
-              <a:solidFill>
-                <a:schemeClr val="bg1"/>
-              </a:solidFill>
-              <a:latin typeface="넥슨Lv2고딕 Light" panose="00000300000000000000" pitchFamily="2" charset="-127"/>
-              <a:ea typeface="넥슨Lv2고딕 Light" panose="00000300000000000000" pitchFamily="2" charset="-127"/>
-            </a:endParaRPr>
-          </a:p>
-        </p:txBody>
-      </p:sp>
+              <a:t>변경할 수 있도록 작성하였습니다</a:t>
+            </a:r>
+            <a:r>
+              <a:rPr lang="en-US" altLang="ko-KR" sz="1600" dirty="0">
+                <a:solidFill>
+                  <a:schemeClr val="bg1"/>
+                </a:solidFill>
+                <a:latin typeface="넥슨Lv2고딕 Light" panose="00000300000000000000" pitchFamily="2" charset="-127"/>
+                <a:ea typeface="넥슨Lv2고딕 Light" panose="00000300000000000000" pitchFamily="2" charset="-127"/>
+              </a:rPr>
+              <a:t>.</a:t>
+            </a:r>
+          </a:p>
+        </p:txBody>
+      </p:sp>
+      <p:pic>
+        <p:nvPicPr>
+          <p:cNvPr id="5" name="그림 4">
+            <a:extLst>
+              <a:ext uri="{FF2B5EF4-FFF2-40B4-BE49-F238E27FC236}">
+                <a16:creationId xmlns:a16="http://schemas.microsoft.com/office/drawing/2014/main" id="{67676198-673D-6105-2CB8-C2E9A6893129}"/>
+              </a:ext>
+            </a:extLst>
+          </p:cNvPr>
+          <p:cNvPicPr>
+            <a:picLocks noChangeAspect="1"/>
+          </p:cNvPicPr>
+          <p:nvPr/>
+        </p:nvPicPr>
+        <p:blipFill>
+          <a:blip r:embed="rId2"/>
+          <a:stretch>
+            <a:fillRect/>
+          </a:stretch>
+        </p:blipFill>
+        <p:spPr>
+          <a:xfrm>
+            <a:off x="6096000" y="2074745"/>
+            <a:ext cx="4321174" cy="1121363"/>
+          </a:xfrm>
+          <a:prstGeom prst="rect">
+            <a:avLst/>
+          </a:prstGeom>
+        </p:spPr>
+      </p:pic>
     </p:spTree>
     <p:extLst>
       <p:ext uri="{BB962C8B-B14F-4D97-AF65-F5344CB8AC3E}">
-        <p14:creationId xmlns:p14="http://schemas.microsoft.com/office/powerpoint/2010/main" val="3122391892"/>
+        <p14:creationId xmlns:p14="http://schemas.microsoft.com/office/powerpoint/2010/main" val="3020680528"/>
       </p:ext>
     </p:extLst>
   </p:cSld>
@@ -8650,8 +8816,8 @@
         </p:nvSpPr>
         <p:spPr>
           <a:xfrm>
-            <a:off x="1680310" y="1155929"/>
-            <a:ext cx="3733800" cy="584775"/>
+            <a:off x="1680310" y="1469196"/>
+            <a:ext cx="6650890" cy="1200329"/>
           </a:xfrm>
           <a:prstGeom prst="rect">
             <a:avLst/>
@@ -8665,96 +8831,41 @@
           <a:lstStyle/>
           <a:p>
             <a:r>
-              <a:rPr lang="en-US" altLang="ko-KR" sz="3200" dirty="0">
+              <a:rPr lang="ko-KR" altLang="en-US" sz="7200" dirty="0">
                 <a:solidFill>
                   <a:schemeClr val="bg1"/>
                 </a:solidFill>
                 <a:latin typeface="넥슨Lv2고딕 Bold" panose="00000800000000000000" pitchFamily="2" charset="-127"/>
                 <a:ea typeface="넥슨Lv2고딕 Bold" panose="00000800000000000000" pitchFamily="2" charset="-127"/>
               </a:rPr>
-              <a:t>UI </a:t>
-            </a:r>
-            <a:r>
-              <a:rPr lang="ko-KR" altLang="en-US" sz="3200" dirty="0">
-                <a:solidFill>
-                  <a:schemeClr val="bg1"/>
-                </a:solidFill>
-                <a:latin typeface="넥슨Lv2고딕 Bold" panose="00000800000000000000" pitchFamily="2" charset="-127"/>
-                <a:ea typeface="넥슨Lv2고딕 Bold" panose="00000800000000000000" pitchFamily="2" charset="-127"/>
-              </a:rPr>
-              <a:t>요소</a:t>
-            </a:r>
-          </a:p>
-        </p:txBody>
-      </p:sp>
-      <p:sp>
-        <p:nvSpPr>
-          <p:cNvPr id="16" name="직사각형 15">
-            <a:extLst>
-              <a:ext uri="{FF2B5EF4-FFF2-40B4-BE49-F238E27FC236}">
-                <a16:creationId xmlns:a16="http://schemas.microsoft.com/office/drawing/2014/main" id="{06D4D73C-002A-B871-4E9F-3C2F2EFA95F6}"/>
-              </a:ext>
-            </a:extLst>
-          </p:cNvPr>
-          <p:cNvSpPr/>
+              <a:t>최적화</a:t>
+            </a:r>
+            <a:endParaRPr lang="en-US" altLang="ko-KR" sz="7200" dirty="0">
+              <a:solidFill>
+                <a:schemeClr val="bg1"/>
+              </a:solidFill>
+              <a:latin typeface="넥슨Lv2고딕 Bold" panose="00000800000000000000" pitchFamily="2" charset="-127"/>
+              <a:ea typeface="넥슨Lv2고딕 Bold" panose="00000800000000000000" pitchFamily="2" charset="-127"/>
+            </a:endParaRPr>
+          </a:p>
+        </p:txBody>
+      </p:sp>
+      <p:sp>
+        <p:nvSpPr>
+          <p:cNvPr id="11" name="TextBox 10">
+            <a:extLst>
+              <a:ext uri="{FF2B5EF4-FFF2-40B4-BE49-F238E27FC236}">
+                <a16:creationId xmlns:a16="http://schemas.microsoft.com/office/drawing/2014/main" id="{E10A1302-F34C-6112-2BB3-EF054A096FF3}"/>
+              </a:ext>
+            </a:extLst>
+          </p:cNvPr>
+          <p:cNvSpPr txBox="1"/>
           <p:nvPr/>
         </p:nvSpPr>
         <p:spPr>
           <a:xfrm>
-            <a:off x="1660524" y="1262063"/>
-            <a:ext cx="45719" cy="366711"/>
-          </a:xfrm>
-          <a:prstGeom prst="rect">
-            <a:avLst/>
-          </a:prstGeom>
-          <a:solidFill>
-            <a:schemeClr val="bg1"/>
-          </a:solidFill>
-          <a:ln>
-            <a:noFill/>
-          </a:ln>
-        </p:spPr>
-        <p:style>
-          <a:lnRef idx="2">
-            <a:schemeClr val="accent1">
-              <a:shade val="50000"/>
-            </a:schemeClr>
-          </a:lnRef>
-          <a:fillRef idx="1">
-            <a:schemeClr val="accent1"/>
-          </a:fillRef>
-          <a:effectRef idx="0">
-            <a:schemeClr val="accent1"/>
-          </a:effectRef>
-          <a:fontRef idx="minor">
-            <a:schemeClr val="lt1"/>
-          </a:fontRef>
-        </p:style>
-        <p:txBody>
-          <a:bodyPr rtlCol="0" anchor="ctr"/>
-          <a:lstStyle/>
-          <a:p>
-            <a:pPr algn="ctr"/>
-            <a:endParaRPr lang="ko-KR" altLang="en-US"/>
-          </a:p>
-        </p:txBody>
-      </p:sp>
-      <p:sp>
-        <p:nvSpPr>
-          <p:cNvPr id="6" name="TextBox 5">
-            <a:extLst>
-              <a:ext uri="{FF2B5EF4-FFF2-40B4-BE49-F238E27FC236}">
-                <a16:creationId xmlns:a16="http://schemas.microsoft.com/office/drawing/2014/main" id="{63BC716B-EEC4-0292-2A32-8BA3449ACD32}"/>
-              </a:ext>
-            </a:extLst>
-          </p:cNvPr>
-          <p:cNvSpPr txBox="1"/>
-          <p:nvPr/>
-        </p:nvSpPr>
-        <p:spPr>
-          <a:xfrm>
-            <a:off x="1680309" y="2074745"/>
-            <a:ext cx="8736865" cy="3477362"/>
+            <a:off x="1657349" y="3143250"/>
+            <a:ext cx="4321175" cy="1507016"/>
           </a:xfrm>
           <a:prstGeom prst="rect">
             <a:avLst/>
@@ -8773,53 +8884,16 @@
               </a:lnSpc>
             </a:pPr>
             <a:r>
-              <a:rPr lang="en-US" altLang="ko-KR" dirty="0">
-                <a:solidFill>
-                  <a:schemeClr val="bg1"/>
-                </a:solidFill>
-                <a:latin typeface="넥슨Lv2고딕 Medium" panose="00000600000000000000" pitchFamily="2" charset="-127"/>
-                <a:ea typeface="넥슨Lv2고딕 Medium" panose="00000600000000000000" pitchFamily="2" charset="-127"/>
-              </a:rPr>
-              <a:t>Layout</a:t>
-            </a:r>
-            <a:r>
-              <a:rPr lang="ko-KR" altLang="en-US" dirty="0">
-                <a:solidFill>
-                  <a:schemeClr val="bg1"/>
-                </a:solidFill>
-                <a:latin typeface="넥슨Lv2고딕 Medium" panose="00000600000000000000" pitchFamily="2" charset="-127"/>
-                <a:ea typeface="넥슨Lv2고딕 Medium" panose="00000600000000000000" pitchFamily="2" charset="-127"/>
-              </a:rPr>
-              <a:t> </a:t>
-            </a:r>
-            <a:r>
-              <a:rPr lang="en-US" altLang="ko-KR" dirty="0">
-                <a:solidFill>
-                  <a:schemeClr val="bg1"/>
-                </a:solidFill>
-                <a:latin typeface="넥슨Lv2고딕 Medium" panose="00000600000000000000" pitchFamily="2" charset="-127"/>
-                <a:ea typeface="넥슨Lv2고딕 Medium" panose="00000600000000000000" pitchFamily="2" charset="-127"/>
-              </a:rPr>
-              <a:t>Group</a:t>
-            </a:r>
-          </a:p>
-          <a:p>
-            <a:pPr>
-              <a:lnSpc>
-                <a:spcPct val="150000"/>
-              </a:lnSpc>
-            </a:pPr>
-            <a:r>
-              <a:rPr lang="ko-KR" altLang="en-US" sz="1600" dirty="0">
-                <a:solidFill>
-                  <a:schemeClr val="bg1"/>
-                </a:solidFill>
-                <a:latin typeface="넥슨Lv2고딕 Light" panose="00000300000000000000" pitchFamily="2" charset="-127"/>
-                <a:ea typeface="넥슨Lv2고딕 Light" panose="00000300000000000000" pitchFamily="2" charset="-127"/>
-              </a:rPr>
-              <a:t>레이아웃 그룹 사용 이후 컴포넌트를</a:t>
-            </a:r>
-            <a:endParaRPr lang="en-US" altLang="ko-KR" sz="1600" dirty="0">
+              <a:rPr lang="ko-KR" altLang="en-US" sz="3200" dirty="0">
+                <a:solidFill>
+                  <a:schemeClr val="bg1"/>
+                </a:solidFill>
+                <a:latin typeface="넥슨Lv2고딕 Light" panose="00000300000000000000" pitchFamily="2" charset="-127"/>
+                <a:ea typeface="넥슨Lv2고딕 Light" panose="00000300000000000000" pitchFamily="2" charset="-127"/>
+              </a:rPr>
+              <a:t>캔버스</a:t>
+            </a:r>
+            <a:endParaRPr lang="en-US" altLang="ko-KR" sz="3200" dirty="0">
               <a:solidFill>
                 <a:schemeClr val="bg1"/>
               </a:solidFill>
@@ -8834,16 +8908,26 @@
               </a:lnSpc>
             </a:pPr>
             <a:r>
-              <a:rPr lang="ko-KR" altLang="en-US" sz="1600" dirty="0">
-                <a:solidFill>
-                  <a:schemeClr val="bg1"/>
-                </a:solidFill>
-                <a:latin typeface="넥슨Lv2고딕 Light" panose="00000300000000000000" pitchFamily="2" charset="-127"/>
-                <a:ea typeface="넥슨Lv2고딕 Light" panose="00000300000000000000" pitchFamily="2" charset="-127"/>
-              </a:rPr>
-              <a:t>비활성화하여 추가적인</a:t>
-            </a:r>
-            <a:endParaRPr lang="en-US" altLang="ko-KR" sz="1600" dirty="0">
+              <a:rPr lang="en-US" altLang="ko-KR" sz="3200" dirty="0">
+                <a:solidFill>
+                  <a:schemeClr val="bg1"/>
+                </a:solidFill>
+                <a:latin typeface="넥슨Lv2고딕 Light" panose="00000300000000000000" pitchFamily="2" charset="-127"/>
+                <a:ea typeface="넥슨Lv2고딕 Light" panose="00000300000000000000" pitchFamily="2" charset="-127"/>
+              </a:rPr>
+              <a:t>UI </a:t>
+            </a:r>
+            <a:r>
+              <a:rPr lang="ko-KR" altLang="en-US" sz="3200" dirty="0">
+                <a:solidFill>
+                  <a:schemeClr val="bg1"/>
+                </a:solidFill>
+                <a:latin typeface="넥슨Lv2고딕 Light" panose="00000300000000000000" pitchFamily="2" charset="-127"/>
+                <a:ea typeface="넥슨Lv2고딕 Light" panose="00000300000000000000" pitchFamily="2" charset="-127"/>
+              </a:rPr>
+              <a:t>요소</a:t>
+            </a:r>
+            <a:endParaRPr lang="en-US" altLang="ko-KR" sz="3200" dirty="0">
               <a:solidFill>
                 <a:schemeClr val="bg1"/>
               </a:solidFill>
@@ -8851,189 +8935,12 @@
               <a:ea typeface="넥슨Lv2고딕 Light" panose="00000300000000000000" pitchFamily="2" charset="-127"/>
             </a:endParaRPr>
           </a:p>
-          <a:p>
-            <a:pPr>
-              <a:lnSpc>
-                <a:spcPct val="150000"/>
-              </a:lnSpc>
-            </a:pPr>
-            <a:r>
-              <a:rPr lang="ko-KR" altLang="en-US" sz="1600" dirty="0">
-                <a:solidFill>
-                  <a:schemeClr val="bg1"/>
-                </a:solidFill>
-                <a:latin typeface="넥슨Lv2고딕 Light" panose="00000300000000000000" pitchFamily="2" charset="-127"/>
-                <a:ea typeface="넥슨Lv2고딕 Light" panose="00000300000000000000" pitchFamily="2" charset="-127"/>
-              </a:rPr>
-              <a:t>성능 저하를 막았습니다</a:t>
-            </a:r>
-            <a:endParaRPr lang="en-US" altLang="ko-KR" sz="1600" dirty="0">
-              <a:solidFill>
-                <a:schemeClr val="bg1"/>
-              </a:solidFill>
-              <a:latin typeface="넥슨Lv2고딕 Light" panose="00000300000000000000" pitchFamily="2" charset="-127"/>
-              <a:ea typeface="넥슨Lv2고딕 Light" panose="00000300000000000000" pitchFamily="2" charset="-127"/>
-            </a:endParaRPr>
-          </a:p>
-          <a:p>
-            <a:pPr>
-              <a:lnSpc>
-                <a:spcPct val="150000"/>
-              </a:lnSpc>
-            </a:pPr>
-            <a:endParaRPr lang="en-US" altLang="ko-KR" sz="1600" dirty="0">
-              <a:solidFill>
-                <a:schemeClr val="bg1"/>
-              </a:solidFill>
-              <a:latin typeface="넥슨Lv2고딕 Light" panose="00000300000000000000" pitchFamily="2" charset="-127"/>
-              <a:ea typeface="넥슨Lv2고딕 Light" panose="00000300000000000000" pitchFamily="2" charset="-127"/>
-            </a:endParaRPr>
-          </a:p>
-          <a:p>
-            <a:pPr>
-              <a:lnSpc>
-                <a:spcPct val="150000"/>
-              </a:lnSpc>
-            </a:pPr>
-            <a:r>
-              <a:rPr lang="en-US" altLang="ko-KR" dirty="0">
-                <a:solidFill>
-                  <a:schemeClr val="bg1"/>
-                </a:solidFill>
-                <a:latin typeface="넥슨Lv2고딕 Medium" panose="00000600000000000000" pitchFamily="2" charset="-127"/>
-                <a:ea typeface="넥슨Lv2고딕 Medium" panose="00000600000000000000" pitchFamily="2" charset="-127"/>
-              </a:rPr>
-              <a:t>Tween</a:t>
-            </a:r>
-          </a:p>
-          <a:p>
-            <a:pPr>
-              <a:lnSpc>
-                <a:spcPct val="150000"/>
-              </a:lnSpc>
-            </a:pPr>
-            <a:r>
-              <a:rPr lang="ko-KR" altLang="en-US" sz="1600" dirty="0" err="1">
-                <a:solidFill>
-                  <a:schemeClr val="bg1"/>
-                </a:solidFill>
-                <a:latin typeface="넥슨Lv2고딕 Light" panose="00000300000000000000" pitchFamily="2" charset="-127"/>
-                <a:ea typeface="넥슨Lv2고딕 Light" panose="00000300000000000000" pitchFamily="2" charset="-127"/>
-              </a:rPr>
-              <a:t>애니메이터를</a:t>
-            </a:r>
-            <a:r>
-              <a:rPr lang="ko-KR" altLang="en-US" sz="1600" dirty="0">
-                <a:solidFill>
-                  <a:schemeClr val="bg1"/>
-                </a:solidFill>
-                <a:latin typeface="넥슨Lv2고딕 Light" panose="00000300000000000000" pitchFamily="2" charset="-127"/>
-                <a:ea typeface="넥슨Lv2고딕 Light" panose="00000300000000000000" pitchFamily="2" charset="-127"/>
-              </a:rPr>
-              <a:t> 사용할 경우</a:t>
-            </a:r>
-            <a:r>
-              <a:rPr lang="en-US" altLang="ko-KR" sz="1600" dirty="0">
-                <a:solidFill>
-                  <a:schemeClr val="bg1"/>
-                </a:solidFill>
-                <a:latin typeface="넥슨Lv2고딕 Light" panose="00000300000000000000" pitchFamily="2" charset="-127"/>
-                <a:ea typeface="넥슨Lv2고딕 Light" panose="00000300000000000000" pitchFamily="2" charset="-127"/>
-              </a:rPr>
-              <a:t> </a:t>
-            </a:r>
-            <a:r>
-              <a:rPr lang="ko-KR" altLang="en-US" sz="1600" dirty="0">
-                <a:solidFill>
-                  <a:schemeClr val="bg1"/>
-                </a:solidFill>
-                <a:latin typeface="넥슨Lv2고딕 Light" panose="00000300000000000000" pitchFamily="2" charset="-127"/>
-                <a:ea typeface="넥슨Lv2고딕 Light" panose="00000300000000000000" pitchFamily="2" charset="-127"/>
-              </a:rPr>
-              <a:t>애니메이션이 사용 중이 아니더라도</a:t>
-            </a:r>
-            <a:endParaRPr lang="en-US" altLang="ko-KR" sz="1600" dirty="0">
-              <a:solidFill>
-                <a:schemeClr val="bg1"/>
-              </a:solidFill>
-              <a:latin typeface="넥슨Lv2고딕 Light" panose="00000300000000000000" pitchFamily="2" charset="-127"/>
-              <a:ea typeface="넥슨Lv2고딕 Light" panose="00000300000000000000" pitchFamily="2" charset="-127"/>
-            </a:endParaRPr>
-          </a:p>
-          <a:p>
-            <a:pPr>
-              <a:lnSpc>
-                <a:spcPct val="150000"/>
-              </a:lnSpc>
-            </a:pPr>
-            <a:r>
-              <a:rPr lang="ko-KR" altLang="en-US" sz="1600" dirty="0">
-                <a:solidFill>
-                  <a:schemeClr val="bg1"/>
-                </a:solidFill>
-                <a:latin typeface="넥슨Lv2고딕 Light" panose="00000300000000000000" pitchFamily="2" charset="-127"/>
-                <a:ea typeface="넥슨Lv2고딕 Light" panose="00000300000000000000" pitchFamily="2" charset="-127"/>
-              </a:rPr>
-              <a:t>다시 그리게 되는 문제를 해결하기위해 </a:t>
-            </a:r>
-            <a:r>
-              <a:rPr lang="en-US" altLang="ko-KR" sz="1600" dirty="0">
-                <a:solidFill>
-                  <a:schemeClr val="bg1"/>
-                </a:solidFill>
-                <a:latin typeface="넥슨Lv2고딕 Light" panose="00000300000000000000" pitchFamily="2" charset="-127"/>
-                <a:ea typeface="넥슨Lv2고딕 Light" panose="00000300000000000000" pitchFamily="2" charset="-127"/>
-              </a:rPr>
-              <a:t>Tween </a:t>
-            </a:r>
-            <a:r>
-              <a:rPr lang="ko-KR" altLang="en-US" sz="1600" dirty="0">
-                <a:solidFill>
-                  <a:schemeClr val="bg1"/>
-                </a:solidFill>
-                <a:latin typeface="넥슨Lv2고딕 Light" panose="00000300000000000000" pitchFamily="2" charset="-127"/>
-                <a:ea typeface="넥슨Lv2고딕 Light" panose="00000300000000000000" pitchFamily="2" charset="-127"/>
-              </a:rPr>
-              <a:t>을 사용하여</a:t>
-            </a:r>
-            <a:endParaRPr lang="en-US" altLang="ko-KR" sz="1600" dirty="0">
-              <a:solidFill>
-                <a:schemeClr val="bg1"/>
-              </a:solidFill>
-              <a:latin typeface="넥슨Lv2고딕 Light" panose="00000300000000000000" pitchFamily="2" charset="-127"/>
-              <a:ea typeface="넥슨Lv2고딕 Light" panose="00000300000000000000" pitchFamily="2" charset="-127"/>
-            </a:endParaRPr>
-          </a:p>
-          <a:p>
-            <a:pPr>
-              <a:lnSpc>
-                <a:spcPct val="150000"/>
-              </a:lnSpc>
-            </a:pPr>
-            <a:r>
-              <a:rPr lang="ko-KR" altLang="en-US" sz="1600" dirty="0">
-                <a:solidFill>
-                  <a:schemeClr val="bg1"/>
-                </a:solidFill>
-                <a:latin typeface="넥슨Lv2고딕 Light" panose="00000300000000000000" pitchFamily="2" charset="-127"/>
-                <a:ea typeface="넥슨Lv2고딕 Light" panose="00000300000000000000" pitchFamily="2" charset="-127"/>
-              </a:rPr>
-              <a:t>간단한 애니메이션을 적용하였습니다</a:t>
-            </a:r>
-            <a:endParaRPr lang="en-US" altLang="ko-KR" sz="1600" dirty="0">
-              <a:solidFill>
-                <a:schemeClr val="bg1"/>
-              </a:solidFill>
-              <a:latin typeface="넥슨Lv2고딕 Light" panose="00000300000000000000" pitchFamily="2" charset="-127"/>
-              <a:ea typeface="넥슨Lv2고딕 Light" panose="00000300000000000000" pitchFamily="2" charset="-127"/>
-            </a:endParaRPr>
-          </a:p>
         </p:txBody>
       </p:sp>
     </p:spTree>
     <p:extLst>
       <p:ext uri="{BB962C8B-B14F-4D97-AF65-F5344CB8AC3E}">
-        <p14:creationId xmlns:p14="http://schemas.microsoft.com/office/powerpoint/2010/main" val="3532308141"/>
+        <p14:creationId xmlns:p14="http://schemas.microsoft.com/office/powerpoint/2010/main" val="1808681697"/>
       </p:ext>
     </p:extLst>
   </p:cSld>
@@ -9082,8 +8989,8 @@
         </p:nvSpPr>
         <p:spPr>
           <a:xfrm>
-            <a:off x="1688777" y="1469196"/>
-            <a:ext cx="6650890" cy="1200329"/>
+            <a:off x="1680310" y="1155929"/>
+            <a:ext cx="3733800" cy="584775"/>
           </a:xfrm>
           <a:prstGeom prst="rect">
             <a:avLst/>
@@ -9097,65 +9004,379 @@
           <a:lstStyle/>
           <a:p>
             <a:r>
-              <a:rPr lang="ko-KR" altLang="en-US" sz="7200" dirty="0">
+              <a:rPr lang="ko-KR" altLang="en-US" sz="3200" dirty="0">
                 <a:solidFill>
                   <a:schemeClr val="bg1"/>
                 </a:solidFill>
                 <a:latin typeface="넥슨Lv2고딕 Bold" panose="00000800000000000000" pitchFamily="2" charset="-127"/>
                 <a:ea typeface="넥슨Lv2고딕 Bold" panose="00000800000000000000" pitchFamily="2" charset="-127"/>
               </a:rPr>
-              <a:t>마치며</a:t>
-            </a:r>
-            <a:endParaRPr lang="en-US" altLang="ko-KR" sz="7200" dirty="0">
-              <a:solidFill>
-                <a:schemeClr val="bg1"/>
-              </a:solidFill>
-              <a:latin typeface="넥슨Lv2고딕 Bold" panose="00000800000000000000" pitchFamily="2" charset="-127"/>
-              <a:ea typeface="넥슨Lv2고딕 Bold" panose="00000800000000000000" pitchFamily="2" charset="-127"/>
-            </a:endParaRPr>
-          </a:p>
-        </p:txBody>
-      </p:sp>
-      <p:pic>
-        <p:nvPicPr>
-          <p:cNvPr id="9" name="그림 8">
-            <a:extLst>
-              <a:ext uri="{FF2B5EF4-FFF2-40B4-BE49-F238E27FC236}">
-                <a16:creationId xmlns:a16="http://schemas.microsoft.com/office/drawing/2014/main" id="{B6FC7C27-A4D6-0A9C-F61B-6AA1144DE5B1}"/>
-              </a:ext>
-            </a:extLst>
-          </p:cNvPr>
-          <p:cNvPicPr>
-            <a:picLocks noChangeAspect="1"/>
-          </p:cNvPicPr>
+              <a:t>캔버스</a:t>
+            </a:r>
+          </a:p>
+        </p:txBody>
+      </p:sp>
+      <p:sp>
+        <p:nvSpPr>
+          <p:cNvPr id="16" name="직사각형 15">
+            <a:extLst>
+              <a:ext uri="{FF2B5EF4-FFF2-40B4-BE49-F238E27FC236}">
+                <a16:creationId xmlns:a16="http://schemas.microsoft.com/office/drawing/2014/main" id="{06D4D73C-002A-B871-4E9F-3C2F2EFA95F6}"/>
+              </a:ext>
+            </a:extLst>
+          </p:cNvPr>
+          <p:cNvSpPr/>
           <p:nvPr/>
-        </p:nvPicPr>
-        <p:blipFill>
-          <a:blip r:embed="rId2">
-            <a:extLst>
-              <a:ext uri="{28A0092B-C50C-407E-A947-70E740481C1C}">
-                <a14:useLocalDpi xmlns:a14="http://schemas.microsoft.com/office/drawing/2010/main" val="0"/>
-              </a:ext>
-            </a:extLst>
-          </a:blip>
-          <a:stretch>
-            <a:fillRect/>
-          </a:stretch>
-        </p:blipFill>
+        </p:nvSpPr>
         <p:spPr>
-          <a:xfrm flipH="1">
-            <a:off x="6682163" y="1628775"/>
-            <a:ext cx="3735012" cy="4514850"/>
+          <a:xfrm>
+            <a:off x="1660524" y="1262063"/>
+            <a:ext cx="45719" cy="366711"/>
           </a:xfrm>
           <a:prstGeom prst="rect">
             <a:avLst/>
           </a:prstGeom>
+          <a:solidFill>
+            <a:schemeClr val="bg1"/>
+          </a:solidFill>
+          <a:ln>
+            <a:noFill/>
+          </a:ln>
         </p:spPr>
-      </p:pic>
+        <p:style>
+          <a:lnRef idx="2">
+            <a:schemeClr val="accent1">
+              <a:shade val="50000"/>
+            </a:schemeClr>
+          </a:lnRef>
+          <a:fillRef idx="1">
+            <a:schemeClr val="accent1"/>
+          </a:fillRef>
+          <a:effectRef idx="0">
+            <a:schemeClr val="accent1"/>
+          </a:effectRef>
+          <a:fontRef idx="minor">
+            <a:schemeClr val="lt1"/>
+          </a:fontRef>
+        </p:style>
+        <p:txBody>
+          <a:bodyPr rtlCol="0" anchor="ctr"/>
+          <a:lstStyle/>
+          <a:p>
+            <a:pPr algn="ctr"/>
+            <a:endParaRPr lang="ko-KR" altLang="en-US"/>
+          </a:p>
+        </p:txBody>
+      </p:sp>
+      <p:sp>
+        <p:nvSpPr>
+          <p:cNvPr id="6" name="TextBox 5">
+            <a:extLst>
+              <a:ext uri="{FF2B5EF4-FFF2-40B4-BE49-F238E27FC236}">
+                <a16:creationId xmlns:a16="http://schemas.microsoft.com/office/drawing/2014/main" id="{63BC716B-EEC4-0292-2A32-8BA3449ACD32}"/>
+              </a:ext>
+            </a:extLst>
+          </p:cNvPr>
+          <p:cNvSpPr txBox="1"/>
+          <p:nvPr/>
+        </p:nvSpPr>
+        <p:spPr>
+          <a:xfrm>
+            <a:off x="1680309" y="2074745"/>
+            <a:ext cx="8736865" cy="3477362"/>
+          </a:xfrm>
+          <a:prstGeom prst="rect">
+            <a:avLst/>
+          </a:prstGeom>
+          <a:noFill/>
+        </p:spPr>
+        <p:txBody>
+          <a:bodyPr wrap="square" rtlCol="0">
+            <a:spAutoFit/>
+          </a:bodyPr>
+          <a:lstStyle/>
+          <a:p>
+            <a:pPr>
+              <a:lnSpc>
+                <a:spcPct val="150000"/>
+              </a:lnSpc>
+            </a:pPr>
+            <a:r>
+              <a:rPr lang="ko-KR" altLang="en-US" dirty="0">
+                <a:solidFill>
+                  <a:schemeClr val="bg1"/>
+                </a:solidFill>
+                <a:latin typeface="넥슨Lv2고딕 Medium" panose="00000600000000000000" pitchFamily="2" charset="-127"/>
+                <a:ea typeface="넥슨Lv2고딕 Medium" panose="00000600000000000000" pitchFamily="2" charset="-127"/>
+              </a:rPr>
+              <a:t>캔버스 나누기</a:t>
+            </a:r>
+            <a:endParaRPr lang="en-US" altLang="ko-KR" dirty="0">
+              <a:solidFill>
+                <a:schemeClr val="bg1"/>
+              </a:solidFill>
+              <a:latin typeface="넥슨Lv2고딕 Medium" panose="00000600000000000000" pitchFamily="2" charset="-127"/>
+              <a:ea typeface="넥슨Lv2고딕 Medium" panose="00000600000000000000" pitchFamily="2" charset="-127"/>
+            </a:endParaRPr>
+          </a:p>
+          <a:p>
+            <a:pPr>
+              <a:lnSpc>
+                <a:spcPct val="150000"/>
+              </a:lnSpc>
+            </a:pPr>
+            <a:r>
+              <a:rPr lang="ko-KR" altLang="en-US" sz="1600" dirty="0">
+                <a:solidFill>
+                  <a:schemeClr val="bg1"/>
+                </a:solidFill>
+                <a:latin typeface="넥슨Lv2고딕 Light" panose="00000300000000000000" pitchFamily="2" charset="-127"/>
+                <a:ea typeface="넥슨Lv2고딕 Light" panose="00000300000000000000" pitchFamily="2" charset="-127"/>
+              </a:rPr>
+              <a:t>처음 개발을 할 때 하나의 캔버스로 작업을 하였는데</a:t>
+            </a:r>
+            <a:endParaRPr lang="en-US" altLang="ko-KR" sz="1600" dirty="0">
+              <a:solidFill>
+                <a:schemeClr val="bg1"/>
+              </a:solidFill>
+              <a:latin typeface="넥슨Lv2고딕 Light" panose="00000300000000000000" pitchFamily="2" charset="-127"/>
+              <a:ea typeface="넥슨Lv2고딕 Light" panose="00000300000000000000" pitchFamily="2" charset="-127"/>
+            </a:endParaRPr>
+          </a:p>
+          <a:p>
+            <a:pPr>
+              <a:lnSpc>
+                <a:spcPct val="150000"/>
+              </a:lnSpc>
+            </a:pPr>
+            <a:r>
+              <a:rPr lang="ko-KR" altLang="en-US" sz="1600" dirty="0">
+                <a:solidFill>
+                  <a:schemeClr val="bg1"/>
+                </a:solidFill>
+                <a:latin typeface="넥슨Lv2고딕 Light" panose="00000300000000000000" pitchFamily="2" charset="-127"/>
+                <a:ea typeface="넥슨Lv2고딕 Light" panose="00000300000000000000" pitchFamily="2" charset="-127"/>
+              </a:rPr>
+              <a:t>오브젝트가 하나 움직일 때 마다 스파이크가 생기는 것을 확인하였고</a:t>
+            </a:r>
+            <a:endParaRPr lang="en-US" altLang="ko-KR" sz="1600" dirty="0">
+              <a:solidFill>
+                <a:schemeClr val="bg1"/>
+              </a:solidFill>
+              <a:latin typeface="넥슨Lv2고딕 Light" panose="00000300000000000000" pitchFamily="2" charset="-127"/>
+              <a:ea typeface="넥슨Lv2고딕 Light" panose="00000300000000000000" pitchFamily="2" charset="-127"/>
+            </a:endParaRPr>
+          </a:p>
+          <a:p>
+            <a:pPr>
+              <a:lnSpc>
+                <a:spcPct val="150000"/>
+              </a:lnSpc>
+            </a:pPr>
+            <a:r>
+              <a:rPr lang="ko-KR" altLang="en-US" sz="1600" dirty="0">
+                <a:solidFill>
+                  <a:schemeClr val="bg1"/>
+                </a:solidFill>
+                <a:latin typeface="넥슨Lv2고딕 Light" panose="00000300000000000000" pitchFamily="2" charset="-127"/>
+                <a:ea typeface="넥슨Lv2고딕 Light" panose="00000300000000000000" pitchFamily="2" charset="-127"/>
+              </a:rPr>
+              <a:t>이후 동적 </a:t>
+            </a:r>
+            <a:r>
+              <a:rPr lang="en-US" altLang="ko-KR" sz="1600" dirty="0">
+                <a:solidFill>
+                  <a:schemeClr val="bg1"/>
+                </a:solidFill>
+                <a:latin typeface="넥슨Lv2고딕 Light" panose="00000300000000000000" pitchFamily="2" charset="-127"/>
+                <a:ea typeface="넥슨Lv2고딕 Light" panose="00000300000000000000" pitchFamily="2" charset="-127"/>
+              </a:rPr>
+              <a:t>UI</a:t>
+            </a:r>
+            <a:r>
+              <a:rPr lang="ko-KR" altLang="en-US" sz="1600" dirty="0">
+                <a:solidFill>
+                  <a:schemeClr val="bg1"/>
+                </a:solidFill>
+                <a:latin typeface="넥슨Lv2고딕 Light" panose="00000300000000000000" pitchFamily="2" charset="-127"/>
+                <a:ea typeface="넥슨Lv2고딕 Light" panose="00000300000000000000" pitchFamily="2" charset="-127"/>
+              </a:rPr>
+              <a:t>는 캔버스를 나누는 형태를 사용하며 최적화를 했습니다</a:t>
+            </a:r>
+            <a:endParaRPr lang="en-US" altLang="ko-KR" sz="1600" dirty="0">
+              <a:solidFill>
+                <a:schemeClr val="bg1"/>
+              </a:solidFill>
+              <a:latin typeface="넥슨Lv2고딕 Light" panose="00000300000000000000" pitchFamily="2" charset="-127"/>
+              <a:ea typeface="넥슨Lv2고딕 Light" panose="00000300000000000000" pitchFamily="2" charset="-127"/>
+            </a:endParaRPr>
+          </a:p>
+          <a:p>
+            <a:pPr>
+              <a:lnSpc>
+                <a:spcPct val="150000"/>
+              </a:lnSpc>
+            </a:pPr>
+            <a:endParaRPr lang="en-US" altLang="ko-KR" sz="1600" dirty="0">
+              <a:solidFill>
+                <a:schemeClr val="bg1"/>
+              </a:solidFill>
+              <a:latin typeface="넥슨Lv2고딕 Light" panose="00000300000000000000" pitchFamily="2" charset="-127"/>
+              <a:ea typeface="넥슨Lv2고딕 Light" panose="00000300000000000000" pitchFamily="2" charset="-127"/>
+            </a:endParaRPr>
+          </a:p>
+          <a:p>
+            <a:pPr>
+              <a:lnSpc>
+                <a:spcPct val="150000"/>
+              </a:lnSpc>
+            </a:pPr>
+            <a:r>
+              <a:rPr lang="en-US" altLang="ko-KR" dirty="0">
+                <a:solidFill>
+                  <a:schemeClr val="bg1"/>
+                </a:solidFill>
+                <a:latin typeface="넥슨Lv2고딕 Medium" panose="00000600000000000000" pitchFamily="2" charset="-127"/>
+                <a:ea typeface="넥슨Lv2고딕 Medium" panose="00000600000000000000" pitchFamily="2" charset="-127"/>
+              </a:rPr>
+              <a:t>UI</a:t>
+            </a:r>
+            <a:r>
+              <a:rPr lang="ko-KR" altLang="en-US" dirty="0">
+                <a:solidFill>
+                  <a:schemeClr val="bg1"/>
+                </a:solidFill>
+                <a:latin typeface="넥슨Lv2고딕 Medium" panose="00000600000000000000" pitchFamily="2" charset="-127"/>
+                <a:ea typeface="넥슨Lv2고딕 Medium" panose="00000600000000000000" pitchFamily="2" charset="-127"/>
+              </a:rPr>
+              <a:t> 숨기기</a:t>
+            </a:r>
+            <a:endParaRPr lang="en-US" altLang="ko-KR" dirty="0">
+              <a:solidFill>
+                <a:schemeClr val="bg1"/>
+              </a:solidFill>
+              <a:latin typeface="넥슨Lv2고딕 Medium" panose="00000600000000000000" pitchFamily="2" charset="-127"/>
+              <a:ea typeface="넥슨Lv2고딕 Medium" panose="00000600000000000000" pitchFamily="2" charset="-127"/>
+            </a:endParaRPr>
+          </a:p>
+          <a:p>
+            <a:pPr>
+              <a:lnSpc>
+                <a:spcPct val="150000"/>
+              </a:lnSpc>
+            </a:pPr>
+            <a:r>
+              <a:rPr lang="ko-KR" altLang="en-US" sz="1600" dirty="0">
+                <a:solidFill>
+                  <a:schemeClr val="bg1"/>
+                </a:solidFill>
+                <a:latin typeface="넥슨Lv2고딕 Light" panose="00000300000000000000" pitchFamily="2" charset="-127"/>
+                <a:ea typeface="넥슨Lv2고딕 Light" panose="00000300000000000000" pitchFamily="2" charset="-127"/>
+              </a:rPr>
+              <a:t>게임 오브젝트를 비활성화 하는 대신</a:t>
+            </a:r>
+            <a:endParaRPr lang="en-US" altLang="ko-KR" sz="1600" dirty="0">
+              <a:solidFill>
+                <a:schemeClr val="bg1"/>
+              </a:solidFill>
+              <a:latin typeface="넥슨Lv2고딕 Light" panose="00000300000000000000" pitchFamily="2" charset="-127"/>
+              <a:ea typeface="넥슨Lv2고딕 Light" panose="00000300000000000000" pitchFamily="2" charset="-127"/>
+            </a:endParaRPr>
+          </a:p>
+          <a:p>
+            <a:pPr>
+              <a:lnSpc>
+                <a:spcPct val="150000"/>
+              </a:lnSpc>
+            </a:pPr>
+            <a:r>
+              <a:rPr lang="ko-KR" altLang="en-US" sz="1600" dirty="0">
+                <a:solidFill>
+                  <a:schemeClr val="bg1"/>
+                </a:solidFill>
+                <a:latin typeface="넥슨Lv2고딕 Light" panose="00000300000000000000" pitchFamily="2" charset="-127"/>
+                <a:ea typeface="넥슨Lv2고딕 Light" panose="00000300000000000000" pitchFamily="2" charset="-127"/>
+              </a:rPr>
+              <a:t>캔버스 컴포넌트만</a:t>
+            </a:r>
+            <a:r>
+              <a:rPr lang="en-US" altLang="ko-KR" sz="1600" dirty="0">
+                <a:solidFill>
+                  <a:schemeClr val="bg1"/>
+                </a:solidFill>
+                <a:latin typeface="넥슨Lv2고딕 Light" panose="00000300000000000000" pitchFamily="2" charset="-127"/>
+                <a:ea typeface="넥슨Lv2고딕 Light" panose="00000300000000000000" pitchFamily="2" charset="-127"/>
+              </a:rPr>
+              <a:t> </a:t>
+            </a:r>
+            <a:r>
+              <a:rPr lang="ko-KR" altLang="en-US" sz="1600" dirty="0">
+                <a:solidFill>
+                  <a:schemeClr val="bg1"/>
+                </a:solidFill>
+                <a:latin typeface="넥슨Lv2고딕 Light" panose="00000300000000000000" pitchFamily="2" charset="-127"/>
+                <a:ea typeface="넥슨Lv2고딕 Light" panose="00000300000000000000" pitchFamily="2" charset="-127"/>
+              </a:rPr>
+              <a:t>비활성화 하여 숨겼습니다</a:t>
+            </a:r>
+            <a:endParaRPr lang="en-US" altLang="ko-KR" sz="1600" dirty="0">
+              <a:solidFill>
+                <a:schemeClr val="bg1"/>
+              </a:solidFill>
+              <a:latin typeface="넥슨Lv2고딕 Light" panose="00000300000000000000" pitchFamily="2" charset="-127"/>
+              <a:ea typeface="넥슨Lv2고딕 Light" panose="00000300000000000000" pitchFamily="2" charset="-127"/>
+            </a:endParaRPr>
+          </a:p>
+          <a:p>
+            <a:pPr>
+              <a:lnSpc>
+                <a:spcPct val="150000"/>
+              </a:lnSpc>
+            </a:pPr>
+            <a:r>
+              <a:rPr lang="ko-KR" altLang="en-US" sz="1600" dirty="0">
+                <a:solidFill>
+                  <a:schemeClr val="bg1"/>
+                </a:solidFill>
+                <a:latin typeface="넥슨Lv2고딕 Light" panose="00000300000000000000" pitchFamily="2" charset="-127"/>
+                <a:ea typeface="넥슨Lv2고딕 Light" panose="00000300000000000000" pitchFamily="2" charset="-127"/>
+              </a:rPr>
+              <a:t>이로 인해 활성화 시 메시와 </a:t>
+            </a:r>
+            <a:r>
+              <a:rPr lang="ko-KR" altLang="en-US" sz="1600" dirty="0" err="1">
+                <a:solidFill>
+                  <a:schemeClr val="bg1"/>
+                </a:solidFill>
+                <a:latin typeface="넥슨Lv2고딕 Light" panose="00000300000000000000" pitchFamily="2" charset="-127"/>
+                <a:ea typeface="넥슨Lv2고딕 Light" panose="00000300000000000000" pitchFamily="2" charset="-127"/>
+              </a:rPr>
+              <a:t>버텍스를</a:t>
+            </a:r>
+            <a:r>
+              <a:rPr lang="ko-KR" altLang="en-US" sz="1600" dirty="0">
+                <a:solidFill>
+                  <a:schemeClr val="bg1"/>
+                </a:solidFill>
+                <a:latin typeface="넥슨Lv2고딕 Light" panose="00000300000000000000" pitchFamily="2" charset="-127"/>
+                <a:ea typeface="넥슨Lv2고딕 Light" panose="00000300000000000000" pitchFamily="2" charset="-127"/>
+              </a:rPr>
+              <a:t> 재구성하지 않게 되었습니다</a:t>
+            </a:r>
+            <a:endParaRPr lang="en-US" altLang="ko-KR" sz="1600" dirty="0">
+              <a:solidFill>
+                <a:schemeClr val="bg1"/>
+              </a:solidFill>
+              <a:latin typeface="넥슨Lv2고딕 Light" panose="00000300000000000000" pitchFamily="2" charset="-127"/>
+              <a:ea typeface="넥슨Lv2고딕 Light" panose="00000300000000000000" pitchFamily="2" charset="-127"/>
+            </a:endParaRPr>
+          </a:p>
+        </p:txBody>
+      </p:sp>
     </p:spTree>
     <p:extLst>
       <p:ext uri="{BB962C8B-B14F-4D97-AF65-F5344CB8AC3E}">
-        <p14:creationId xmlns:p14="http://schemas.microsoft.com/office/powerpoint/2010/main" val="1804371286"/>
+        <p14:creationId xmlns:p14="http://schemas.microsoft.com/office/powerpoint/2010/main" val="3122391892"/>
       </p:ext>
     </p:extLst>
   </p:cSld>
@@ -9192,6 +9413,570 @@
       </p:grpSpPr>
       <p:sp>
         <p:nvSpPr>
+          <p:cNvPr id="15" name="TextBox 14">
+            <a:extLst>
+              <a:ext uri="{FF2B5EF4-FFF2-40B4-BE49-F238E27FC236}">
+                <a16:creationId xmlns:a16="http://schemas.microsoft.com/office/drawing/2014/main" id="{BA04418A-3697-DF14-5B90-D9AC7CE43E2B}"/>
+              </a:ext>
+            </a:extLst>
+          </p:cNvPr>
+          <p:cNvSpPr txBox="1"/>
+          <p:nvPr/>
+        </p:nvSpPr>
+        <p:spPr>
+          <a:xfrm>
+            <a:off x="1680310" y="1155929"/>
+            <a:ext cx="3733800" cy="584775"/>
+          </a:xfrm>
+          <a:prstGeom prst="rect">
+            <a:avLst/>
+          </a:prstGeom>
+          <a:noFill/>
+        </p:spPr>
+        <p:txBody>
+          <a:bodyPr wrap="square" rtlCol="0">
+            <a:spAutoFit/>
+          </a:bodyPr>
+          <a:lstStyle/>
+          <a:p>
+            <a:r>
+              <a:rPr lang="en-US" altLang="ko-KR" sz="3200" dirty="0">
+                <a:solidFill>
+                  <a:schemeClr val="bg1"/>
+                </a:solidFill>
+                <a:latin typeface="넥슨Lv2고딕 Bold" panose="00000800000000000000" pitchFamily="2" charset="-127"/>
+                <a:ea typeface="넥슨Lv2고딕 Bold" panose="00000800000000000000" pitchFamily="2" charset="-127"/>
+              </a:rPr>
+              <a:t>UI </a:t>
+            </a:r>
+            <a:r>
+              <a:rPr lang="ko-KR" altLang="en-US" sz="3200" dirty="0">
+                <a:solidFill>
+                  <a:schemeClr val="bg1"/>
+                </a:solidFill>
+                <a:latin typeface="넥슨Lv2고딕 Bold" panose="00000800000000000000" pitchFamily="2" charset="-127"/>
+                <a:ea typeface="넥슨Lv2고딕 Bold" panose="00000800000000000000" pitchFamily="2" charset="-127"/>
+              </a:rPr>
+              <a:t>요소</a:t>
+            </a:r>
+          </a:p>
+        </p:txBody>
+      </p:sp>
+      <p:sp>
+        <p:nvSpPr>
+          <p:cNvPr id="16" name="직사각형 15">
+            <a:extLst>
+              <a:ext uri="{FF2B5EF4-FFF2-40B4-BE49-F238E27FC236}">
+                <a16:creationId xmlns:a16="http://schemas.microsoft.com/office/drawing/2014/main" id="{06D4D73C-002A-B871-4E9F-3C2F2EFA95F6}"/>
+              </a:ext>
+            </a:extLst>
+          </p:cNvPr>
+          <p:cNvSpPr/>
+          <p:nvPr/>
+        </p:nvSpPr>
+        <p:spPr>
+          <a:xfrm>
+            <a:off x="1660524" y="1262063"/>
+            <a:ext cx="45719" cy="366711"/>
+          </a:xfrm>
+          <a:prstGeom prst="rect">
+            <a:avLst/>
+          </a:prstGeom>
+          <a:solidFill>
+            <a:schemeClr val="bg1"/>
+          </a:solidFill>
+          <a:ln>
+            <a:noFill/>
+          </a:ln>
+        </p:spPr>
+        <p:style>
+          <a:lnRef idx="2">
+            <a:schemeClr val="accent1">
+              <a:shade val="50000"/>
+            </a:schemeClr>
+          </a:lnRef>
+          <a:fillRef idx="1">
+            <a:schemeClr val="accent1"/>
+          </a:fillRef>
+          <a:effectRef idx="0">
+            <a:schemeClr val="accent1"/>
+          </a:effectRef>
+          <a:fontRef idx="minor">
+            <a:schemeClr val="lt1"/>
+          </a:fontRef>
+        </p:style>
+        <p:txBody>
+          <a:bodyPr rtlCol="0" anchor="ctr"/>
+          <a:lstStyle/>
+          <a:p>
+            <a:pPr algn="ctr"/>
+            <a:endParaRPr lang="ko-KR" altLang="en-US"/>
+          </a:p>
+        </p:txBody>
+      </p:sp>
+      <p:sp>
+        <p:nvSpPr>
+          <p:cNvPr id="6" name="TextBox 5">
+            <a:extLst>
+              <a:ext uri="{FF2B5EF4-FFF2-40B4-BE49-F238E27FC236}">
+                <a16:creationId xmlns:a16="http://schemas.microsoft.com/office/drawing/2014/main" id="{63BC716B-EEC4-0292-2A32-8BA3449ACD32}"/>
+              </a:ext>
+            </a:extLst>
+          </p:cNvPr>
+          <p:cNvSpPr txBox="1"/>
+          <p:nvPr/>
+        </p:nvSpPr>
+        <p:spPr>
+          <a:xfrm>
+            <a:off x="1680309" y="2074745"/>
+            <a:ext cx="8736865" cy="3477362"/>
+          </a:xfrm>
+          <a:prstGeom prst="rect">
+            <a:avLst/>
+          </a:prstGeom>
+          <a:noFill/>
+        </p:spPr>
+        <p:txBody>
+          <a:bodyPr wrap="square" rtlCol="0">
+            <a:spAutoFit/>
+          </a:bodyPr>
+          <a:lstStyle/>
+          <a:p>
+            <a:pPr>
+              <a:lnSpc>
+                <a:spcPct val="150000"/>
+              </a:lnSpc>
+            </a:pPr>
+            <a:r>
+              <a:rPr lang="en-US" altLang="ko-KR" dirty="0">
+                <a:solidFill>
+                  <a:schemeClr val="bg1"/>
+                </a:solidFill>
+                <a:latin typeface="넥슨Lv2고딕 Medium" panose="00000600000000000000" pitchFamily="2" charset="-127"/>
+                <a:ea typeface="넥슨Lv2고딕 Medium" panose="00000600000000000000" pitchFamily="2" charset="-127"/>
+              </a:rPr>
+              <a:t>Layout</a:t>
+            </a:r>
+            <a:r>
+              <a:rPr lang="ko-KR" altLang="en-US" dirty="0">
+                <a:solidFill>
+                  <a:schemeClr val="bg1"/>
+                </a:solidFill>
+                <a:latin typeface="넥슨Lv2고딕 Medium" panose="00000600000000000000" pitchFamily="2" charset="-127"/>
+                <a:ea typeface="넥슨Lv2고딕 Medium" panose="00000600000000000000" pitchFamily="2" charset="-127"/>
+              </a:rPr>
+              <a:t> </a:t>
+            </a:r>
+            <a:r>
+              <a:rPr lang="en-US" altLang="ko-KR" dirty="0">
+                <a:solidFill>
+                  <a:schemeClr val="bg1"/>
+                </a:solidFill>
+                <a:latin typeface="넥슨Lv2고딕 Medium" panose="00000600000000000000" pitchFamily="2" charset="-127"/>
+                <a:ea typeface="넥슨Lv2고딕 Medium" panose="00000600000000000000" pitchFamily="2" charset="-127"/>
+              </a:rPr>
+              <a:t>Group</a:t>
+            </a:r>
+          </a:p>
+          <a:p>
+            <a:pPr>
+              <a:lnSpc>
+                <a:spcPct val="150000"/>
+              </a:lnSpc>
+            </a:pPr>
+            <a:r>
+              <a:rPr lang="ko-KR" altLang="en-US" sz="1600" dirty="0">
+                <a:solidFill>
+                  <a:schemeClr val="bg1"/>
+                </a:solidFill>
+                <a:latin typeface="넥슨Lv2고딕 Light" panose="00000300000000000000" pitchFamily="2" charset="-127"/>
+                <a:ea typeface="넥슨Lv2고딕 Light" panose="00000300000000000000" pitchFamily="2" charset="-127"/>
+              </a:rPr>
+              <a:t>레이아웃 그룹 사용 이후 컴포넌트를</a:t>
+            </a:r>
+            <a:endParaRPr lang="en-US" altLang="ko-KR" sz="1600" dirty="0">
+              <a:solidFill>
+                <a:schemeClr val="bg1"/>
+              </a:solidFill>
+              <a:latin typeface="넥슨Lv2고딕 Light" panose="00000300000000000000" pitchFamily="2" charset="-127"/>
+              <a:ea typeface="넥슨Lv2고딕 Light" panose="00000300000000000000" pitchFamily="2" charset="-127"/>
+            </a:endParaRPr>
+          </a:p>
+          <a:p>
+            <a:pPr>
+              <a:lnSpc>
+                <a:spcPct val="150000"/>
+              </a:lnSpc>
+            </a:pPr>
+            <a:r>
+              <a:rPr lang="ko-KR" altLang="en-US" sz="1600" dirty="0">
+                <a:solidFill>
+                  <a:schemeClr val="bg1"/>
+                </a:solidFill>
+                <a:latin typeface="넥슨Lv2고딕 Light" panose="00000300000000000000" pitchFamily="2" charset="-127"/>
+                <a:ea typeface="넥슨Lv2고딕 Light" panose="00000300000000000000" pitchFamily="2" charset="-127"/>
+              </a:rPr>
+              <a:t>비활성화하여 추가적인</a:t>
+            </a:r>
+            <a:endParaRPr lang="en-US" altLang="ko-KR" sz="1600" dirty="0">
+              <a:solidFill>
+                <a:schemeClr val="bg1"/>
+              </a:solidFill>
+              <a:latin typeface="넥슨Lv2고딕 Light" panose="00000300000000000000" pitchFamily="2" charset="-127"/>
+              <a:ea typeface="넥슨Lv2고딕 Light" panose="00000300000000000000" pitchFamily="2" charset="-127"/>
+            </a:endParaRPr>
+          </a:p>
+          <a:p>
+            <a:pPr>
+              <a:lnSpc>
+                <a:spcPct val="150000"/>
+              </a:lnSpc>
+            </a:pPr>
+            <a:r>
+              <a:rPr lang="ko-KR" altLang="en-US" sz="1600" dirty="0">
+                <a:solidFill>
+                  <a:schemeClr val="bg1"/>
+                </a:solidFill>
+                <a:latin typeface="넥슨Lv2고딕 Light" panose="00000300000000000000" pitchFamily="2" charset="-127"/>
+                <a:ea typeface="넥슨Lv2고딕 Light" panose="00000300000000000000" pitchFamily="2" charset="-127"/>
+              </a:rPr>
+              <a:t>성능 저하를 막았습니다</a:t>
+            </a:r>
+            <a:endParaRPr lang="en-US" altLang="ko-KR" sz="1600" dirty="0">
+              <a:solidFill>
+                <a:schemeClr val="bg1"/>
+              </a:solidFill>
+              <a:latin typeface="넥슨Lv2고딕 Light" panose="00000300000000000000" pitchFamily="2" charset="-127"/>
+              <a:ea typeface="넥슨Lv2고딕 Light" panose="00000300000000000000" pitchFamily="2" charset="-127"/>
+            </a:endParaRPr>
+          </a:p>
+          <a:p>
+            <a:pPr>
+              <a:lnSpc>
+                <a:spcPct val="150000"/>
+              </a:lnSpc>
+            </a:pPr>
+            <a:endParaRPr lang="en-US" altLang="ko-KR" sz="1600" dirty="0">
+              <a:solidFill>
+                <a:schemeClr val="bg1"/>
+              </a:solidFill>
+              <a:latin typeface="넥슨Lv2고딕 Light" panose="00000300000000000000" pitchFamily="2" charset="-127"/>
+              <a:ea typeface="넥슨Lv2고딕 Light" panose="00000300000000000000" pitchFamily="2" charset="-127"/>
+            </a:endParaRPr>
+          </a:p>
+          <a:p>
+            <a:pPr>
+              <a:lnSpc>
+                <a:spcPct val="150000"/>
+              </a:lnSpc>
+            </a:pPr>
+            <a:r>
+              <a:rPr lang="en-US" altLang="ko-KR" dirty="0">
+                <a:solidFill>
+                  <a:schemeClr val="bg1"/>
+                </a:solidFill>
+                <a:latin typeface="넥슨Lv2고딕 Medium" panose="00000600000000000000" pitchFamily="2" charset="-127"/>
+                <a:ea typeface="넥슨Lv2고딕 Medium" panose="00000600000000000000" pitchFamily="2" charset="-127"/>
+              </a:rPr>
+              <a:t>Tween</a:t>
+            </a:r>
+          </a:p>
+          <a:p>
+            <a:pPr>
+              <a:lnSpc>
+                <a:spcPct val="150000"/>
+              </a:lnSpc>
+            </a:pPr>
+            <a:r>
+              <a:rPr lang="ko-KR" altLang="en-US" sz="1600" dirty="0" err="1">
+                <a:solidFill>
+                  <a:schemeClr val="bg1"/>
+                </a:solidFill>
+                <a:latin typeface="넥슨Lv2고딕 Light" panose="00000300000000000000" pitchFamily="2" charset="-127"/>
+                <a:ea typeface="넥슨Lv2고딕 Light" panose="00000300000000000000" pitchFamily="2" charset="-127"/>
+              </a:rPr>
+              <a:t>애니메이터를</a:t>
+            </a:r>
+            <a:r>
+              <a:rPr lang="ko-KR" altLang="en-US" sz="1600" dirty="0">
+                <a:solidFill>
+                  <a:schemeClr val="bg1"/>
+                </a:solidFill>
+                <a:latin typeface="넥슨Lv2고딕 Light" panose="00000300000000000000" pitchFamily="2" charset="-127"/>
+                <a:ea typeface="넥슨Lv2고딕 Light" panose="00000300000000000000" pitchFamily="2" charset="-127"/>
+              </a:rPr>
+              <a:t> 사용할 경우</a:t>
+            </a:r>
+            <a:r>
+              <a:rPr lang="en-US" altLang="ko-KR" sz="1600" dirty="0">
+                <a:solidFill>
+                  <a:schemeClr val="bg1"/>
+                </a:solidFill>
+                <a:latin typeface="넥슨Lv2고딕 Light" panose="00000300000000000000" pitchFamily="2" charset="-127"/>
+                <a:ea typeface="넥슨Lv2고딕 Light" panose="00000300000000000000" pitchFamily="2" charset="-127"/>
+              </a:rPr>
+              <a:t> </a:t>
+            </a:r>
+            <a:r>
+              <a:rPr lang="ko-KR" altLang="en-US" sz="1600" dirty="0">
+                <a:solidFill>
+                  <a:schemeClr val="bg1"/>
+                </a:solidFill>
+                <a:latin typeface="넥슨Lv2고딕 Light" panose="00000300000000000000" pitchFamily="2" charset="-127"/>
+                <a:ea typeface="넥슨Lv2고딕 Light" panose="00000300000000000000" pitchFamily="2" charset="-127"/>
+              </a:rPr>
+              <a:t>애니메이션이 사용 중이 아니더라도</a:t>
+            </a:r>
+            <a:endParaRPr lang="en-US" altLang="ko-KR" sz="1600" dirty="0">
+              <a:solidFill>
+                <a:schemeClr val="bg1"/>
+              </a:solidFill>
+              <a:latin typeface="넥슨Lv2고딕 Light" panose="00000300000000000000" pitchFamily="2" charset="-127"/>
+              <a:ea typeface="넥슨Lv2고딕 Light" panose="00000300000000000000" pitchFamily="2" charset="-127"/>
+            </a:endParaRPr>
+          </a:p>
+          <a:p>
+            <a:pPr>
+              <a:lnSpc>
+                <a:spcPct val="150000"/>
+              </a:lnSpc>
+            </a:pPr>
+            <a:r>
+              <a:rPr lang="ko-KR" altLang="en-US" sz="1600" dirty="0">
+                <a:solidFill>
+                  <a:schemeClr val="bg1"/>
+                </a:solidFill>
+                <a:latin typeface="넥슨Lv2고딕 Light" panose="00000300000000000000" pitchFamily="2" charset="-127"/>
+                <a:ea typeface="넥슨Lv2고딕 Light" panose="00000300000000000000" pitchFamily="2" charset="-127"/>
+              </a:rPr>
+              <a:t>다시 그리게 되는 문제를 해결하기위해</a:t>
+            </a:r>
+            <a:endParaRPr lang="en-US" altLang="ko-KR" sz="1600" dirty="0">
+              <a:solidFill>
+                <a:schemeClr val="bg1"/>
+              </a:solidFill>
+              <a:latin typeface="넥슨Lv2고딕 Light" panose="00000300000000000000" pitchFamily="2" charset="-127"/>
+              <a:ea typeface="넥슨Lv2고딕 Light" panose="00000300000000000000" pitchFamily="2" charset="-127"/>
+            </a:endParaRPr>
+          </a:p>
+          <a:p>
+            <a:pPr>
+              <a:lnSpc>
+                <a:spcPct val="150000"/>
+              </a:lnSpc>
+            </a:pPr>
+            <a:r>
+              <a:rPr lang="en-US" altLang="ko-KR" sz="1600" dirty="0">
+                <a:solidFill>
+                  <a:schemeClr val="bg1"/>
+                </a:solidFill>
+                <a:latin typeface="넥슨Lv2고딕 Light" panose="00000300000000000000" pitchFamily="2" charset="-127"/>
+                <a:ea typeface="넥슨Lv2고딕 Light" panose="00000300000000000000" pitchFamily="2" charset="-127"/>
+              </a:rPr>
+              <a:t>Tween </a:t>
+            </a:r>
+            <a:r>
+              <a:rPr lang="ko-KR" altLang="en-US" sz="1600" dirty="0">
+                <a:solidFill>
+                  <a:schemeClr val="bg1"/>
+                </a:solidFill>
+                <a:latin typeface="넥슨Lv2고딕 Light" panose="00000300000000000000" pitchFamily="2" charset="-127"/>
+                <a:ea typeface="넥슨Lv2고딕 Light" panose="00000300000000000000" pitchFamily="2" charset="-127"/>
+              </a:rPr>
+              <a:t>을 사용하여</a:t>
+            </a:r>
+            <a:r>
+              <a:rPr lang="en-US" altLang="ko-KR" sz="1600" dirty="0">
+                <a:solidFill>
+                  <a:schemeClr val="bg1"/>
+                </a:solidFill>
+                <a:latin typeface="넥슨Lv2고딕 Light" panose="00000300000000000000" pitchFamily="2" charset="-127"/>
+                <a:ea typeface="넥슨Lv2고딕 Light" panose="00000300000000000000" pitchFamily="2" charset="-127"/>
+              </a:rPr>
+              <a:t> </a:t>
+            </a:r>
+            <a:r>
+              <a:rPr lang="ko-KR" altLang="en-US" sz="1600" dirty="0">
+                <a:solidFill>
+                  <a:schemeClr val="bg1"/>
+                </a:solidFill>
+                <a:latin typeface="넥슨Lv2고딕 Light" panose="00000300000000000000" pitchFamily="2" charset="-127"/>
+                <a:ea typeface="넥슨Lv2고딕 Light" panose="00000300000000000000" pitchFamily="2" charset="-127"/>
+              </a:rPr>
+              <a:t>간단한 애니메이션을 적용하였습니다</a:t>
+            </a:r>
+            <a:endParaRPr lang="en-US" altLang="ko-KR" sz="1600" dirty="0">
+              <a:solidFill>
+                <a:schemeClr val="bg1"/>
+              </a:solidFill>
+              <a:latin typeface="넥슨Lv2고딕 Light" panose="00000300000000000000" pitchFamily="2" charset="-127"/>
+              <a:ea typeface="넥슨Lv2고딕 Light" panose="00000300000000000000" pitchFamily="2" charset="-127"/>
+            </a:endParaRPr>
+          </a:p>
+        </p:txBody>
+      </p:sp>
+    </p:spTree>
+    <p:extLst>
+      <p:ext uri="{BB962C8B-B14F-4D97-AF65-F5344CB8AC3E}">
+        <p14:creationId xmlns:p14="http://schemas.microsoft.com/office/powerpoint/2010/main" val="3532308141"/>
+      </p:ext>
+    </p:extLst>
+  </p:cSld>
+  <p:clrMapOvr>
+    <a:masterClrMapping/>
+  </p:clrMapOvr>
+</p:sld>
+</file>
+
+<file path=ppt/slides/slide25.xml><?xml version="1.0" encoding="utf-8"?>
+<p:sld xmlns:a="http://schemas.openxmlformats.org/drawingml/2006/main" xmlns:r="http://schemas.openxmlformats.org/officeDocument/2006/relationships" xmlns:p="http://schemas.openxmlformats.org/presentationml/2006/main">
+  <p:cSld>
+    <p:bg>
+      <p:bgPr>
+        <a:solidFill>
+          <a:srgbClr val="4286F5"/>
+        </a:solidFill>
+        <a:effectLst/>
+      </p:bgPr>
+    </p:bg>
+    <p:spTree>
+      <p:nvGrpSpPr>
+        <p:cNvPr id="1" name=""/>
+        <p:cNvGrpSpPr/>
+        <p:nvPr/>
+      </p:nvGrpSpPr>
+      <p:grpSpPr>
+        <a:xfrm>
+          <a:off x="0" y="0"/>
+          <a:ext cx="0" cy="0"/>
+          <a:chOff x="0" y="0"/>
+          <a:chExt cx="0" cy="0"/>
+        </a:xfrm>
+      </p:grpSpPr>
+      <p:sp>
+        <p:nvSpPr>
+          <p:cNvPr id="15" name="TextBox 14">
+            <a:extLst>
+              <a:ext uri="{FF2B5EF4-FFF2-40B4-BE49-F238E27FC236}">
+                <a16:creationId xmlns:a16="http://schemas.microsoft.com/office/drawing/2014/main" id="{BA04418A-3697-DF14-5B90-D9AC7CE43E2B}"/>
+              </a:ext>
+            </a:extLst>
+          </p:cNvPr>
+          <p:cNvSpPr txBox="1"/>
+          <p:nvPr/>
+        </p:nvSpPr>
+        <p:spPr>
+          <a:xfrm>
+            <a:off x="1688777" y="1469196"/>
+            <a:ext cx="6650890" cy="1200329"/>
+          </a:xfrm>
+          <a:prstGeom prst="rect">
+            <a:avLst/>
+          </a:prstGeom>
+          <a:noFill/>
+        </p:spPr>
+        <p:txBody>
+          <a:bodyPr wrap="square" rtlCol="0">
+            <a:spAutoFit/>
+          </a:bodyPr>
+          <a:lstStyle/>
+          <a:p>
+            <a:r>
+              <a:rPr lang="ko-KR" altLang="en-US" sz="7200" dirty="0">
+                <a:solidFill>
+                  <a:schemeClr val="bg1"/>
+                </a:solidFill>
+                <a:latin typeface="넥슨Lv2고딕 Bold" panose="00000800000000000000" pitchFamily="2" charset="-127"/>
+                <a:ea typeface="넥슨Lv2고딕 Bold" panose="00000800000000000000" pitchFamily="2" charset="-127"/>
+              </a:rPr>
+              <a:t>마치며</a:t>
+            </a:r>
+            <a:endParaRPr lang="en-US" altLang="ko-KR" sz="7200" dirty="0">
+              <a:solidFill>
+                <a:schemeClr val="bg1"/>
+              </a:solidFill>
+              <a:latin typeface="넥슨Lv2고딕 Bold" panose="00000800000000000000" pitchFamily="2" charset="-127"/>
+              <a:ea typeface="넥슨Lv2고딕 Bold" panose="00000800000000000000" pitchFamily="2" charset="-127"/>
+            </a:endParaRPr>
+          </a:p>
+        </p:txBody>
+      </p:sp>
+      <p:pic>
+        <p:nvPicPr>
+          <p:cNvPr id="9" name="그림 8">
+            <a:extLst>
+              <a:ext uri="{FF2B5EF4-FFF2-40B4-BE49-F238E27FC236}">
+                <a16:creationId xmlns:a16="http://schemas.microsoft.com/office/drawing/2014/main" id="{B6FC7C27-A4D6-0A9C-F61B-6AA1144DE5B1}"/>
+              </a:ext>
+            </a:extLst>
+          </p:cNvPr>
+          <p:cNvPicPr>
+            <a:picLocks noChangeAspect="1"/>
+          </p:cNvPicPr>
+          <p:nvPr/>
+        </p:nvPicPr>
+        <p:blipFill>
+          <a:blip r:embed="rId2">
+            <a:extLst>
+              <a:ext uri="{28A0092B-C50C-407E-A947-70E740481C1C}">
+                <a14:useLocalDpi xmlns:a14="http://schemas.microsoft.com/office/drawing/2010/main" val="0"/>
+              </a:ext>
+            </a:extLst>
+          </a:blip>
+          <a:stretch>
+            <a:fillRect/>
+          </a:stretch>
+        </p:blipFill>
+        <p:spPr>
+          <a:xfrm flipH="1">
+            <a:off x="6682163" y="1628775"/>
+            <a:ext cx="3735012" cy="4514850"/>
+          </a:xfrm>
+          <a:prstGeom prst="rect">
+            <a:avLst/>
+          </a:prstGeom>
+        </p:spPr>
+      </p:pic>
+    </p:spTree>
+    <p:extLst>
+      <p:ext uri="{BB962C8B-B14F-4D97-AF65-F5344CB8AC3E}">
+        <p14:creationId xmlns:p14="http://schemas.microsoft.com/office/powerpoint/2010/main" val="1804371286"/>
+      </p:ext>
+    </p:extLst>
+  </p:cSld>
+  <p:clrMapOvr>
+    <a:masterClrMapping/>
+  </p:clrMapOvr>
+</p:sld>
+</file>
+
+<file path=ppt/slides/slide26.xml><?xml version="1.0" encoding="utf-8"?>
+<p:sld xmlns:a="http://schemas.openxmlformats.org/drawingml/2006/main" xmlns:r="http://schemas.openxmlformats.org/officeDocument/2006/relationships" xmlns:p="http://schemas.openxmlformats.org/presentationml/2006/main">
+  <p:cSld>
+    <p:bg>
+      <p:bgPr>
+        <a:solidFill>
+          <a:srgbClr val="4286F5"/>
+        </a:solidFill>
+        <a:effectLst/>
+      </p:bgPr>
+    </p:bg>
+    <p:spTree>
+      <p:nvGrpSpPr>
+        <p:cNvPr id="1" name=""/>
+        <p:cNvGrpSpPr/>
+        <p:nvPr/>
+      </p:nvGrpSpPr>
+      <p:grpSpPr>
+        <a:xfrm>
+          <a:off x="0" y="0"/>
+          <a:ext cx="0" cy="0"/>
+          <a:chOff x="0" y="0"/>
+          <a:chExt cx="0" cy="0"/>
+        </a:xfrm>
+      </p:grpSpPr>
+      <p:sp>
+        <p:nvSpPr>
           <p:cNvPr id="11" name="사각형: 둥근 모서리 10">
             <a:extLst>
               <a:ext uri="{FF2B5EF4-FFF2-40B4-BE49-F238E27FC236}">
@@ -9495,7 +10280,7 @@
                 <a:latin typeface="넥슨Lv2고딕 Light" panose="00000300000000000000" pitchFamily="2" charset="-127"/>
                 <a:ea typeface="넥슨Lv2고딕 Light" panose="00000300000000000000" pitchFamily="2" charset="-127"/>
               </a:rPr>
-              <a:t>을 만들어 둔 구조에서 변형된 것이</a:t>
+              <a:t>로 만들어 둔 구조에서</a:t>
             </a:r>
             <a:endParaRPr lang="en-US" altLang="ko-KR" sz="1600" dirty="0">
               <a:solidFill>
@@ -9519,7 +10304,27 @@
                 <a:latin typeface="넥슨Lv2고딕 Light" panose="00000300000000000000" pitchFamily="2" charset="-127"/>
                 <a:ea typeface="넥슨Lv2고딕 Light" panose="00000300000000000000" pitchFamily="2" charset="-127"/>
               </a:rPr>
-              <a:t>보여서 앞으로 구조에 대해</a:t>
+              <a:t>변형된 것이</a:t>
+            </a:r>
+            <a:r>
+              <a:rPr lang="en-US" altLang="ko-KR" sz="1600" dirty="0">
+                <a:solidFill>
+                  <a:schemeClr val="bg1"/>
+                </a:solidFill>
+                <a:latin typeface="넥슨Lv2고딕 Light" panose="00000300000000000000" pitchFamily="2" charset="-127"/>
+                <a:ea typeface="넥슨Lv2고딕 Light" panose="00000300000000000000" pitchFamily="2" charset="-127"/>
+              </a:rPr>
+              <a:t> </a:t>
+            </a:r>
+            <a:r>
+              <a:rPr lang="ko-KR" altLang="en-US" sz="1600" dirty="0">
+                <a:solidFill>
+                  <a:schemeClr val="bg1"/>
+                </a:solidFill>
+                <a:latin typeface="넥슨Lv2고딕 Light" panose="00000300000000000000" pitchFamily="2" charset="-127"/>
+                <a:ea typeface="넥슨Lv2고딕 Light" panose="00000300000000000000" pitchFamily="2" charset="-127"/>
+              </a:rPr>
+              <a:t>있어서 앞으로 구조에 대해</a:t>
             </a:r>
             <a:endParaRPr lang="en-US" altLang="ko-KR" sz="1600" dirty="0">
               <a:solidFill>
@@ -9563,7 +10368,7 @@
                 <a:latin typeface="넥슨Lv2고딕 Light" panose="00000300000000000000" pitchFamily="2" charset="-127"/>
                 <a:ea typeface="넥슨Lv2고딕 Light" panose="00000300000000000000" pitchFamily="2" charset="-127"/>
               </a:rPr>
-              <a:t>좋을 것 같다</a:t>
+              <a:t>좋을 것 같습니다</a:t>
             </a:r>
             <a:endParaRPr lang="en-US" altLang="ko-KR" sz="1600" dirty="0">
               <a:solidFill>
@@ -9588,7 +10393,7 @@
 </p:sld>
 </file>
 
-<file path=ppt/slides/slide25.xml><?xml version="1.0" encoding="utf-8"?>
+<file path=ppt/slides/slide27.xml><?xml version="1.0" encoding="utf-8"?>
 <p:sld xmlns:a="http://schemas.openxmlformats.org/drawingml/2006/main" xmlns:r="http://schemas.openxmlformats.org/officeDocument/2006/relationships" xmlns:p="http://schemas.openxmlformats.org/presentationml/2006/main">
   <p:cSld>
     <p:bg>
@@ -10449,7 +11254,7 @@
         <p:spPr>
           <a:xfrm>
             <a:off x="3933031" y="2548890"/>
-            <a:ext cx="2162175" cy="1303562"/>
+            <a:ext cx="2162175" cy="1719060"/>
           </a:xfrm>
           <a:prstGeom prst="rect">
             <a:avLst/>
@@ -10524,6 +11329,30 @@
                 <a:ea typeface="넥슨Lv2고딕 Light" panose="00000300000000000000" pitchFamily="2" charset="-127"/>
               </a:rPr>
               <a:t>자동화</a:t>
+            </a:r>
+            <a:endParaRPr lang="en-US" altLang="ko-KR" dirty="0">
+              <a:solidFill>
+                <a:schemeClr val="bg1"/>
+              </a:solidFill>
+              <a:latin typeface="넥슨Lv2고딕 Light" panose="00000300000000000000" pitchFamily="2" charset="-127"/>
+              <a:ea typeface="넥슨Lv2고딕 Light" panose="00000300000000000000" pitchFamily="2" charset="-127"/>
+            </a:endParaRPr>
+          </a:p>
+          <a:p>
+            <a:pPr algn="ctr">
+              <a:lnSpc>
+                <a:spcPct val="150000"/>
+              </a:lnSpc>
+            </a:pPr>
+            <a:r>
+              <a:rPr lang="ko-KR" altLang="en-US" dirty="0" err="1">
+                <a:solidFill>
+                  <a:schemeClr val="bg1"/>
+                </a:solidFill>
+                <a:latin typeface="넥슨Lv2고딕 Light" panose="00000300000000000000" pitchFamily="2" charset="-127"/>
+                <a:ea typeface="넥슨Lv2고딕 Light" panose="00000300000000000000" pitchFamily="2" charset="-127"/>
+              </a:rPr>
+              <a:t>로컬라이징</a:t>
             </a:r>
             <a:endParaRPr lang="en-US" altLang="ko-KR" dirty="0">
               <a:solidFill>

</xml_diff>